<commit_message>
Subo el grafico de la ppt
</commit_message>
<xml_diff>
--- a/Simulación/datos Sistema/UTN - Simulacion - Equipo 5 -TP N°6 Picolo.pptx
+++ b/Simulación/datos Sistema/UTN - Simulacion - Equipo 5 -TP N°6 Picolo.pptx
@@ -16,7 +16,7 @@
     <p:sldId id="270" r:id="rId7"/>
     <p:sldId id="271" r:id="rId8"/>
     <p:sldId id="264" r:id="rId9"/>
-    <p:sldId id="265" r:id="rId10"/>
+    <p:sldId id="272" r:id="rId10"/>
   </p:sldIdLst>
   <p:sldSz cx="12192000" cy="6858000"/>
   <p:notesSz cx="6858000" cy="9144000"/>
@@ -121,6 +121,1174 @@
     </p:ext>
   </p:extLst>
 </p:presentation>
+</file>
+
+<file path=ppt/charts/chart1.xml><?xml version="1.0" encoding="utf-8"?>
+<c:chartSpace xmlns:c="http://schemas.openxmlformats.org/drawingml/2006/chart" xmlns:a="http://schemas.openxmlformats.org/drawingml/2006/main" xmlns:r="http://schemas.openxmlformats.org/officeDocument/2006/relationships">
+  <c:date1904 val="0"/>
+  <c:lang val="es-ES"/>
+  <c:roundedCorners val="0"/>
+  <mc:AlternateContent xmlns:mc="http://schemas.openxmlformats.org/markup-compatibility/2006">
+    <mc:Choice xmlns:c14="http://schemas.microsoft.com/office/drawing/2007/8/2/chart" Requires="c14">
+      <c14:style val="102"/>
+    </mc:Choice>
+    <mc:Fallback>
+      <c:style val="2"/>
+    </mc:Fallback>
+  </mc:AlternateContent>
+  <c:chart>
+    <c:title>
+      <c:tx>
+        <c:rich>
+          <a:bodyPr rot="0" spcFirstLastPara="1" vertOverflow="ellipsis" vert="horz" wrap="square" anchor="ctr" anchorCtr="1"/>
+          <a:lstStyle/>
+          <a:p>
+            <a:pPr>
+              <a:defRPr sz="1862" b="0" i="0" u="none" strike="noStrike" kern="1200" spc="0" baseline="0">
+                <a:solidFill>
+                  <a:schemeClr val="tx1">
+                    <a:lumMod val="65000"/>
+                    <a:lumOff val="35000"/>
+                  </a:schemeClr>
+                </a:solidFill>
+                <a:latin typeface="+mn-lt"/>
+                <a:ea typeface="+mn-ea"/>
+                <a:cs typeface="+mn-cs"/>
+              </a:defRPr>
+            </a:pPr>
+            <a:r>
+              <a:rPr lang="es-AR" dirty="0" smtClean="0"/>
+              <a:t>Simulaciones generadas</a:t>
+            </a:r>
+            <a:endParaRPr lang="es-AR" dirty="0"/>
+          </a:p>
+        </c:rich>
+      </c:tx>
+      <c:layout/>
+      <c:overlay val="0"/>
+      <c:spPr>
+        <a:noFill/>
+        <a:ln>
+          <a:noFill/>
+        </a:ln>
+        <a:effectLst/>
+      </c:spPr>
+      <c:txPr>
+        <a:bodyPr rot="0" spcFirstLastPara="1" vertOverflow="ellipsis" vert="horz" wrap="square" anchor="ctr" anchorCtr="1"/>
+        <a:lstStyle/>
+        <a:p>
+          <a:pPr>
+            <a:defRPr sz="1862" b="0" i="0" u="none" strike="noStrike" kern="1200" spc="0" baseline="0">
+              <a:solidFill>
+                <a:schemeClr val="tx1">
+                  <a:lumMod val="65000"/>
+                  <a:lumOff val="35000"/>
+                </a:schemeClr>
+              </a:solidFill>
+              <a:latin typeface="+mn-lt"/>
+              <a:ea typeface="+mn-ea"/>
+              <a:cs typeface="+mn-cs"/>
+            </a:defRPr>
+          </a:pPr>
+          <a:endParaRPr lang="es-AR"/>
+        </a:p>
+      </c:txPr>
+    </c:title>
+    <c:autoTitleDeleted val="0"/>
+    <c:plotArea>
+      <c:layout/>
+      <c:barChart>
+        <c:barDir val="col"/>
+        <c:grouping val="clustered"/>
+        <c:varyColors val="0"/>
+        <c:ser>
+          <c:idx val="0"/>
+          <c:order val="0"/>
+          <c:tx>
+            <c:strRef>
+              <c:f>Hoja1!$B$1</c:f>
+              <c:strCache>
+                <c:ptCount val="1"/>
+                <c:pt idx="0">
+                  <c:v>Operadores SAP</c:v>
+                </c:pt>
+              </c:strCache>
+            </c:strRef>
+          </c:tx>
+          <c:spPr>
+            <a:solidFill>
+              <a:schemeClr val="accent1"/>
+            </a:solidFill>
+            <a:ln>
+              <a:noFill/>
+            </a:ln>
+            <a:effectLst/>
+          </c:spPr>
+          <c:invertIfNegative val="0"/>
+          <c:cat>
+            <c:strRef>
+              <c:f>Hoja1!$A$2:$A$4</c:f>
+              <c:strCache>
+                <c:ptCount val="3"/>
+                <c:pt idx="0">
+                  <c:v>Simulación 1</c:v>
+                </c:pt>
+                <c:pt idx="1">
+                  <c:v>Simulación 2</c:v>
+                </c:pt>
+                <c:pt idx="2">
+                  <c:v>Simulacion 3</c:v>
+                </c:pt>
+              </c:strCache>
+            </c:strRef>
+          </c:cat>
+          <c:val>
+            <c:numRef>
+              <c:f>Hoja1!$B$2:$B$4</c:f>
+              <c:numCache>
+                <c:formatCode>General</c:formatCode>
+                <c:ptCount val="3"/>
+                <c:pt idx="0">
+                  <c:v>1</c:v>
+                </c:pt>
+                <c:pt idx="1">
+                  <c:v>5</c:v>
+                </c:pt>
+                <c:pt idx="2">
+                  <c:v>10</c:v>
+                </c:pt>
+              </c:numCache>
+            </c:numRef>
+          </c:val>
+        </c:ser>
+        <c:ser>
+          <c:idx val="1"/>
+          <c:order val="1"/>
+          <c:tx>
+            <c:strRef>
+              <c:f>Hoja1!$C$1</c:f>
+              <c:strCache>
+                <c:ptCount val="1"/>
+                <c:pt idx="0">
+                  <c:v>Operadores DMSTI</c:v>
+                </c:pt>
+              </c:strCache>
+            </c:strRef>
+          </c:tx>
+          <c:spPr>
+            <a:solidFill>
+              <a:schemeClr val="accent2"/>
+            </a:solidFill>
+            <a:ln>
+              <a:noFill/>
+            </a:ln>
+            <a:effectLst/>
+          </c:spPr>
+          <c:invertIfNegative val="0"/>
+          <c:cat>
+            <c:strRef>
+              <c:f>Hoja1!$A$2:$A$4</c:f>
+              <c:strCache>
+                <c:ptCount val="3"/>
+                <c:pt idx="0">
+                  <c:v>Simulación 1</c:v>
+                </c:pt>
+                <c:pt idx="1">
+                  <c:v>Simulación 2</c:v>
+                </c:pt>
+                <c:pt idx="2">
+                  <c:v>Simulacion 3</c:v>
+                </c:pt>
+              </c:strCache>
+            </c:strRef>
+          </c:cat>
+          <c:val>
+            <c:numRef>
+              <c:f>Hoja1!$C$2:$C$4</c:f>
+              <c:numCache>
+                <c:formatCode>General</c:formatCode>
+                <c:ptCount val="3"/>
+                <c:pt idx="0">
+                  <c:v>1</c:v>
+                </c:pt>
+                <c:pt idx="1">
+                  <c:v>5</c:v>
+                </c:pt>
+                <c:pt idx="2">
+                  <c:v>10</c:v>
+                </c:pt>
+              </c:numCache>
+            </c:numRef>
+          </c:val>
+        </c:ser>
+        <c:ser>
+          <c:idx val="2"/>
+          <c:order val="2"/>
+          <c:tx>
+            <c:strRef>
+              <c:f>Hoja1!$D$1</c:f>
+              <c:strCache>
+                <c:ptCount val="1"/>
+                <c:pt idx="0">
+                  <c:v>Tiempo Espera SAP</c:v>
+                </c:pt>
+              </c:strCache>
+            </c:strRef>
+          </c:tx>
+          <c:spPr>
+            <a:solidFill>
+              <a:schemeClr val="accent3"/>
+            </a:solidFill>
+            <a:ln>
+              <a:noFill/>
+            </a:ln>
+            <a:effectLst/>
+          </c:spPr>
+          <c:invertIfNegative val="0"/>
+          <c:cat>
+            <c:strRef>
+              <c:f>Hoja1!$A$2:$A$4</c:f>
+              <c:strCache>
+                <c:ptCount val="3"/>
+                <c:pt idx="0">
+                  <c:v>Simulación 1</c:v>
+                </c:pt>
+                <c:pt idx="1">
+                  <c:v>Simulación 2</c:v>
+                </c:pt>
+                <c:pt idx="2">
+                  <c:v>Simulacion 3</c:v>
+                </c:pt>
+              </c:strCache>
+            </c:strRef>
+          </c:cat>
+          <c:val>
+            <c:numRef>
+              <c:f>Hoja1!$D$2:$D$4</c:f>
+              <c:numCache>
+                <c:formatCode>General</c:formatCode>
+                <c:ptCount val="3"/>
+                <c:pt idx="0">
+                  <c:v>10</c:v>
+                </c:pt>
+                <c:pt idx="1">
+                  <c:v>3</c:v>
+                </c:pt>
+                <c:pt idx="2">
+                  <c:v>1</c:v>
+                </c:pt>
+              </c:numCache>
+            </c:numRef>
+          </c:val>
+        </c:ser>
+        <c:ser>
+          <c:idx val="3"/>
+          <c:order val="3"/>
+          <c:tx>
+            <c:strRef>
+              <c:f>Hoja1!$E$1</c:f>
+              <c:strCache>
+                <c:ptCount val="1"/>
+                <c:pt idx="0">
+                  <c:v>Tiempo Espera DMSTI</c:v>
+                </c:pt>
+              </c:strCache>
+            </c:strRef>
+          </c:tx>
+          <c:spPr>
+            <a:solidFill>
+              <a:schemeClr val="accent4"/>
+            </a:solidFill>
+            <a:ln>
+              <a:noFill/>
+            </a:ln>
+            <a:effectLst/>
+          </c:spPr>
+          <c:invertIfNegative val="0"/>
+          <c:cat>
+            <c:strRef>
+              <c:f>Hoja1!$A$2:$A$4</c:f>
+              <c:strCache>
+                <c:ptCount val="3"/>
+                <c:pt idx="0">
+                  <c:v>Simulación 1</c:v>
+                </c:pt>
+                <c:pt idx="1">
+                  <c:v>Simulación 2</c:v>
+                </c:pt>
+                <c:pt idx="2">
+                  <c:v>Simulacion 3</c:v>
+                </c:pt>
+              </c:strCache>
+            </c:strRef>
+          </c:cat>
+          <c:val>
+            <c:numRef>
+              <c:f>Hoja1!$E$2:$E$4</c:f>
+              <c:numCache>
+                <c:formatCode>General</c:formatCode>
+                <c:ptCount val="3"/>
+                <c:pt idx="0">
+                  <c:v>8</c:v>
+                </c:pt>
+                <c:pt idx="1">
+                  <c:v>2</c:v>
+                </c:pt>
+                <c:pt idx="2">
+                  <c:v>1</c:v>
+                </c:pt>
+              </c:numCache>
+            </c:numRef>
+          </c:val>
+        </c:ser>
+        <c:ser>
+          <c:idx val="4"/>
+          <c:order val="4"/>
+          <c:tx>
+            <c:strRef>
+              <c:f>Hoja1!$F$1</c:f>
+              <c:strCache>
+                <c:ptCount val="1"/>
+                <c:pt idx="0">
+                  <c:v>Tiempo Ocioso SAP</c:v>
+                </c:pt>
+              </c:strCache>
+            </c:strRef>
+          </c:tx>
+          <c:spPr>
+            <a:solidFill>
+              <a:schemeClr val="accent5"/>
+            </a:solidFill>
+            <a:ln>
+              <a:noFill/>
+            </a:ln>
+            <a:effectLst/>
+          </c:spPr>
+          <c:invertIfNegative val="0"/>
+          <c:cat>
+            <c:strRef>
+              <c:f>Hoja1!$A$2:$A$4</c:f>
+              <c:strCache>
+                <c:ptCount val="3"/>
+                <c:pt idx="0">
+                  <c:v>Simulación 1</c:v>
+                </c:pt>
+                <c:pt idx="1">
+                  <c:v>Simulación 2</c:v>
+                </c:pt>
+                <c:pt idx="2">
+                  <c:v>Simulacion 3</c:v>
+                </c:pt>
+              </c:strCache>
+            </c:strRef>
+          </c:cat>
+          <c:val>
+            <c:numRef>
+              <c:f>Hoja1!$F$2:$F$4</c:f>
+              <c:numCache>
+                <c:formatCode>General</c:formatCode>
+                <c:ptCount val="3"/>
+                <c:pt idx="0">
+                  <c:v>0.5</c:v>
+                </c:pt>
+                <c:pt idx="1">
+                  <c:v>2</c:v>
+                </c:pt>
+                <c:pt idx="2">
+                  <c:v>5</c:v>
+                </c:pt>
+              </c:numCache>
+            </c:numRef>
+          </c:val>
+        </c:ser>
+        <c:ser>
+          <c:idx val="5"/>
+          <c:order val="5"/>
+          <c:tx>
+            <c:strRef>
+              <c:f>Hoja1!$G$1</c:f>
+              <c:strCache>
+                <c:ptCount val="1"/>
+                <c:pt idx="0">
+                  <c:v>Tiempo Ocioso DMSTI</c:v>
+                </c:pt>
+              </c:strCache>
+            </c:strRef>
+          </c:tx>
+          <c:spPr>
+            <a:solidFill>
+              <a:schemeClr val="accent6"/>
+            </a:solidFill>
+            <a:ln>
+              <a:noFill/>
+            </a:ln>
+            <a:effectLst/>
+          </c:spPr>
+          <c:invertIfNegative val="0"/>
+          <c:cat>
+            <c:strRef>
+              <c:f>Hoja1!$A$2:$A$4</c:f>
+              <c:strCache>
+                <c:ptCount val="3"/>
+                <c:pt idx="0">
+                  <c:v>Simulación 1</c:v>
+                </c:pt>
+                <c:pt idx="1">
+                  <c:v>Simulación 2</c:v>
+                </c:pt>
+                <c:pt idx="2">
+                  <c:v>Simulacion 3</c:v>
+                </c:pt>
+              </c:strCache>
+            </c:strRef>
+          </c:cat>
+          <c:val>
+            <c:numRef>
+              <c:f>Hoja1!$G$2:$G$4</c:f>
+              <c:numCache>
+                <c:formatCode>General</c:formatCode>
+                <c:ptCount val="3"/>
+                <c:pt idx="0">
+                  <c:v>1</c:v>
+                </c:pt>
+                <c:pt idx="1">
+                  <c:v>3</c:v>
+                </c:pt>
+                <c:pt idx="2">
+                  <c:v>10</c:v>
+                </c:pt>
+              </c:numCache>
+            </c:numRef>
+          </c:val>
+        </c:ser>
+        <c:dLbls>
+          <c:showLegendKey val="0"/>
+          <c:showVal val="0"/>
+          <c:showCatName val="0"/>
+          <c:showSerName val="0"/>
+          <c:showPercent val="0"/>
+          <c:showBubbleSize val="0"/>
+        </c:dLbls>
+        <c:gapWidth val="219"/>
+        <c:overlap val="-27"/>
+        <c:axId val="443323960"/>
+        <c:axId val="443324352"/>
+      </c:barChart>
+      <c:catAx>
+        <c:axId val="443323960"/>
+        <c:scaling>
+          <c:orientation val="minMax"/>
+        </c:scaling>
+        <c:delete val="0"/>
+        <c:axPos val="b"/>
+        <c:numFmt formatCode="General" sourceLinked="1"/>
+        <c:majorTickMark val="none"/>
+        <c:minorTickMark val="none"/>
+        <c:tickLblPos val="nextTo"/>
+        <c:spPr>
+          <a:noFill/>
+          <a:ln w="9525" cap="flat" cmpd="sng" algn="ctr">
+            <a:solidFill>
+              <a:schemeClr val="tx1">
+                <a:lumMod val="15000"/>
+                <a:lumOff val="85000"/>
+              </a:schemeClr>
+            </a:solidFill>
+            <a:round/>
+          </a:ln>
+          <a:effectLst/>
+        </c:spPr>
+        <c:txPr>
+          <a:bodyPr rot="-60000000" spcFirstLastPara="1" vertOverflow="ellipsis" vert="horz" wrap="square" anchor="ctr" anchorCtr="1"/>
+          <a:lstStyle/>
+          <a:p>
+            <a:pPr>
+              <a:defRPr sz="1197" b="0" i="0" u="none" strike="noStrike" kern="1200" baseline="0">
+                <a:solidFill>
+                  <a:schemeClr val="tx1">
+                    <a:lumMod val="65000"/>
+                    <a:lumOff val="35000"/>
+                  </a:schemeClr>
+                </a:solidFill>
+                <a:latin typeface="+mn-lt"/>
+                <a:ea typeface="+mn-ea"/>
+                <a:cs typeface="+mn-cs"/>
+              </a:defRPr>
+            </a:pPr>
+            <a:endParaRPr lang="es-AR"/>
+          </a:p>
+        </c:txPr>
+        <c:crossAx val="443324352"/>
+        <c:crosses val="autoZero"/>
+        <c:auto val="1"/>
+        <c:lblAlgn val="ctr"/>
+        <c:lblOffset val="100"/>
+        <c:noMultiLvlLbl val="0"/>
+      </c:catAx>
+      <c:valAx>
+        <c:axId val="443324352"/>
+        <c:scaling>
+          <c:orientation val="minMax"/>
+        </c:scaling>
+        <c:delete val="0"/>
+        <c:axPos val="l"/>
+        <c:majorGridlines>
+          <c:spPr>
+            <a:ln w="9525" cap="flat" cmpd="sng" algn="ctr">
+              <a:solidFill>
+                <a:schemeClr val="tx1">
+                  <a:lumMod val="15000"/>
+                  <a:lumOff val="85000"/>
+                </a:schemeClr>
+              </a:solidFill>
+              <a:round/>
+            </a:ln>
+            <a:effectLst/>
+          </c:spPr>
+        </c:majorGridlines>
+        <c:numFmt formatCode="General" sourceLinked="1"/>
+        <c:majorTickMark val="none"/>
+        <c:minorTickMark val="none"/>
+        <c:tickLblPos val="nextTo"/>
+        <c:spPr>
+          <a:noFill/>
+          <a:ln>
+            <a:noFill/>
+          </a:ln>
+          <a:effectLst/>
+        </c:spPr>
+        <c:txPr>
+          <a:bodyPr rot="-60000000" spcFirstLastPara="1" vertOverflow="ellipsis" vert="horz" wrap="square" anchor="ctr" anchorCtr="1"/>
+          <a:lstStyle/>
+          <a:p>
+            <a:pPr>
+              <a:defRPr sz="1197" b="0" i="0" u="none" strike="noStrike" kern="1200" baseline="0">
+                <a:solidFill>
+                  <a:schemeClr val="tx1">
+                    <a:lumMod val="65000"/>
+                    <a:lumOff val="35000"/>
+                  </a:schemeClr>
+                </a:solidFill>
+                <a:latin typeface="+mn-lt"/>
+                <a:ea typeface="+mn-ea"/>
+                <a:cs typeface="+mn-cs"/>
+              </a:defRPr>
+            </a:pPr>
+            <a:endParaRPr lang="es-AR"/>
+          </a:p>
+        </c:txPr>
+        <c:crossAx val="443323960"/>
+        <c:crosses val="autoZero"/>
+        <c:crossBetween val="between"/>
+      </c:valAx>
+      <c:spPr>
+        <a:noFill/>
+        <a:ln>
+          <a:noFill/>
+        </a:ln>
+        <a:effectLst/>
+      </c:spPr>
+    </c:plotArea>
+    <c:legend>
+      <c:legendPos val="b"/>
+      <c:layout/>
+      <c:overlay val="0"/>
+      <c:spPr>
+        <a:noFill/>
+        <a:ln>
+          <a:noFill/>
+        </a:ln>
+        <a:effectLst/>
+      </c:spPr>
+      <c:txPr>
+        <a:bodyPr rot="0" spcFirstLastPara="1" vertOverflow="ellipsis" vert="horz" wrap="square" anchor="ctr" anchorCtr="1"/>
+        <a:lstStyle/>
+        <a:p>
+          <a:pPr>
+            <a:defRPr sz="1197" b="0" i="0" u="none" strike="noStrike" kern="1200" baseline="0">
+              <a:solidFill>
+                <a:schemeClr val="tx1">
+                  <a:lumMod val="65000"/>
+                  <a:lumOff val="35000"/>
+                </a:schemeClr>
+              </a:solidFill>
+              <a:latin typeface="+mn-lt"/>
+              <a:ea typeface="+mn-ea"/>
+              <a:cs typeface="+mn-cs"/>
+            </a:defRPr>
+          </a:pPr>
+          <a:endParaRPr lang="es-AR"/>
+        </a:p>
+      </c:txPr>
+    </c:legend>
+    <c:plotVisOnly val="1"/>
+    <c:dispBlanksAs val="gap"/>
+    <c:showDLblsOverMax val="0"/>
+  </c:chart>
+  <c:spPr>
+    <a:noFill/>
+    <a:ln>
+      <a:noFill/>
+    </a:ln>
+    <a:effectLst/>
+  </c:spPr>
+  <c:txPr>
+    <a:bodyPr/>
+    <a:lstStyle/>
+    <a:p>
+      <a:pPr>
+        <a:defRPr/>
+      </a:pPr>
+      <a:endParaRPr lang="es-AR"/>
+    </a:p>
+  </c:txPr>
+  <c:externalData r:id="rId3">
+    <c:autoUpdate val="0"/>
+  </c:externalData>
+</c:chartSpace>
+</file>
+
+<file path=ppt/charts/colors1.xml><?xml version="1.0" encoding="utf-8"?>
+<cs:colorStyle xmlns:cs="http://schemas.microsoft.com/office/drawing/2012/chartStyle" xmlns:a="http://schemas.openxmlformats.org/drawingml/2006/main" meth="cycle" id="10">
+  <a:schemeClr val="accent1"/>
+  <a:schemeClr val="accent2"/>
+  <a:schemeClr val="accent3"/>
+  <a:schemeClr val="accent4"/>
+  <a:schemeClr val="accent5"/>
+  <a:schemeClr val="accent6"/>
+  <cs:variation/>
+  <cs:variation>
+    <a:lumMod val="60000"/>
+  </cs:variation>
+  <cs:variation>
+    <a:lumMod val="80000"/>
+    <a:lumOff val="20000"/>
+  </cs:variation>
+  <cs:variation>
+    <a:lumMod val="80000"/>
+  </cs:variation>
+  <cs:variation>
+    <a:lumMod val="60000"/>
+    <a:lumOff val="40000"/>
+  </cs:variation>
+  <cs:variation>
+    <a:lumMod val="50000"/>
+  </cs:variation>
+  <cs:variation>
+    <a:lumMod val="70000"/>
+    <a:lumOff val="30000"/>
+  </cs:variation>
+  <cs:variation>
+    <a:lumMod val="70000"/>
+  </cs:variation>
+  <cs:variation>
+    <a:lumMod val="50000"/>
+    <a:lumOff val="50000"/>
+  </cs:variation>
+</cs:colorStyle>
+</file>
+
+<file path=ppt/charts/style1.xml><?xml version="1.0" encoding="utf-8"?>
+<cs:chartStyle xmlns:cs="http://schemas.microsoft.com/office/drawing/2012/chartStyle" xmlns:a="http://schemas.openxmlformats.org/drawingml/2006/main" id="201">
+  <cs:axisTitle>
+    <cs:lnRef idx="0"/>
+    <cs:fillRef idx="0"/>
+    <cs:effectRef idx="0"/>
+    <cs:fontRef idx="minor">
+      <a:schemeClr val="tx1">
+        <a:lumMod val="65000"/>
+        <a:lumOff val="35000"/>
+      </a:schemeClr>
+    </cs:fontRef>
+    <cs:defRPr sz="1330" kern="1200"/>
+  </cs:axisTitle>
+  <cs:categoryAxis>
+    <cs:lnRef idx="0"/>
+    <cs:fillRef idx="0"/>
+    <cs:effectRef idx="0"/>
+    <cs:fontRef idx="minor">
+      <a:schemeClr val="tx1">
+        <a:lumMod val="65000"/>
+        <a:lumOff val="35000"/>
+      </a:schemeClr>
+    </cs:fontRef>
+    <cs:spPr>
+      <a:ln w="9525" cap="flat" cmpd="sng" algn="ctr">
+        <a:solidFill>
+          <a:schemeClr val="tx1">
+            <a:lumMod val="15000"/>
+            <a:lumOff val="85000"/>
+          </a:schemeClr>
+        </a:solidFill>
+        <a:round/>
+      </a:ln>
+    </cs:spPr>
+    <cs:defRPr sz="1197" kern="1200"/>
+  </cs:categoryAxis>
+  <cs:chartArea mods="allowNoFillOverride allowNoLineOverride">
+    <cs:lnRef idx="0"/>
+    <cs:fillRef idx="0"/>
+    <cs:effectRef idx="0"/>
+    <cs:fontRef idx="minor">
+      <a:schemeClr val="tx1"/>
+    </cs:fontRef>
+    <cs:spPr>
+      <a:solidFill>
+        <a:schemeClr val="bg1"/>
+      </a:solidFill>
+      <a:ln w="9525" cap="flat" cmpd="sng" algn="ctr">
+        <a:solidFill>
+          <a:schemeClr val="tx1">
+            <a:lumMod val="15000"/>
+            <a:lumOff val="85000"/>
+          </a:schemeClr>
+        </a:solidFill>
+        <a:round/>
+      </a:ln>
+    </cs:spPr>
+    <cs:defRPr sz="1330" kern="1200"/>
+  </cs:chartArea>
+  <cs:dataLabel>
+    <cs:lnRef idx="0"/>
+    <cs:fillRef idx="0"/>
+    <cs:effectRef idx="0"/>
+    <cs:fontRef idx="minor">
+      <a:schemeClr val="tx1">
+        <a:lumMod val="75000"/>
+        <a:lumOff val="25000"/>
+      </a:schemeClr>
+    </cs:fontRef>
+    <cs:defRPr sz="1197" kern="1200"/>
+  </cs:dataLabel>
+  <cs:dataLabelCallout>
+    <cs:lnRef idx="0"/>
+    <cs:fillRef idx="0"/>
+    <cs:effectRef idx="0"/>
+    <cs:fontRef idx="minor">
+      <a:schemeClr val="dk1">
+        <a:lumMod val="65000"/>
+        <a:lumOff val="35000"/>
+      </a:schemeClr>
+    </cs:fontRef>
+    <cs:spPr>
+      <a:solidFill>
+        <a:schemeClr val="lt1"/>
+      </a:solidFill>
+      <a:ln>
+        <a:solidFill>
+          <a:schemeClr val="dk1">
+            <a:lumMod val="25000"/>
+            <a:lumOff val="75000"/>
+          </a:schemeClr>
+        </a:solidFill>
+      </a:ln>
+    </cs:spPr>
+    <cs:defRPr sz="1197" kern="1200"/>
+    <cs:bodyPr rot="0" spcFirstLastPara="1" vertOverflow="clip" horzOverflow="clip" vert="horz" wrap="square" lIns="36576" tIns="18288" rIns="36576" bIns="18288" anchor="ctr" anchorCtr="1">
+      <a:spAutoFit/>
+    </cs:bodyPr>
+  </cs:dataLabelCallout>
+  <cs:dataPoint>
+    <cs:lnRef idx="0"/>
+    <cs:fillRef idx="1">
+      <cs:styleClr val="auto"/>
+    </cs:fillRef>
+    <cs:effectRef idx="0"/>
+    <cs:fontRef idx="minor">
+      <a:schemeClr val="tx1"/>
+    </cs:fontRef>
+  </cs:dataPoint>
+  <cs:dataPoint3D>
+    <cs:lnRef idx="0"/>
+    <cs:fillRef idx="1">
+      <cs:styleClr val="auto"/>
+    </cs:fillRef>
+    <cs:effectRef idx="0"/>
+    <cs:fontRef idx="minor">
+      <a:schemeClr val="tx1"/>
+    </cs:fontRef>
+  </cs:dataPoint3D>
+  <cs:dataPointLine>
+    <cs:lnRef idx="0">
+      <cs:styleClr val="auto"/>
+    </cs:lnRef>
+    <cs:fillRef idx="1"/>
+    <cs:effectRef idx="0"/>
+    <cs:fontRef idx="minor">
+      <a:schemeClr val="tx1"/>
+    </cs:fontRef>
+    <cs:spPr>
+      <a:ln w="28575" cap="rnd">
+        <a:solidFill>
+          <a:schemeClr val="phClr"/>
+        </a:solidFill>
+        <a:round/>
+      </a:ln>
+    </cs:spPr>
+  </cs:dataPointLine>
+  <cs:dataPointMarker>
+    <cs:lnRef idx="0">
+      <cs:styleClr val="auto"/>
+    </cs:lnRef>
+    <cs:fillRef idx="1">
+      <cs:styleClr val="auto"/>
+    </cs:fillRef>
+    <cs:effectRef idx="0"/>
+    <cs:fontRef idx="minor">
+      <a:schemeClr val="tx1"/>
+    </cs:fontRef>
+    <cs:spPr>
+      <a:ln w="9525">
+        <a:solidFill>
+          <a:schemeClr val="phClr"/>
+        </a:solidFill>
+      </a:ln>
+    </cs:spPr>
+  </cs:dataPointMarker>
+  <cs:dataPointMarkerLayout symbol="circle" size="5"/>
+  <cs:dataPointWireframe>
+    <cs:lnRef idx="0">
+      <cs:styleClr val="auto"/>
+    </cs:lnRef>
+    <cs:fillRef idx="1"/>
+    <cs:effectRef idx="0"/>
+    <cs:fontRef idx="minor">
+      <a:schemeClr val="tx1"/>
+    </cs:fontRef>
+    <cs:spPr>
+      <a:ln w="9525" cap="rnd">
+        <a:solidFill>
+          <a:schemeClr val="phClr"/>
+        </a:solidFill>
+        <a:round/>
+      </a:ln>
+    </cs:spPr>
+  </cs:dataPointWireframe>
+  <cs:dataTable>
+    <cs:lnRef idx="0"/>
+    <cs:fillRef idx="0"/>
+    <cs:effectRef idx="0"/>
+    <cs:fontRef idx="minor">
+      <a:schemeClr val="tx1">
+        <a:lumMod val="65000"/>
+        <a:lumOff val="35000"/>
+      </a:schemeClr>
+    </cs:fontRef>
+    <cs:spPr>
+      <a:noFill/>
+      <a:ln w="9525" cap="flat" cmpd="sng" algn="ctr">
+        <a:solidFill>
+          <a:schemeClr val="tx1">
+            <a:lumMod val="15000"/>
+            <a:lumOff val="85000"/>
+          </a:schemeClr>
+        </a:solidFill>
+        <a:round/>
+      </a:ln>
+    </cs:spPr>
+    <cs:defRPr sz="1197" kern="1200"/>
+  </cs:dataTable>
+  <cs:downBar>
+    <cs:lnRef idx="0"/>
+    <cs:fillRef idx="0"/>
+    <cs:effectRef idx="0"/>
+    <cs:fontRef idx="minor">
+      <a:schemeClr val="dk1"/>
+    </cs:fontRef>
+    <cs:spPr>
+      <a:solidFill>
+        <a:schemeClr val="dk1">
+          <a:lumMod val="65000"/>
+          <a:lumOff val="35000"/>
+        </a:schemeClr>
+      </a:solidFill>
+      <a:ln w="9525">
+        <a:solidFill>
+          <a:schemeClr val="tx1">
+            <a:lumMod val="65000"/>
+            <a:lumOff val="35000"/>
+          </a:schemeClr>
+        </a:solidFill>
+      </a:ln>
+    </cs:spPr>
+  </cs:downBar>
+  <cs:dropLine>
+    <cs:lnRef idx="0"/>
+    <cs:fillRef idx="0"/>
+    <cs:effectRef idx="0"/>
+    <cs:fontRef idx="minor">
+      <a:schemeClr val="tx1"/>
+    </cs:fontRef>
+    <cs:spPr>
+      <a:ln w="9525" cap="flat" cmpd="sng" algn="ctr">
+        <a:solidFill>
+          <a:schemeClr val="tx1">
+            <a:lumMod val="35000"/>
+            <a:lumOff val="65000"/>
+          </a:schemeClr>
+        </a:solidFill>
+        <a:round/>
+      </a:ln>
+    </cs:spPr>
+  </cs:dropLine>
+  <cs:errorBar>
+    <cs:lnRef idx="0"/>
+    <cs:fillRef idx="0"/>
+    <cs:effectRef idx="0"/>
+    <cs:fontRef idx="minor">
+      <a:schemeClr val="tx1"/>
+    </cs:fontRef>
+    <cs:spPr>
+      <a:ln w="9525" cap="flat" cmpd="sng" algn="ctr">
+        <a:solidFill>
+          <a:schemeClr val="tx1">
+            <a:lumMod val="65000"/>
+            <a:lumOff val="35000"/>
+          </a:schemeClr>
+        </a:solidFill>
+        <a:round/>
+      </a:ln>
+    </cs:spPr>
+  </cs:errorBar>
+  <cs:floor>
+    <cs:lnRef idx="0"/>
+    <cs:fillRef idx="0"/>
+    <cs:effectRef idx="0"/>
+    <cs:fontRef idx="minor">
+      <a:schemeClr val="tx1"/>
+    </cs:fontRef>
+    <cs:spPr>
+      <a:noFill/>
+      <a:ln>
+        <a:noFill/>
+      </a:ln>
+    </cs:spPr>
+  </cs:floor>
+  <cs:gridlineMajor>
+    <cs:lnRef idx="0"/>
+    <cs:fillRef idx="0"/>
+    <cs:effectRef idx="0"/>
+    <cs:fontRef idx="minor">
+      <a:schemeClr val="tx1"/>
+    </cs:fontRef>
+    <cs:spPr>
+      <a:ln w="9525" cap="flat" cmpd="sng" algn="ctr">
+        <a:solidFill>
+          <a:schemeClr val="tx1">
+            <a:lumMod val="15000"/>
+            <a:lumOff val="85000"/>
+          </a:schemeClr>
+        </a:solidFill>
+        <a:round/>
+      </a:ln>
+    </cs:spPr>
+  </cs:gridlineMajor>
+  <cs:gridlineMinor>
+    <cs:lnRef idx="0"/>
+    <cs:fillRef idx="0"/>
+    <cs:effectRef idx="0"/>
+    <cs:fontRef idx="minor">
+      <a:schemeClr val="tx1"/>
+    </cs:fontRef>
+    <cs:spPr>
+      <a:ln w="9525" cap="flat" cmpd="sng" algn="ctr">
+        <a:solidFill>
+          <a:schemeClr val="tx1">
+            <a:lumMod val="5000"/>
+            <a:lumOff val="95000"/>
+          </a:schemeClr>
+        </a:solidFill>
+        <a:round/>
+      </a:ln>
+    </cs:spPr>
+  </cs:gridlineMinor>
+  <cs:hiLoLine>
+    <cs:lnRef idx="0"/>
+    <cs:fillRef idx="0"/>
+    <cs:effectRef idx="0"/>
+    <cs:fontRef idx="minor">
+      <a:schemeClr val="tx1"/>
+    </cs:fontRef>
+    <cs:spPr>
+      <a:ln w="9525" cap="flat" cmpd="sng" algn="ctr">
+        <a:solidFill>
+          <a:schemeClr val="tx1">
+            <a:lumMod val="75000"/>
+            <a:lumOff val="25000"/>
+          </a:schemeClr>
+        </a:solidFill>
+        <a:round/>
+      </a:ln>
+    </cs:spPr>
+  </cs:hiLoLine>
+  <cs:leaderLine>
+    <cs:lnRef idx="0"/>
+    <cs:fillRef idx="0"/>
+    <cs:effectRef idx="0"/>
+    <cs:fontRef idx="minor">
+      <a:schemeClr val="tx1"/>
+    </cs:fontRef>
+    <cs:spPr>
+      <a:ln w="9525" cap="flat" cmpd="sng" algn="ctr">
+        <a:solidFill>
+          <a:schemeClr val="tx1">
+            <a:lumMod val="35000"/>
+            <a:lumOff val="65000"/>
+          </a:schemeClr>
+        </a:solidFill>
+        <a:round/>
+      </a:ln>
+    </cs:spPr>
+  </cs:leaderLine>
+  <cs:legend>
+    <cs:lnRef idx="0"/>
+    <cs:fillRef idx="0"/>
+    <cs:effectRef idx="0"/>
+    <cs:fontRef idx="minor">
+      <a:schemeClr val="tx1">
+        <a:lumMod val="65000"/>
+        <a:lumOff val="35000"/>
+      </a:schemeClr>
+    </cs:fontRef>
+    <cs:defRPr sz="1197" kern="1200"/>
+  </cs:legend>
+  <cs:plotArea mods="allowNoFillOverride allowNoLineOverride">
+    <cs:lnRef idx="0"/>
+    <cs:fillRef idx="0"/>
+    <cs:effectRef idx="0"/>
+    <cs:fontRef idx="minor">
+      <a:schemeClr val="tx1"/>
+    </cs:fontRef>
+  </cs:plotArea>
+  <cs:plotArea3D mods="allowNoFillOverride allowNoLineOverride">
+    <cs:lnRef idx="0"/>
+    <cs:fillRef idx="0"/>
+    <cs:effectRef idx="0"/>
+    <cs:fontRef idx="minor">
+      <a:schemeClr val="tx1"/>
+    </cs:fontRef>
+  </cs:plotArea3D>
+  <cs:seriesAxis>
+    <cs:lnRef idx="0"/>
+    <cs:fillRef idx="0"/>
+    <cs:effectRef idx="0"/>
+    <cs:fontRef idx="minor">
+      <a:schemeClr val="tx1">
+        <a:lumMod val="65000"/>
+        <a:lumOff val="35000"/>
+      </a:schemeClr>
+    </cs:fontRef>
+    <cs:defRPr sz="1197" kern="1200"/>
+  </cs:seriesAxis>
+  <cs:seriesLine>
+    <cs:lnRef idx="0"/>
+    <cs:fillRef idx="0"/>
+    <cs:effectRef idx="0"/>
+    <cs:fontRef idx="minor">
+      <a:schemeClr val="tx1"/>
+    </cs:fontRef>
+    <cs:spPr>
+      <a:ln w="9525" cap="flat" cmpd="sng" algn="ctr">
+        <a:solidFill>
+          <a:schemeClr val="tx1">
+            <a:lumMod val="35000"/>
+            <a:lumOff val="65000"/>
+          </a:schemeClr>
+        </a:solidFill>
+        <a:round/>
+      </a:ln>
+    </cs:spPr>
+  </cs:seriesLine>
+  <cs:title>
+    <cs:lnRef idx="0"/>
+    <cs:fillRef idx="0"/>
+    <cs:effectRef idx="0"/>
+    <cs:fontRef idx="minor">
+      <a:schemeClr val="tx1">
+        <a:lumMod val="65000"/>
+        <a:lumOff val="35000"/>
+      </a:schemeClr>
+    </cs:fontRef>
+    <cs:defRPr sz="1862" b="0" kern="1200" spc="0" baseline="0"/>
+  </cs:title>
+  <cs:trendline>
+    <cs:lnRef idx="0">
+      <cs:styleClr val="auto"/>
+    </cs:lnRef>
+    <cs:fillRef idx="0"/>
+    <cs:effectRef idx="0"/>
+    <cs:fontRef idx="minor">
+      <a:schemeClr val="tx1"/>
+    </cs:fontRef>
+    <cs:spPr>
+      <a:ln w="19050" cap="rnd">
+        <a:solidFill>
+          <a:schemeClr val="phClr"/>
+        </a:solidFill>
+        <a:prstDash val="sysDot"/>
+      </a:ln>
+    </cs:spPr>
+  </cs:trendline>
+  <cs:trendlineLabel>
+    <cs:lnRef idx="0"/>
+    <cs:fillRef idx="0"/>
+    <cs:effectRef idx="0"/>
+    <cs:fontRef idx="minor">
+      <a:schemeClr val="tx1">
+        <a:lumMod val="65000"/>
+        <a:lumOff val="35000"/>
+      </a:schemeClr>
+    </cs:fontRef>
+    <cs:defRPr sz="1197" kern="1200"/>
+  </cs:trendlineLabel>
+  <cs:upBar>
+    <cs:lnRef idx="0"/>
+    <cs:fillRef idx="0"/>
+    <cs:effectRef idx="0"/>
+    <cs:fontRef idx="minor">
+      <a:schemeClr val="dk1"/>
+    </cs:fontRef>
+    <cs:spPr>
+      <a:solidFill>
+        <a:schemeClr val="lt1"/>
+      </a:solidFill>
+      <a:ln w="9525">
+        <a:solidFill>
+          <a:schemeClr val="tx1">
+            <a:lumMod val="15000"/>
+            <a:lumOff val="85000"/>
+          </a:schemeClr>
+        </a:solidFill>
+      </a:ln>
+    </cs:spPr>
+  </cs:upBar>
+  <cs:valueAxis>
+    <cs:lnRef idx="0"/>
+    <cs:fillRef idx="0"/>
+    <cs:effectRef idx="0"/>
+    <cs:fontRef idx="minor">
+      <a:schemeClr val="tx1">
+        <a:lumMod val="65000"/>
+        <a:lumOff val="35000"/>
+      </a:schemeClr>
+    </cs:fontRef>
+    <cs:defRPr sz="1197" kern="1200"/>
+  </cs:valueAxis>
+  <cs:wall>
+    <cs:lnRef idx="0"/>
+    <cs:fillRef idx="0"/>
+    <cs:effectRef idx="0"/>
+    <cs:fontRef idx="minor">
+      <a:schemeClr val="tx1"/>
+    </cs:fontRef>
+    <cs:spPr>
+      <a:noFill/>
+      <a:ln>
+        <a:noFill/>
+      </a:ln>
+    </cs:spPr>
+  </cs:wall>
+</cs:chartStyle>
 </file>
 
 <file path=ppt/notesMasters/notesMaster1.xml><?xml version="1.0" encoding="utf-8"?>
@@ -997,7 +2165,7 @@
     </p:spTree>
     <p:extLst>
       <p:ext uri="{BB962C8B-B14F-4D97-AF65-F5344CB8AC3E}">
-        <p14:creationId xmlns:p14="http://schemas.microsoft.com/office/powerpoint/2010/main" val="429107246"/>
+        <p14:creationId xmlns:p14="http://schemas.microsoft.com/office/powerpoint/2010/main" val="2404593751"/>
       </p:ext>
     </p:extLst>
   </p:cSld>
@@ -1029,7 +2197,7 @@
           <p:cNvPr id="2" name="Title 1">
             <a:extLst>
               <a:ext uri="{FF2B5EF4-FFF2-40B4-BE49-F238E27FC236}">
-                <a16:creationId xmlns:a16="http://schemas.microsoft.com/office/drawing/2014/main" xmlns="" id="{DE0391AB-F383-4237-A071-AD1C6E9246D2}"/>
+                <a16:creationId xmlns="" xmlns:a16="http://schemas.microsoft.com/office/drawing/2014/main" id="{DE0391AB-F383-4237-A071-AD1C6E9246D2}"/>
               </a:ext>
             </a:extLst>
           </p:cNvPr>
@@ -1067,7 +2235,7 @@
           <p:cNvPr id="3" name="Subtitle 2">
             <a:extLst>
               <a:ext uri="{FF2B5EF4-FFF2-40B4-BE49-F238E27FC236}">
-                <a16:creationId xmlns:a16="http://schemas.microsoft.com/office/drawing/2014/main" xmlns="" id="{7F6636DA-4FDE-4B32-8CCE-37EFA3E75799}"/>
+                <a16:creationId xmlns="" xmlns:a16="http://schemas.microsoft.com/office/drawing/2014/main" id="{7F6636DA-4FDE-4B32-8CCE-37EFA3E75799}"/>
               </a:ext>
             </a:extLst>
           </p:cNvPr>
@@ -1138,7 +2306,7 @@
           <p:cNvPr id="4" name="Date Placeholder 3">
             <a:extLst>
               <a:ext uri="{FF2B5EF4-FFF2-40B4-BE49-F238E27FC236}">
-                <a16:creationId xmlns:a16="http://schemas.microsoft.com/office/drawing/2014/main" xmlns="" id="{30F87932-8FF0-4DF1-A776-9A3CE37618A7}"/>
+                <a16:creationId xmlns="" xmlns:a16="http://schemas.microsoft.com/office/drawing/2014/main" id="{30F87932-8FF0-4DF1-A776-9A3CE37618A7}"/>
               </a:ext>
             </a:extLst>
           </p:cNvPr>
@@ -1167,7 +2335,7 @@
           <p:cNvPr id="5" name="Footer Placeholder 4">
             <a:extLst>
               <a:ext uri="{FF2B5EF4-FFF2-40B4-BE49-F238E27FC236}">
-                <a16:creationId xmlns:a16="http://schemas.microsoft.com/office/drawing/2014/main" xmlns="" id="{5F38FAB8-C9F1-4DBB-B355-D8DEE370657B}"/>
+                <a16:creationId xmlns="" xmlns:a16="http://schemas.microsoft.com/office/drawing/2014/main" id="{5F38FAB8-C9F1-4DBB-B355-D8DEE370657B}"/>
               </a:ext>
             </a:extLst>
           </p:cNvPr>
@@ -1192,7 +2360,7 @@
           <p:cNvPr id="6" name="Slide Number Placeholder 5">
             <a:extLst>
               <a:ext uri="{FF2B5EF4-FFF2-40B4-BE49-F238E27FC236}">
-                <a16:creationId xmlns:a16="http://schemas.microsoft.com/office/drawing/2014/main" xmlns="" id="{F24490E3-D8E8-4766-9104-14009BF5636F}"/>
+                <a16:creationId xmlns="" xmlns:a16="http://schemas.microsoft.com/office/drawing/2014/main" id="{F24490E3-D8E8-4766-9104-14009BF5636F}"/>
               </a:ext>
             </a:extLst>
           </p:cNvPr>
@@ -1251,7 +2419,7 @@
           <p:cNvPr id="2" name="Title 1">
             <a:extLst>
               <a:ext uri="{FF2B5EF4-FFF2-40B4-BE49-F238E27FC236}">
-                <a16:creationId xmlns:a16="http://schemas.microsoft.com/office/drawing/2014/main" xmlns="" id="{303B8678-553E-4A5B-8CFE-5DB358BDF358}"/>
+                <a16:creationId xmlns="" xmlns:a16="http://schemas.microsoft.com/office/drawing/2014/main" id="{303B8678-553E-4A5B-8CFE-5DB358BDF358}"/>
               </a:ext>
             </a:extLst>
           </p:cNvPr>
@@ -1280,7 +2448,7 @@
           <p:cNvPr id="3" name="Vertical Text Placeholder 2">
             <a:extLst>
               <a:ext uri="{FF2B5EF4-FFF2-40B4-BE49-F238E27FC236}">
-                <a16:creationId xmlns:a16="http://schemas.microsoft.com/office/drawing/2014/main" xmlns="" id="{E43AF303-1F73-4575-83E6-561589F1632E}"/>
+                <a16:creationId xmlns="" xmlns:a16="http://schemas.microsoft.com/office/drawing/2014/main" id="{E43AF303-1F73-4575-83E6-561589F1632E}"/>
               </a:ext>
             </a:extLst>
           </p:cNvPr>
@@ -1338,7 +2506,7 @@
           <p:cNvPr id="4" name="Date Placeholder 3">
             <a:extLst>
               <a:ext uri="{FF2B5EF4-FFF2-40B4-BE49-F238E27FC236}">
-                <a16:creationId xmlns:a16="http://schemas.microsoft.com/office/drawing/2014/main" xmlns="" id="{2436EC56-7DCF-400D-A871-C26291EB10AD}"/>
+                <a16:creationId xmlns="" xmlns:a16="http://schemas.microsoft.com/office/drawing/2014/main" id="{2436EC56-7DCF-400D-A871-C26291EB10AD}"/>
               </a:ext>
             </a:extLst>
           </p:cNvPr>
@@ -1367,7 +2535,7 @@
           <p:cNvPr id="5" name="Footer Placeholder 4">
             <a:extLst>
               <a:ext uri="{FF2B5EF4-FFF2-40B4-BE49-F238E27FC236}">
-                <a16:creationId xmlns:a16="http://schemas.microsoft.com/office/drawing/2014/main" xmlns="" id="{17FFAC5B-7C77-4F8C-ADB0-8D208A2EB303}"/>
+                <a16:creationId xmlns="" xmlns:a16="http://schemas.microsoft.com/office/drawing/2014/main" id="{17FFAC5B-7C77-4F8C-ADB0-8D208A2EB303}"/>
               </a:ext>
             </a:extLst>
           </p:cNvPr>
@@ -1392,7 +2560,7 @@
           <p:cNvPr id="6" name="Slide Number Placeholder 5">
             <a:extLst>
               <a:ext uri="{FF2B5EF4-FFF2-40B4-BE49-F238E27FC236}">
-                <a16:creationId xmlns:a16="http://schemas.microsoft.com/office/drawing/2014/main" xmlns="" id="{BD2F48AF-AB8F-4DD2-BC77-7E2F42AD3B87}"/>
+                <a16:creationId xmlns="" xmlns:a16="http://schemas.microsoft.com/office/drawing/2014/main" id="{BD2F48AF-AB8F-4DD2-BC77-7E2F42AD3B87}"/>
               </a:ext>
             </a:extLst>
           </p:cNvPr>
@@ -1451,7 +2619,7 @@
           <p:cNvPr id="2" name="Vertical Title 1">
             <a:extLst>
               <a:ext uri="{FF2B5EF4-FFF2-40B4-BE49-F238E27FC236}">
-                <a16:creationId xmlns:a16="http://schemas.microsoft.com/office/drawing/2014/main" xmlns="" id="{A20ED820-BFE6-41B5-8064-984037A999A8}"/>
+                <a16:creationId xmlns="" xmlns:a16="http://schemas.microsoft.com/office/drawing/2014/main" id="{A20ED820-BFE6-41B5-8064-984037A999A8}"/>
               </a:ext>
             </a:extLst>
           </p:cNvPr>
@@ -1485,7 +2653,7 @@
           <p:cNvPr id="3" name="Vertical Text Placeholder 2">
             <a:extLst>
               <a:ext uri="{FF2B5EF4-FFF2-40B4-BE49-F238E27FC236}">
-                <a16:creationId xmlns:a16="http://schemas.microsoft.com/office/drawing/2014/main" xmlns="" id="{9CA27FEA-5359-474A-B4F8-FF510DD7489A}"/>
+                <a16:creationId xmlns="" xmlns:a16="http://schemas.microsoft.com/office/drawing/2014/main" id="{9CA27FEA-5359-474A-B4F8-FF510DD7489A}"/>
               </a:ext>
             </a:extLst>
           </p:cNvPr>
@@ -1548,7 +2716,7 @@
           <p:cNvPr id="4" name="Date Placeholder 3">
             <a:extLst>
               <a:ext uri="{FF2B5EF4-FFF2-40B4-BE49-F238E27FC236}">
-                <a16:creationId xmlns:a16="http://schemas.microsoft.com/office/drawing/2014/main" xmlns="" id="{D14DD33D-563C-4B8C-B8C1-625FF5C5B85D}"/>
+                <a16:creationId xmlns="" xmlns:a16="http://schemas.microsoft.com/office/drawing/2014/main" id="{D14DD33D-563C-4B8C-B8C1-625FF5C5B85D}"/>
               </a:ext>
             </a:extLst>
           </p:cNvPr>
@@ -1577,7 +2745,7 @@
           <p:cNvPr id="5" name="Footer Placeholder 4">
             <a:extLst>
               <a:ext uri="{FF2B5EF4-FFF2-40B4-BE49-F238E27FC236}">
-                <a16:creationId xmlns:a16="http://schemas.microsoft.com/office/drawing/2014/main" xmlns="" id="{40471877-89FD-46BE-832F-C5660A5567D2}"/>
+                <a16:creationId xmlns="" xmlns:a16="http://schemas.microsoft.com/office/drawing/2014/main" id="{40471877-89FD-46BE-832F-C5660A5567D2}"/>
               </a:ext>
             </a:extLst>
           </p:cNvPr>
@@ -1602,7 +2770,7 @@
           <p:cNvPr id="6" name="Slide Number Placeholder 5">
             <a:extLst>
               <a:ext uri="{FF2B5EF4-FFF2-40B4-BE49-F238E27FC236}">
-                <a16:creationId xmlns:a16="http://schemas.microsoft.com/office/drawing/2014/main" xmlns="" id="{0E6E675F-CC4D-48CF-90C8-53829EE08B8C}"/>
+                <a16:creationId xmlns="" xmlns:a16="http://schemas.microsoft.com/office/drawing/2014/main" id="{0E6E675F-CC4D-48CF-90C8-53829EE08B8C}"/>
               </a:ext>
             </a:extLst>
           </p:cNvPr>
@@ -1661,7 +2829,7 @@
           <p:cNvPr id="2" name="Title 1">
             <a:extLst>
               <a:ext uri="{FF2B5EF4-FFF2-40B4-BE49-F238E27FC236}">
-                <a16:creationId xmlns:a16="http://schemas.microsoft.com/office/drawing/2014/main" xmlns="" id="{E8CBC967-18DB-4664-9B4D-06177FB946B3}"/>
+                <a16:creationId xmlns="" xmlns:a16="http://schemas.microsoft.com/office/drawing/2014/main" id="{E8CBC967-18DB-4664-9B4D-06177FB946B3}"/>
               </a:ext>
             </a:extLst>
           </p:cNvPr>
@@ -1690,7 +2858,7 @@
           <p:cNvPr id="3" name="Content Placeholder 2">
             <a:extLst>
               <a:ext uri="{FF2B5EF4-FFF2-40B4-BE49-F238E27FC236}">
-                <a16:creationId xmlns:a16="http://schemas.microsoft.com/office/drawing/2014/main" xmlns="" id="{5ADF7174-64B4-4D8F-BF44-3DD1F66CAD00}"/>
+                <a16:creationId xmlns="" xmlns:a16="http://schemas.microsoft.com/office/drawing/2014/main" id="{5ADF7174-64B4-4D8F-BF44-3DD1F66CAD00}"/>
               </a:ext>
             </a:extLst>
           </p:cNvPr>
@@ -1748,7 +2916,7 @@
           <p:cNvPr id="4" name="Date Placeholder 3">
             <a:extLst>
               <a:ext uri="{FF2B5EF4-FFF2-40B4-BE49-F238E27FC236}">
-                <a16:creationId xmlns:a16="http://schemas.microsoft.com/office/drawing/2014/main" xmlns="" id="{55CD83D3-86C4-482F-A2DC-B4C55DBF3F7A}"/>
+                <a16:creationId xmlns="" xmlns:a16="http://schemas.microsoft.com/office/drawing/2014/main" id="{55CD83D3-86C4-482F-A2DC-B4C55DBF3F7A}"/>
               </a:ext>
             </a:extLst>
           </p:cNvPr>
@@ -1777,7 +2945,7 @@
           <p:cNvPr id="5" name="Footer Placeholder 4">
             <a:extLst>
               <a:ext uri="{FF2B5EF4-FFF2-40B4-BE49-F238E27FC236}">
-                <a16:creationId xmlns:a16="http://schemas.microsoft.com/office/drawing/2014/main" xmlns="" id="{DCF05BE2-6C23-4CB4-A63E-457E635BF267}"/>
+                <a16:creationId xmlns="" xmlns:a16="http://schemas.microsoft.com/office/drawing/2014/main" id="{DCF05BE2-6C23-4CB4-A63E-457E635BF267}"/>
               </a:ext>
             </a:extLst>
           </p:cNvPr>
@@ -1802,7 +2970,7 @@
           <p:cNvPr id="6" name="Slide Number Placeholder 5">
             <a:extLst>
               <a:ext uri="{FF2B5EF4-FFF2-40B4-BE49-F238E27FC236}">
-                <a16:creationId xmlns:a16="http://schemas.microsoft.com/office/drawing/2014/main" xmlns="" id="{1C097965-24FE-4C07-BE16-69AE439950EF}"/>
+                <a16:creationId xmlns="" xmlns:a16="http://schemas.microsoft.com/office/drawing/2014/main" id="{1C097965-24FE-4C07-BE16-69AE439950EF}"/>
               </a:ext>
             </a:extLst>
           </p:cNvPr>
@@ -1861,7 +3029,7 @@
           <p:cNvPr id="2" name="Title 1">
             <a:extLst>
               <a:ext uri="{FF2B5EF4-FFF2-40B4-BE49-F238E27FC236}">
-                <a16:creationId xmlns:a16="http://schemas.microsoft.com/office/drawing/2014/main" xmlns="" id="{7233394D-04EF-440C-B08B-114464B315C6}"/>
+                <a16:creationId xmlns="" xmlns:a16="http://schemas.microsoft.com/office/drawing/2014/main" id="{7233394D-04EF-440C-B08B-114464B315C6}"/>
               </a:ext>
             </a:extLst>
           </p:cNvPr>
@@ -1899,7 +3067,7 @@
           <p:cNvPr id="3" name="Text Placeholder 2">
             <a:extLst>
               <a:ext uri="{FF2B5EF4-FFF2-40B4-BE49-F238E27FC236}">
-                <a16:creationId xmlns:a16="http://schemas.microsoft.com/office/drawing/2014/main" xmlns="" id="{BBEBE3F6-F021-4D6B-8B0D-EF74D7461F93}"/>
+                <a16:creationId xmlns="" xmlns:a16="http://schemas.microsoft.com/office/drawing/2014/main" id="{BBEBE3F6-F021-4D6B-8B0D-EF74D7461F93}"/>
               </a:ext>
             </a:extLst>
           </p:cNvPr>
@@ -2024,7 +3192,7 @@
           <p:cNvPr id="4" name="Date Placeholder 3">
             <a:extLst>
               <a:ext uri="{FF2B5EF4-FFF2-40B4-BE49-F238E27FC236}">
-                <a16:creationId xmlns:a16="http://schemas.microsoft.com/office/drawing/2014/main" xmlns="" id="{B196233C-6806-4593-91C0-CF4ECD84A601}"/>
+                <a16:creationId xmlns="" xmlns:a16="http://schemas.microsoft.com/office/drawing/2014/main" id="{B196233C-6806-4593-91C0-CF4ECD84A601}"/>
               </a:ext>
             </a:extLst>
           </p:cNvPr>
@@ -2053,7 +3221,7 @@
           <p:cNvPr id="5" name="Footer Placeholder 4">
             <a:extLst>
               <a:ext uri="{FF2B5EF4-FFF2-40B4-BE49-F238E27FC236}">
-                <a16:creationId xmlns:a16="http://schemas.microsoft.com/office/drawing/2014/main" xmlns="" id="{963A761E-2D3A-4397-A82C-2F3B981DE045}"/>
+                <a16:creationId xmlns="" xmlns:a16="http://schemas.microsoft.com/office/drawing/2014/main" id="{963A761E-2D3A-4397-A82C-2F3B981DE045}"/>
               </a:ext>
             </a:extLst>
           </p:cNvPr>
@@ -2078,7 +3246,7 @@
           <p:cNvPr id="6" name="Slide Number Placeholder 5">
             <a:extLst>
               <a:ext uri="{FF2B5EF4-FFF2-40B4-BE49-F238E27FC236}">
-                <a16:creationId xmlns:a16="http://schemas.microsoft.com/office/drawing/2014/main" xmlns="" id="{68297E71-B59F-4260-B01B-2B7CEB0896BD}"/>
+                <a16:creationId xmlns="" xmlns:a16="http://schemas.microsoft.com/office/drawing/2014/main" id="{68297E71-B59F-4260-B01B-2B7CEB0896BD}"/>
               </a:ext>
             </a:extLst>
           </p:cNvPr>
@@ -2137,7 +3305,7 @@
           <p:cNvPr id="2" name="Title 1">
             <a:extLst>
               <a:ext uri="{FF2B5EF4-FFF2-40B4-BE49-F238E27FC236}">
-                <a16:creationId xmlns:a16="http://schemas.microsoft.com/office/drawing/2014/main" xmlns="" id="{5C94DFCB-DD40-4637-9CAB-2BAF24231C79}"/>
+                <a16:creationId xmlns="" xmlns:a16="http://schemas.microsoft.com/office/drawing/2014/main" id="{5C94DFCB-DD40-4637-9CAB-2BAF24231C79}"/>
               </a:ext>
             </a:extLst>
           </p:cNvPr>
@@ -2166,7 +3334,7 @@
           <p:cNvPr id="3" name="Content Placeholder 2">
             <a:extLst>
               <a:ext uri="{FF2B5EF4-FFF2-40B4-BE49-F238E27FC236}">
-                <a16:creationId xmlns:a16="http://schemas.microsoft.com/office/drawing/2014/main" xmlns="" id="{5394065F-4B44-4622-98EE-166F936489F5}"/>
+                <a16:creationId xmlns="" xmlns:a16="http://schemas.microsoft.com/office/drawing/2014/main" id="{5394065F-4B44-4622-98EE-166F936489F5}"/>
               </a:ext>
             </a:extLst>
           </p:cNvPr>
@@ -2229,7 +3397,7 @@
           <p:cNvPr id="4" name="Content Placeholder 3">
             <a:extLst>
               <a:ext uri="{FF2B5EF4-FFF2-40B4-BE49-F238E27FC236}">
-                <a16:creationId xmlns:a16="http://schemas.microsoft.com/office/drawing/2014/main" xmlns="" id="{67AF1249-B890-4466-9E24-84A24907008B}"/>
+                <a16:creationId xmlns="" xmlns:a16="http://schemas.microsoft.com/office/drawing/2014/main" id="{67AF1249-B890-4466-9E24-84A24907008B}"/>
               </a:ext>
             </a:extLst>
           </p:cNvPr>
@@ -2292,7 +3460,7 @@
           <p:cNvPr id="5" name="Date Placeholder 4">
             <a:extLst>
               <a:ext uri="{FF2B5EF4-FFF2-40B4-BE49-F238E27FC236}">
-                <a16:creationId xmlns:a16="http://schemas.microsoft.com/office/drawing/2014/main" xmlns="" id="{850FA9B4-D282-452F-B78A-FF5873ACF45A}"/>
+                <a16:creationId xmlns="" xmlns:a16="http://schemas.microsoft.com/office/drawing/2014/main" id="{850FA9B4-D282-452F-B78A-FF5873ACF45A}"/>
               </a:ext>
             </a:extLst>
           </p:cNvPr>
@@ -2321,7 +3489,7 @@
           <p:cNvPr id="6" name="Footer Placeholder 5">
             <a:extLst>
               <a:ext uri="{FF2B5EF4-FFF2-40B4-BE49-F238E27FC236}">
-                <a16:creationId xmlns:a16="http://schemas.microsoft.com/office/drawing/2014/main" xmlns="" id="{6E9B0F13-A139-4B66-9544-16480800F680}"/>
+                <a16:creationId xmlns="" xmlns:a16="http://schemas.microsoft.com/office/drawing/2014/main" id="{6E9B0F13-A139-4B66-9544-16480800F680}"/>
               </a:ext>
             </a:extLst>
           </p:cNvPr>
@@ -2346,7 +3514,7 @@
           <p:cNvPr id="7" name="Slide Number Placeholder 6">
             <a:extLst>
               <a:ext uri="{FF2B5EF4-FFF2-40B4-BE49-F238E27FC236}">
-                <a16:creationId xmlns:a16="http://schemas.microsoft.com/office/drawing/2014/main" xmlns="" id="{7B8791D0-EC30-4D8C-8764-475D8DB34F19}"/>
+                <a16:creationId xmlns="" xmlns:a16="http://schemas.microsoft.com/office/drawing/2014/main" id="{7B8791D0-EC30-4D8C-8764-475D8DB34F19}"/>
               </a:ext>
             </a:extLst>
           </p:cNvPr>
@@ -2405,7 +3573,7 @@
           <p:cNvPr id="2" name="Title 1">
             <a:extLst>
               <a:ext uri="{FF2B5EF4-FFF2-40B4-BE49-F238E27FC236}">
-                <a16:creationId xmlns:a16="http://schemas.microsoft.com/office/drawing/2014/main" xmlns="" id="{4133AA7D-15D2-4D5F-B1C4-501073416DE8}"/>
+                <a16:creationId xmlns="" xmlns:a16="http://schemas.microsoft.com/office/drawing/2014/main" id="{4133AA7D-15D2-4D5F-B1C4-501073416DE8}"/>
               </a:ext>
             </a:extLst>
           </p:cNvPr>
@@ -2439,7 +3607,7 @@
           <p:cNvPr id="3" name="Text Placeholder 2">
             <a:extLst>
               <a:ext uri="{FF2B5EF4-FFF2-40B4-BE49-F238E27FC236}">
-                <a16:creationId xmlns:a16="http://schemas.microsoft.com/office/drawing/2014/main" xmlns="" id="{65E80A0E-25B9-4E8E-8B0D-201E1C564096}"/>
+                <a16:creationId xmlns="" xmlns:a16="http://schemas.microsoft.com/office/drawing/2014/main" id="{65E80A0E-25B9-4E8E-8B0D-201E1C564096}"/>
               </a:ext>
             </a:extLst>
           </p:cNvPr>
@@ -2510,7 +3678,7 @@
           <p:cNvPr id="4" name="Content Placeholder 3">
             <a:extLst>
               <a:ext uri="{FF2B5EF4-FFF2-40B4-BE49-F238E27FC236}">
-                <a16:creationId xmlns:a16="http://schemas.microsoft.com/office/drawing/2014/main" xmlns="" id="{3189B111-0CA0-47CD-9F0B-DBCBA3AE3C28}"/>
+                <a16:creationId xmlns="" xmlns:a16="http://schemas.microsoft.com/office/drawing/2014/main" id="{3189B111-0CA0-47CD-9F0B-DBCBA3AE3C28}"/>
               </a:ext>
             </a:extLst>
           </p:cNvPr>
@@ -2573,7 +3741,7 @@
           <p:cNvPr id="5" name="Text Placeholder 4">
             <a:extLst>
               <a:ext uri="{FF2B5EF4-FFF2-40B4-BE49-F238E27FC236}">
-                <a16:creationId xmlns:a16="http://schemas.microsoft.com/office/drawing/2014/main" xmlns="" id="{EEF0E02D-3176-4B85-ACB6-721F2682742C}"/>
+                <a16:creationId xmlns="" xmlns:a16="http://schemas.microsoft.com/office/drawing/2014/main" id="{EEF0E02D-3176-4B85-ACB6-721F2682742C}"/>
               </a:ext>
             </a:extLst>
           </p:cNvPr>
@@ -2644,7 +3812,7 @@
           <p:cNvPr id="6" name="Content Placeholder 5">
             <a:extLst>
               <a:ext uri="{FF2B5EF4-FFF2-40B4-BE49-F238E27FC236}">
-                <a16:creationId xmlns:a16="http://schemas.microsoft.com/office/drawing/2014/main" xmlns="" id="{EC7D9317-BBE1-4F36-82FE-E348F6F18A97}"/>
+                <a16:creationId xmlns="" xmlns:a16="http://schemas.microsoft.com/office/drawing/2014/main" id="{EC7D9317-BBE1-4F36-82FE-E348F6F18A97}"/>
               </a:ext>
             </a:extLst>
           </p:cNvPr>
@@ -2707,7 +3875,7 @@
           <p:cNvPr id="7" name="Date Placeholder 6">
             <a:extLst>
               <a:ext uri="{FF2B5EF4-FFF2-40B4-BE49-F238E27FC236}">
-                <a16:creationId xmlns:a16="http://schemas.microsoft.com/office/drawing/2014/main" xmlns="" id="{D837DDCB-69F8-49FA-A111-C8AB271389E7}"/>
+                <a16:creationId xmlns="" xmlns:a16="http://schemas.microsoft.com/office/drawing/2014/main" id="{D837DDCB-69F8-49FA-A111-C8AB271389E7}"/>
               </a:ext>
             </a:extLst>
           </p:cNvPr>
@@ -2736,7 +3904,7 @@
           <p:cNvPr id="8" name="Footer Placeholder 7">
             <a:extLst>
               <a:ext uri="{FF2B5EF4-FFF2-40B4-BE49-F238E27FC236}">
-                <a16:creationId xmlns:a16="http://schemas.microsoft.com/office/drawing/2014/main" xmlns="" id="{4A18B0CD-1F68-412E-9232-F267114CA754}"/>
+                <a16:creationId xmlns="" xmlns:a16="http://schemas.microsoft.com/office/drawing/2014/main" id="{4A18B0CD-1F68-412E-9232-F267114CA754}"/>
               </a:ext>
             </a:extLst>
           </p:cNvPr>
@@ -2761,7 +3929,7 @@
           <p:cNvPr id="9" name="Slide Number Placeholder 8">
             <a:extLst>
               <a:ext uri="{FF2B5EF4-FFF2-40B4-BE49-F238E27FC236}">
-                <a16:creationId xmlns:a16="http://schemas.microsoft.com/office/drawing/2014/main" xmlns="" id="{429B21FC-12CC-472D-BC38-EF413158CC5D}"/>
+                <a16:creationId xmlns="" xmlns:a16="http://schemas.microsoft.com/office/drawing/2014/main" id="{429B21FC-12CC-472D-BC38-EF413158CC5D}"/>
               </a:ext>
             </a:extLst>
           </p:cNvPr>
@@ -2820,7 +3988,7 @@
           <p:cNvPr id="2" name="Title 1">
             <a:extLst>
               <a:ext uri="{FF2B5EF4-FFF2-40B4-BE49-F238E27FC236}">
-                <a16:creationId xmlns:a16="http://schemas.microsoft.com/office/drawing/2014/main" xmlns="" id="{D00F51AB-8384-4E67-914C-B39484AD2332}"/>
+                <a16:creationId xmlns="" xmlns:a16="http://schemas.microsoft.com/office/drawing/2014/main" id="{D00F51AB-8384-4E67-914C-B39484AD2332}"/>
               </a:ext>
             </a:extLst>
           </p:cNvPr>
@@ -2849,7 +4017,7 @@
           <p:cNvPr id="3" name="Date Placeholder 2">
             <a:extLst>
               <a:ext uri="{FF2B5EF4-FFF2-40B4-BE49-F238E27FC236}">
-                <a16:creationId xmlns:a16="http://schemas.microsoft.com/office/drawing/2014/main" xmlns="" id="{A0909660-3861-4545-BF68-9ED039B5D0F0}"/>
+                <a16:creationId xmlns="" xmlns:a16="http://schemas.microsoft.com/office/drawing/2014/main" id="{A0909660-3861-4545-BF68-9ED039B5D0F0}"/>
               </a:ext>
             </a:extLst>
           </p:cNvPr>
@@ -2878,7 +4046,7 @@
           <p:cNvPr id="4" name="Footer Placeholder 3">
             <a:extLst>
               <a:ext uri="{FF2B5EF4-FFF2-40B4-BE49-F238E27FC236}">
-                <a16:creationId xmlns:a16="http://schemas.microsoft.com/office/drawing/2014/main" xmlns="" id="{FDDD5392-AC3A-4EAF-ADE6-B6CF4B50ACAD}"/>
+                <a16:creationId xmlns="" xmlns:a16="http://schemas.microsoft.com/office/drawing/2014/main" id="{FDDD5392-AC3A-4EAF-ADE6-B6CF4B50ACAD}"/>
               </a:ext>
             </a:extLst>
           </p:cNvPr>
@@ -2903,7 +4071,7 @@
           <p:cNvPr id="5" name="Slide Number Placeholder 4">
             <a:extLst>
               <a:ext uri="{FF2B5EF4-FFF2-40B4-BE49-F238E27FC236}">
-                <a16:creationId xmlns:a16="http://schemas.microsoft.com/office/drawing/2014/main" xmlns="" id="{F5679880-BF48-4F4D-B8B3-4E99FC415FF9}"/>
+                <a16:creationId xmlns="" xmlns:a16="http://schemas.microsoft.com/office/drawing/2014/main" id="{F5679880-BF48-4F4D-B8B3-4E99FC415FF9}"/>
               </a:ext>
             </a:extLst>
           </p:cNvPr>
@@ -2962,7 +4130,7 @@
           <p:cNvPr id="2" name="Date Placeholder 1">
             <a:extLst>
               <a:ext uri="{FF2B5EF4-FFF2-40B4-BE49-F238E27FC236}">
-                <a16:creationId xmlns:a16="http://schemas.microsoft.com/office/drawing/2014/main" xmlns="" id="{C7F98E25-CF37-4F73-9E22-210238167867}"/>
+                <a16:creationId xmlns="" xmlns:a16="http://schemas.microsoft.com/office/drawing/2014/main" id="{C7F98E25-CF37-4F73-9E22-210238167867}"/>
               </a:ext>
             </a:extLst>
           </p:cNvPr>
@@ -2991,7 +4159,7 @@
           <p:cNvPr id="3" name="Footer Placeholder 2">
             <a:extLst>
               <a:ext uri="{FF2B5EF4-FFF2-40B4-BE49-F238E27FC236}">
-                <a16:creationId xmlns:a16="http://schemas.microsoft.com/office/drawing/2014/main" xmlns="" id="{89D7A0E1-38AB-4FDA-8EC1-2D7617909C16}"/>
+                <a16:creationId xmlns="" xmlns:a16="http://schemas.microsoft.com/office/drawing/2014/main" id="{89D7A0E1-38AB-4FDA-8EC1-2D7617909C16}"/>
               </a:ext>
             </a:extLst>
           </p:cNvPr>
@@ -3016,7 +4184,7 @@
           <p:cNvPr id="4" name="Slide Number Placeholder 3">
             <a:extLst>
               <a:ext uri="{FF2B5EF4-FFF2-40B4-BE49-F238E27FC236}">
-                <a16:creationId xmlns:a16="http://schemas.microsoft.com/office/drawing/2014/main" xmlns="" id="{18A8E424-5A91-4557-9ADF-4A9422A0690D}"/>
+                <a16:creationId xmlns="" xmlns:a16="http://schemas.microsoft.com/office/drawing/2014/main" id="{18A8E424-5A91-4557-9ADF-4A9422A0690D}"/>
               </a:ext>
             </a:extLst>
           </p:cNvPr>
@@ -3075,7 +4243,7 @@
           <p:cNvPr id="2" name="Title 1">
             <a:extLst>
               <a:ext uri="{FF2B5EF4-FFF2-40B4-BE49-F238E27FC236}">
-                <a16:creationId xmlns:a16="http://schemas.microsoft.com/office/drawing/2014/main" xmlns="" id="{006BB935-0427-44CC-A384-333EAD83175F}"/>
+                <a16:creationId xmlns="" xmlns:a16="http://schemas.microsoft.com/office/drawing/2014/main" id="{006BB935-0427-44CC-A384-333EAD83175F}"/>
               </a:ext>
             </a:extLst>
           </p:cNvPr>
@@ -3113,7 +4281,7 @@
           <p:cNvPr id="3" name="Content Placeholder 2">
             <a:extLst>
               <a:ext uri="{FF2B5EF4-FFF2-40B4-BE49-F238E27FC236}">
-                <a16:creationId xmlns:a16="http://schemas.microsoft.com/office/drawing/2014/main" xmlns="" id="{CCB9DCF6-55CF-43EE-B135-BFC4B4D403CE}"/>
+                <a16:creationId xmlns="" xmlns:a16="http://schemas.microsoft.com/office/drawing/2014/main" id="{CCB9DCF6-55CF-43EE-B135-BFC4B4D403CE}"/>
               </a:ext>
             </a:extLst>
           </p:cNvPr>
@@ -3204,7 +4372,7 @@
           <p:cNvPr id="4" name="Text Placeholder 3">
             <a:extLst>
               <a:ext uri="{FF2B5EF4-FFF2-40B4-BE49-F238E27FC236}">
-                <a16:creationId xmlns:a16="http://schemas.microsoft.com/office/drawing/2014/main" xmlns="" id="{4337538E-A112-4E8F-A445-1A06B0C35309}"/>
+                <a16:creationId xmlns="" xmlns:a16="http://schemas.microsoft.com/office/drawing/2014/main" id="{4337538E-A112-4E8F-A445-1A06B0C35309}"/>
               </a:ext>
             </a:extLst>
           </p:cNvPr>
@@ -3275,7 +4443,7 @@
           <p:cNvPr id="5" name="Date Placeholder 4">
             <a:extLst>
               <a:ext uri="{FF2B5EF4-FFF2-40B4-BE49-F238E27FC236}">
-                <a16:creationId xmlns:a16="http://schemas.microsoft.com/office/drawing/2014/main" xmlns="" id="{E530D413-9505-4ED8-BFF1-5141BE9EE3C4}"/>
+                <a16:creationId xmlns="" xmlns:a16="http://schemas.microsoft.com/office/drawing/2014/main" id="{E530D413-9505-4ED8-BFF1-5141BE9EE3C4}"/>
               </a:ext>
             </a:extLst>
           </p:cNvPr>
@@ -3304,7 +4472,7 @@
           <p:cNvPr id="6" name="Footer Placeholder 5">
             <a:extLst>
               <a:ext uri="{FF2B5EF4-FFF2-40B4-BE49-F238E27FC236}">
-                <a16:creationId xmlns:a16="http://schemas.microsoft.com/office/drawing/2014/main" xmlns="" id="{F60815B0-4528-4FA2-8472-8F19C0F1650D}"/>
+                <a16:creationId xmlns="" xmlns:a16="http://schemas.microsoft.com/office/drawing/2014/main" id="{F60815B0-4528-4FA2-8472-8F19C0F1650D}"/>
               </a:ext>
             </a:extLst>
           </p:cNvPr>
@@ -3329,7 +4497,7 @@
           <p:cNvPr id="7" name="Slide Number Placeholder 6">
             <a:extLst>
               <a:ext uri="{FF2B5EF4-FFF2-40B4-BE49-F238E27FC236}">
-                <a16:creationId xmlns:a16="http://schemas.microsoft.com/office/drawing/2014/main" xmlns="" id="{B5C9FCEF-4406-4552-BFE4-6DA3761357F2}"/>
+                <a16:creationId xmlns="" xmlns:a16="http://schemas.microsoft.com/office/drawing/2014/main" id="{B5C9FCEF-4406-4552-BFE4-6DA3761357F2}"/>
               </a:ext>
             </a:extLst>
           </p:cNvPr>
@@ -3388,7 +4556,7 @@
           <p:cNvPr id="2" name="Title 1">
             <a:extLst>
               <a:ext uri="{FF2B5EF4-FFF2-40B4-BE49-F238E27FC236}">
-                <a16:creationId xmlns:a16="http://schemas.microsoft.com/office/drawing/2014/main" xmlns="" id="{F25CE22C-69D4-49EC-8858-787B3C67B0DA}"/>
+                <a16:creationId xmlns="" xmlns:a16="http://schemas.microsoft.com/office/drawing/2014/main" id="{F25CE22C-69D4-49EC-8858-787B3C67B0DA}"/>
               </a:ext>
             </a:extLst>
           </p:cNvPr>
@@ -3426,7 +4594,7 @@
           <p:cNvPr id="3" name="Picture Placeholder 2">
             <a:extLst>
               <a:ext uri="{FF2B5EF4-FFF2-40B4-BE49-F238E27FC236}">
-                <a16:creationId xmlns:a16="http://schemas.microsoft.com/office/drawing/2014/main" xmlns="" id="{346A4341-3C0B-4025-AE17-8F0F8FABF5D3}"/>
+                <a16:creationId xmlns="" xmlns:a16="http://schemas.microsoft.com/office/drawing/2014/main" id="{346A4341-3C0B-4025-AE17-8F0F8FABF5D3}"/>
               </a:ext>
             </a:extLst>
           </p:cNvPr>
@@ -3497,7 +4665,7 @@
           <p:cNvPr id="4" name="Text Placeholder 3">
             <a:extLst>
               <a:ext uri="{FF2B5EF4-FFF2-40B4-BE49-F238E27FC236}">
-                <a16:creationId xmlns:a16="http://schemas.microsoft.com/office/drawing/2014/main" xmlns="" id="{DEF5FF01-E0B6-419C-ABCC-70844E4EACB8}"/>
+                <a16:creationId xmlns="" xmlns:a16="http://schemas.microsoft.com/office/drawing/2014/main" id="{DEF5FF01-E0B6-419C-ABCC-70844E4EACB8}"/>
               </a:ext>
             </a:extLst>
           </p:cNvPr>
@@ -3568,7 +4736,7 @@
           <p:cNvPr id="5" name="Date Placeholder 4">
             <a:extLst>
               <a:ext uri="{FF2B5EF4-FFF2-40B4-BE49-F238E27FC236}">
-                <a16:creationId xmlns:a16="http://schemas.microsoft.com/office/drawing/2014/main" xmlns="" id="{92501218-FFD7-4F25-B220-F5DE5F70693C}"/>
+                <a16:creationId xmlns="" xmlns:a16="http://schemas.microsoft.com/office/drawing/2014/main" id="{92501218-FFD7-4F25-B220-F5DE5F70693C}"/>
               </a:ext>
             </a:extLst>
           </p:cNvPr>
@@ -3597,7 +4765,7 @@
           <p:cNvPr id="6" name="Footer Placeholder 5">
             <a:extLst>
               <a:ext uri="{FF2B5EF4-FFF2-40B4-BE49-F238E27FC236}">
-                <a16:creationId xmlns:a16="http://schemas.microsoft.com/office/drawing/2014/main" xmlns="" id="{9687CBFB-34A6-49D8-A1D2-45DF38876EED}"/>
+                <a16:creationId xmlns="" xmlns:a16="http://schemas.microsoft.com/office/drawing/2014/main" id="{9687CBFB-34A6-49D8-A1D2-45DF38876EED}"/>
               </a:ext>
             </a:extLst>
           </p:cNvPr>
@@ -3622,7 +4790,7 @@
           <p:cNvPr id="7" name="Slide Number Placeholder 6">
             <a:extLst>
               <a:ext uri="{FF2B5EF4-FFF2-40B4-BE49-F238E27FC236}">
-                <a16:creationId xmlns:a16="http://schemas.microsoft.com/office/drawing/2014/main" xmlns="" id="{0C2726A4-D33A-486A-B120-648AF3D8BA76}"/>
+                <a16:creationId xmlns="" xmlns:a16="http://schemas.microsoft.com/office/drawing/2014/main" id="{0C2726A4-D33A-486A-B120-648AF3D8BA76}"/>
               </a:ext>
             </a:extLst>
           </p:cNvPr>
@@ -3686,7 +4854,7 @@
           <p:cNvPr id="2" name="Title Placeholder 1">
             <a:extLst>
               <a:ext uri="{FF2B5EF4-FFF2-40B4-BE49-F238E27FC236}">
-                <a16:creationId xmlns:a16="http://schemas.microsoft.com/office/drawing/2014/main" xmlns="" id="{9C07C8C3-4165-4353-ABF2-492454AF91ED}"/>
+                <a16:creationId xmlns="" xmlns:a16="http://schemas.microsoft.com/office/drawing/2014/main" id="{9C07C8C3-4165-4353-ABF2-492454AF91ED}"/>
               </a:ext>
             </a:extLst>
           </p:cNvPr>
@@ -3725,7 +4893,7 @@
           <p:cNvPr id="3" name="Text Placeholder 2">
             <a:extLst>
               <a:ext uri="{FF2B5EF4-FFF2-40B4-BE49-F238E27FC236}">
-                <a16:creationId xmlns:a16="http://schemas.microsoft.com/office/drawing/2014/main" xmlns="" id="{289AA46A-3C66-4E4A-9907-225E50ABB7AE}"/>
+                <a16:creationId xmlns="" xmlns:a16="http://schemas.microsoft.com/office/drawing/2014/main" id="{289AA46A-3C66-4E4A-9907-225E50ABB7AE}"/>
               </a:ext>
             </a:extLst>
           </p:cNvPr>
@@ -3793,7 +4961,7 @@
           <p:cNvPr id="4" name="Date Placeholder 3">
             <a:extLst>
               <a:ext uri="{FF2B5EF4-FFF2-40B4-BE49-F238E27FC236}">
-                <a16:creationId xmlns:a16="http://schemas.microsoft.com/office/drawing/2014/main" xmlns="" id="{E57F8214-A11A-4309-9D51-44F35987D1BD}"/>
+                <a16:creationId xmlns="" xmlns:a16="http://schemas.microsoft.com/office/drawing/2014/main" id="{E57F8214-A11A-4309-9D51-44F35987D1BD}"/>
               </a:ext>
             </a:extLst>
           </p:cNvPr>
@@ -3840,7 +5008,7 @@
           <p:cNvPr id="5" name="Footer Placeholder 4">
             <a:extLst>
               <a:ext uri="{FF2B5EF4-FFF2-40B4-BE49-F238E27FC236}">
-                <a16:creationId xmlns:a16="http://schemas.microsoft.com/office/drawing/2014/main" xmlns="" id="{D6A334EB-8260-4F13-9553-5A8593D9DC6B}"/>
+                <a16:creationId xmlns="" xmlns:a16="http://schemas.microsoft.com/office/drawing/2014/main" id="{D6A334EB-8260-4F13-9553-5A8593D9DC6B}"/>
               </a:ext>
             </a:extLst>
           </p:cNvPr>
@@ -3883,7 +5051,7 @@
           <p:cNvPr id="6" name="Slide Number Placeholder 5">
             <a:extLst>
               <a:ext uri="{FF2B5EF4-FFF2-40B4-BE49-F238E27FC236}">
-                <a16:creationId xmlns:a16="http://schemas.microsoft.com/office/drawing/2014/main" xmlns="" id="{00C1EF96-E028-4E68-864E-9B77CF9F25E0}"/>
+                <a16:creationId xmlns="" xmlns:a16="http://schemas.microsoft.com/office/drawing/2014/main" id="{00C1EF96-E028-4E68-864E-9B77CF9F25E0}"/>
               </a:ext>
             </a:extLst>
           </p:cNvPr>
@@ -4259,10 +5427,10 @@
           <p:cNvPr id="11" name="Rectangle 10">
             <a:extLst>
               <a:ext uri="{FF2B5EF4-FFF2-40B4-BE49-F238E27FC236}">
-                <a16:creationId xmlns:a16="http://schemas.microsoft.com/office/drawing/2014/main" xmlns="" id="{C0B27210-D0CA-4654-B3E3-9ABB4F178EA1}"/>
+                <a16:creationId xmlns="" xmlns:a16="http://schemas.microsoft.com/office/drawing/2014/main" id="{C0B27210-D0CA-4654-B3E3-9ABB4F178EA1}"/>
               </a:ext>
               <a:ext uri="{C183D7F6-B498-43B3-948B-1728B52AA6E4}">
-                <adec:decorative xmlns:adec="http://schemas.microsoft.com/office/drawing/2017/decorative" xmlns="" val="1"/>
+                <adec:decorative xmlns="" xmlns:adec="http://schemas.microsoft.com/office/drawing/2017/decorative" val="1"/>
               </a:ext>
             </a:extLst>
           </p:cNvPr>
@@ -4272,7 +5440,7 @@
           <p:nvPr>
             <p:extLst>
               <p:ext uri="{386F3935-93C4-4BCD-93E2-E3B085C9AB24}">
-                <p16:designElem xmlns:p16="http://schemas.microsoft.com/office/powerpoint/2015/main" xmlns="" val="1"/>
+                <p16:designElem xmlns="" xmlns:p16="http://schemas.microsoft.com/office/powerpoint/2015/main" val="1"/>
               </p:ext>
             </p:extLst>
           </p:nvPr>
@@ -4450,10 +5618,10 @@
           <p:cNvPr id="13" name="Freeform: Shape 12">
             <a:extLst>
               <a:ext uri="{FF2B5EF4-FFF2-40B4-BE49-F238E27FC236}">
-                <a16:creationId xmlns:a16="http://schemas.microsoft.com/office/drawing/2014/main" xmlns="" id="{1DB7C82F-AB7E-4F0C-B829-FA1B9C415180}"/>
+                <a16:creationId xmlns="" xmlns:a16="http://schemas.microsoft.com/office/drawing/2014/main" id="{1DB7C82F-AB7E-4F0C-B829-FA1B9C415180}"/>
               </a:ext>
               <a:ext uri="{C183D7F6-B498-43B3-948B-1728B52AA6E4}">
-                <adec:decorative xmlns:adec="http://schemas.microsoft.com/office/drawing/2017/decorative" xmlns="" val="1"/>
+                <adec:decorative xmlns="" xmlns:adec="http://schemas.microsoft.com/office/drawing/2017/decorative" val="1"/>
               </a:ext>
             </a:extLst>
           </p:cNvPr>
@@ -4463,7 +5631,7 @@
           <p:nvPr>
             <p:extLst>
               <p:ext uri="{386F3935-93C4-4BCD-93E2-E3B085C9AB24}">
-                <p16:designElem xmlns:p16="http://schemas.microsoft.com/office/powerpoint/2015/main" xmlns="" val="1"/>
+                <p16:designElem xmlns="" xmlns:p16="http://schemas.microsoft.com/office/powerpoint/2015/main" val="1"/>
               </p:ext>
             </p:extLst>
           </p:nvPr>
@@ -4617,10 +5785,10 @@
           <p:cNvPr id="15" name="Freeform: Shape 14">
             <a:extLst>
               <a:ext uri="{FF2B5EF4-FFF2-40B4-BE49-F238E27FC236}">
-                <a16:creationId xmlns:a16="http://schemas.microsoft.com/office/drawing/2014/main" xmlns="" id="{70B66945-4967-4040-926D-DCA44313CDAB}"/>
+                <a16:creationId xmlns="" xmlns:a16="http://schemas.microsoft.com/office/drawing/2014/main" id="{70B66945-4967-4040-926D-DCA44313CDAB}"/>
               </a:ext>
               <a:ext uri="{C183D7F6-B498-43B3-948B-1728B52AA6E4}">
-                <adec:decorative xmlns:adec="http://schemas.microsoft.com/office/drawing/2017/decorative" xmlns="" val="1"/>
+                <adec:decorative xmlns="" xmlns:adec="http://schemas.microsoft.com/office/drawing/2017/decorative" val="1"/>
               </a:ext>
             </a:extLst>
           </p:cNvPr>
@@ -4630,7 +5798,7 @@
           <p:nvPr>
             <p:extLst>
               <p:ext uri="{386F3935-93C4-4BCD-93E2-E3B085C9AB24}">
-                <p16:designElem xmlns:p16="http://schemas.microsoft.com/office/powerpoint/2015/main" xmlns="" val="1"/>
+                <p16:designElem xmlns="" xmlns:p16="http://schemas.microsoft.com/office/powerpoint/2015/main" val="1"/>
               </p:ext>
             </p:extLst>
           </p:nvPr>
@@ -4857,10 +6025,10 @@
           <p:cNvPr id="9" name="Rectangle 8">
             <a:extLst>
               <a:ext uri="{FF2B5EF4-FFF2-40B4-BE49-F238E27FC236}">
-                <a16:creationId xmlns:a16="http://schemas.microsoft.com/office/drawing/2014/main" xmlns="" id="{3B854194-185D-494D-905C-7C7CB2E30F6E}"/>
+                <a16:creationId xmlns="" xmlns:a16="http://schemas.microsoft.com/office/drawing/2014/main" id="{3B854194-185D-494D-905C-7C7CB2E30F6E}"/>
               </a:ext>
               <a:ext uri="{C183D7F6-B498-43B3-948B-1728B52AA6E4}">
-                <adec:decorative xmlns:adec="http://schemas.microsoft.com/office/drawing/2017/decorative" xmlns="" val="1"/>
+                <adec:decorative xmlns="" xmlns:adec="http://schemas.microsoft.com/office/drawing/2017/decorative" val="1"/>
               </a:ext>
             </a:extLst>
           </p:cNvPr>
@@ -4870,7 +6038,7 @@
           <p:nvPr>
             <p:extLst>
               <p:ext uri="{386F3935-93C4-4BCD-93E2-E3B085C9AB24}">
-                <p16:designElem xmlns:p16="http://schemas.microsoft.com/office/powerpoint/2015/main" xmlns="" val="1"/>
+                <p16:designElem xmlns="" xmlns:p16="http://schemas.microsoft.com/office/powerpoint/2015/main" val="1"/>
               </p:ext>
             </p:extLst>
           </p:nvPr>
@@ -4917,10 +6085,10 @@
           <p:cNvPr id="11" name="Rectangle 10">
             <a:extLst>
               <a:ext uri="{FF2B5EF4-FFF2-40B4-BE49-F238E27FC236}">
-                <a16:creationId xmlns:a16="http://schemas.microsoft.com/office/drawing/2014/main" xmlns="" id="{B4F5FA0D-0104-4987-8241-EFF7C85B88DE}"/>
+                <a16:creationId xmlns="" xmlns:a16="http://schemas.microsoft.com/office/drawing/2014/main" id="{B4F5FA0D-0104-4987-8241-EFF7C85B88DE}"/>
               </a:ext>
               <a:ext uri="{C183D7F6-B498-43B3-948B-1728B52AA6E4}">
-                <adec:decorative xmlns:adec="http://schemas.microsoft.com/office/drawing/2017/decorative" xmlns="" val="1"/>
+                <adec:decorative xmlns="" xmlns:adec="http://schemas.microsoft.com/office/drawing/2017/decorative" val="1"/>
               </a:ext>
             </a:extLst>
           </p:cNvPr>
@@ -4930,7 +6098,7 @@
           <p:nvPr>
             <p:extLst>
               <p:ext uri="{386F3935-93C4-4BCD-93E2-E3B085C9AB24}">
-                <p16:designElem xmlns:p16="http://schemas.microsoft.com/office/powerpoint/2015/main" xmlns="" val="1"/>
+                <p16:designElem xmlns="" xmlns:p16="http://schemas.microsoft.com/office/powerpoint/2015/main" val="1"/>
               </p:ext>
             </p:extLst>
           </p:nvPr>
@@ -5002,10 +6170,10 @@
           <p:cNvPr id="13" name="Picture 12">
             <a:extLst>
               <a:ext uri="{FF2B5EF4-FFF2-40B4-BE49-F238E27FC236}">
-                <a16:creationId xmlns:a16="http://schemas.microsoft.com/office/drawing/2014/main" xmlns="" id="{2897127E-6CEF-446C-BE87-93B7C46E49D1}"/>
+                <a16:creationId xmlns="" xmlns:a16="http://schemas.microsoft.com/office/drawing/2014/main" id="{2897127E-6CEF-446C-BE87-93B7C46E49D1}"/>
               </a:ext>
               <a:ext uri="{C183D7F6-B498-43B3-948B-1728B52AA6E4}">
-                <adec:decorative xmlns:adec="http://schemas.microsoft.com/office/drawing/2017/decorative" xmlns="" val="1"/>
+                <adec:decorative xmlns="" xmlns:adec="http://schemas.microsoft.com/office/drawing/2017/decorative" val="1"/>
               </a:ext>
             </a:extLst>
           </p:cNvPr>
@@ -5015,7 +6183,7 @@
           <p:nvPr>
             <p:extLst>
               <p:ext uri="{386F3935-93C4-4BCD-93E2-E3B085C9AB24}">
-                <p16:designElem xmlns:p16="http://schemas.microsoft.com/office/powerpoint/2015/main" xmlns="" val="1"/>
+                <p16:designElem xmlns="" xmlns:p16="http://schemas.microsoft.com/office/powerpoint/2015/main" val="1"/>
               </p:ext>
             </p:extLst>
           </p:nvPr>
@@ -5244,10 +6412,10 @@
           <p:cNvPr id="9" name="Rectangle 8">
             <a:extLst>
               <a:ext uri="{FF2B5EF4-FFF2-40B4-BE49-F238E27FC236}">
-                <a16:creationId xmlns:a16="http://schemas.microsoft.com/office/drawing/2014/main" xmlns="" id="{3B854194-185D-494D-905C-7C7CB2E30F6E}"/>
+                <a16:creationId xmlns="" xmlns:a16="http://schemas.microsoft.com/office/drawing/2014/main" id="{3B854194-185D-494D-905C-7C7CB2E30F6E}"/>
               </a:ext>
               <a:ext uri="{C183D7F6-B498-43B3-948B-1728B52AA6E4}">
-                <adec:decorative xmlns:adec="http://schemas.microsoft.com/office/drawing/2017/decorative" xmlns="" val="1"/>
+                <adec:decorative xmlns="" xmlns:adec="http://schemas.microsoft.com/office/drawing/2017/decorative" val="1"/>
               </a:ext>
             </a:extLst>
           </p:cNvPr>
@@ -5257,7 +6425,7 @@
           <p:nvPr>
             <p:extLst>
               <p:ext uri="{386F3935-93C4-4BCD-93E2-E3B085C9AB24}">
-                <p16:designElem xmlns:p16="http://schemas.microsoft.com/office/powerpoint/2015/main" xmlns="" val="1"/>
+                <p16:designElem xmlns="" xmlns:p16="http://schemas.microsoft.com/office/powerpoint/2015/main" val="1"/>
               </p:ext>
             </p:extLst>
           </p:nvPr>
@@ -5304,10 +6472,10 @@
           <p:cNvPr id="11" name="Rectangle 10">
             <a:extLst>
               <a:ext uri="{FF2B5EF4-FFF2-40B4-BE49-F238E27FC236}">
-                <a16:creationId xmlns:a16="http://schemas.microsoft.com/office/drawing/2014/main" xmlns="" id="{B4F5FA0D-0104-4987-8241-EFF7C85B88DE}"/>
+                <a16:creationId xmlns="" xmlns:a16="http://schemas.microsoft.com/office/drawing/2014/main" id="{B4F5FA0D-0104-4987-8241-EFF7C85B88DE}"/>
               </a:ext>
               <a:ext uri="{C183D7F6-B498-43B3-948B-1728B52AA6E4}">
-                <adec:decorative xmlns:adec="http://schemas.microsoft.com/office/drawing/2017/decorative" xmlns="" val="1"/>
+                <adec:decorative xmlns="" xmlns:adec="http://schemas.microsoft.com/office/drawing/2017/decorative" val="1"/>
               </a:ext>
             </a:extLst>
           </p:cNvPr>
@@ -5317,7 +6485,7 @@
           <p:nvPr>
             <p:extLst>
               <p:ext uri="{386F3935-93C4-4BCD-93E2-E3B085C9AB24}">
-                <p16:designElem xmlns:p16="http://schemas.microsoft.com/office/powerpoint/2015/main" xmlns="" val="1"/>
+                <p16:designElem xmlns="" xmlns:p16="http://schemas.microsoft.com/office/powerpoint/2015/main" val="1"/>
               </p:ext>
             </p:extLst>
           </p:nvPr>
@@ -5389,10 +6557,10 @@
           <p:cNvPr id="13" name="Picture 12">
             <a:extLst>
               <a:ext uri="{FF2B5EF4-FFF2-40B4-BE49-F238E27FC236}">
-                <a16:creationId xmlns:a16="http://schemas.microsoft.com/office/drawing/2014/main" xmlns="" id="{2897127E-6CEF-446C-BE87-93B7C46E49D1}"/>
+                <a16:creationId xmlns="" xmlns:a16="http://schemas.microsoft.com/office/drawing/2014/main" id="{2897127E-6CEF-446C-BE87-93B7C46E49D1}"/>
               </a:ext>
               <a:ext uri="{C183D7F6-B498-43B3-948B-1728B52AA6E4}">
-                <adec:decorative xmlns:adec="http://schemas.microsoft.com/office/drawing/2017/decorative" xmlns="" val="1"/>
+                <adec:decorative xmlns="" xmlns:adec="http://schemas.microsoft.com/office/drawing/2017/decorative" val="1"/>
               </a:ext>
             </a:extLst>
           </p:cNvPr>
@@ -5402,7 +6570,7 @@
           <p:nvPr>
             <p:extLst>
               <p:ext uri="{386F3935-93C4-4BCD-93E2-E3B085C9AB24}">
-                <p16:designElem xmlns:p16="http://schemas.microsoft.com/office/powerpoint/2015/main" xmlns="" val="1"/>
+                <p16:designElem xmlns="" xmlns:p16="http://schemas.microsoft.com/office/powerpoint/2015/main" val="1"/>
               </p:ext>
             </p:extLst>
           </p:nvPr>
@@ -5593,10 +6761,10 @@
           <p:cNvPr id="9" name="Rectangle 8">
             <a:extLst>
               <a:ext uri="{FF2B5EF4-FFF2-40B4-BE49-F238E27FC236}">
-                <a16:creationId xmlns:a16="http://schemas.microsoft.com/office/drawing/2014/main" xmlns="" id="{3B854194-185D-494D-905C-7C7CB2E30F6E}"/>
+                <a16:creationId xmlns="" xmlns:a16="http://schemas.microsoft.com/office/drawing/2014/main" id="{3B854194-185D-494D-905C-7C7CB2E30F6E}"/>
               </a:ext>
               <a:ext uri="{C183D7F6-B498-43B3-948B-1728B52AA6E4}">
-                <adec:decorative xmlns:adec="http://schemas.microsoft.com/office/drawing/2017/decorative" xmlns="" val="1"/>
+                <adec:decorative xmlns="" xmlns:adec="http://schemas.microsoft.com/office/drawing/2017/decorative" val="1"/>
               </a:ext>
             </a:extLst>
           </p:cNvPr>
@@ -5606,7 +6774,7 @@
           <p:nvPr>
             <p:extLst>
               <p:ext uri="{386F3935-93C4-4BCD-93E2-E3B085C9AB24}">
-                <p16:designElem xmlns:p16="http://schemas.microsoft.com/office/powerpoint/2015/main" xmlns="" val="1"/>
+                <p16:designElem xmlns="" xmlns:p16="http://schemas.microsoft.com/office/powerpoint/2015/main" val="1"/>
               </p:ext>
             </p:extLst>
           </p:nvPr>
@@ -5653,10 +6821,10 @@
           <p:cNvPr id="11" name="Rectangle 10">
             <a:extLst>
               <a:ext uri="{FF2B5EF4-FFF2-40B4-BE49-F238E27FC236}">
-                <a16:creationId xmlns:a16="http://schemas.microsoft.com/office/drawing/2014/main" xmlns="" id="{B4F5FA0D-0104-4987-8241-EFF7C85B88DE}"/>
+                <a16:creationId xmlns="" xmlns:a16="http://schemas.microsoft.com/office/drawing/2014/main" id="{B4F5FA0D-0104-4987-8241-EFF7C85B88DE}"/>
               </a:ext>
               <a:ext uri="{C183D7F6-B498-43B3-948B-1728B52AA6E4}">
-                <adec:decorative xmlns:adec="http://schemas.microsoft.com/office/drawing/2017/decorative" xmlns="" val="1"/>
+                <adec:decorative xmlns="" xmlns:adec="http://schemas.microsoft.com/office/drawing/2017/decorative" val="1"/>
               </a:ext>
             </a:extLst>
           </p:cNvPr>
@@ -5666,7 +6834,7 @@
           <p:nvPr>
             <p:extLst>
               <p:ext uri="{386F3935-93C4-4BCD-93E2-E3B085C9AB24}">
-                <p16:designElem xmlns:p16="http://schemas.microsoft.com/office/powerpoint/2015/main" xmlns="" val="1"/>
+                <p16:designElem xmlns="" xmlns:p16="http://schemas.microsoft.com/office/powerpoint/2015/main" val="1"/>
               </p:ext>
             </p:extLst>
           </p:nvPr>
@@ -5738,10 +6906,10 @@
           <p:cNvPr id="13" name="Picture 12">
             <a:extLst>
               <a:ext uri="{FF2B5EF4-FFF2-40B4-BE49-F238E27FC236}">
-                <a16:creationId xmlns:a16="http://schemas.microsoft.com/office/drawing/2014/main" xmlns="" id="{2897127E-6CEF-446C-BE87-93B7C46E49D1}"/>
+                <a16:creationId xmlns="" xmlns:a16="http://schemas.microsoft.com/office/drawing/2014/main" id="{2897127E-6CEF-446C-BE87-93B7C46E49D1}"/>
               </a:ext>
               <a:ext uri="{C183D7F6-B498-43B3-948B-1728B52AA6E4}">
-                <adec:decorative xmlns:adec="http://schemas.microsoft.com/office/drawing/2017/decorative" xmlns="" val="1"/>
+                <adec:decorative xmlns="" xmlns:adec="http://schemas.microsoft.com/office/drawing/2017/decorative" val="1"/>
               </a:ext>
             </a:extLst>
           </p:cNvPr>
@@ -5751,7 +6919,7 @@
           <p:nvPr>
             <p:extLst>
               <p:ext uri="{386F3935-93C4-4BCD-93E2-E3B085C9AB24}">
-                <p16:designElem xmlns:p16="http://schemas.microsoft.com/office/powerpoint/2015/main" xmlns="" val="1"/>
+                <p16:designElem xmlns="" xmlns:p16="http://schemas.microsoft.com/office/powerpoint/2015/main" val="1"/>
               </p:ext>
             </p:extLst>
           </p:nvPr>
@@ -5952,10 +7120,10 @@
           <p:cNvPr id="9" name="Rectangle 8">
             <a:extLst>
               <a:ext uri="{FF2B5EF4-FFF2-40B4-BE49-F238E27FC236}">
-                <a16:creationId xmlns:a16="http://schemas.microsoft.com/office/drawing/2014/main" xmlns="" id="{23962611-DFD5-4092-AAFD-559E3DFCE2C9}"/>
+                <a16:creationId xmlns="" xmlns:a16="http://schemas.microsoft.com/office/drawing/2014/main" id="{23962611-DFD5-4092-AAFD-559E3DFCE2C9}"/>
               </a:ext>
               <a:ext uri="{C183D7F6-B498-43B3-948B-1728B52AA6E4}">
-                <adec:decorative xmlns:adec="http://schemas.microsoft.com/office/drawing/2017/decorative" xmlns="" val="1"/>
+                <adec:decorative xmlns="" xmlns:adec="http://schemas.microsoft.com/office/drawing/2017/decorative" val="1"/>
               </a:ext>
             </a:extLst>
           </p:cNvPr>
@@ -5965,7 +7133,7 @@
           <p:nvPr>
             <p:extLst>
               <p:ext uri="{386F3935-93C4-4BCD-93E2-E3B085C9AB24}">
-                <p16:designElem xmlns:p16="http://schemas.microsoft.com/office/powerpoint/2015/main" xmlns="" val="1"/>
+                <p16:designElem xmlns="" xmlns:p16="http://schemas.microsoft.com/office/powerpoint/2015/main" val="1"/>
               </p:ext>
             </p:extLst>
           </p:nvPr>
@@ -6037,10 +7205,10 @@
           <p:cNvPr id="11" name="Picture 10">
             <a:extLst>
               <a:ext uri="{FF2B5EF4-FFF2-40B4-BE49-F238E27FC236}">
-                <a16:creationId xmlns:a16="http://schemas.microsoft.com/office/drawing/2014/main" xmlns="" id="{2270F1FA-0425-408F-9861-80BF5AFB276D}"/>
+                <a16:creationId xmlns="" xmlns:a16="http://schemas.microsoft.com/office/drawing/2014/main" id="{2270F1FA-0425-408F-9861-80BF5AFB276D}"/>
               </a:ext>
               <a:ext uri="{C183D7F6-B498-43B3-948B-1728B52AA6E4}">
-                <adec:decorative xmlns:adec="http://schemas.microsoft.com/office/drawing/2017/decorative" xmlns="" val="1"/>
+                <adec:decorative xmlns="" xmlns:adec="http://schemas.microsoft.com/office/drawing/2017/decorative" val="1"/>
               </a:ext>
             </a:extLst>
           </p:cNvPr>
@@ -6050,7 +7218,7 @@
           <p:nvPr>
             <p:extLst>
               <p:ext uri="{386F3935-93C4-4BCD-93E2-E3B085C9AB24}">
-                <p16:designElem xmlns:p16="http://schemas.microsoft.com/office/powerpoint/2015/main" xmlns="" val="1"/>
+                <p16:designElem xmlns="" xmlns:p16="http://schemas.microsoft.com/office/powerpoint/2015/main" val="1"/>
               </p:ext>
             </p:extLst>
           </p:nvPr>
@@ -6780,10 +7948,10 @@
           <p:cNvPr id="9" name="Rectangle 8">
             <a:extLst>
               <a:ext uri="{FF2B5EF4-FFF2-40B4-BE49-F238E27FC236}">
-                <a16:creationId xmlns:a16="http://schemas.microsoft.com/office/drawing/2014/main" xmlns="" id="{23962611-DFD5-4092-AAFD-559E3DFCE2C9}"/>
+                <a16:creationId xmlns="" xmlns:a16="http://schemas.microsoft.com/office/drawing/2014/main" id="{23962611-DFD5-4092-AAFD-559E3DFCE2C9}"/>
               </a:ext>
               <a:ext uri="{C183D7F6-B498-43B3-948B-1728B52AA6E4}">
-                <adec:decorative xmlns:adec="http://schemas.microsoft.com/office/drawing/2017/decorative" xmlns="" val="1"/>
+                <adec:decorative xmlns="" xmlns:adec="http://schemas.microsoft.com/office/drawing/2017/decorative" val="1"/>
               </a:ext>
             </a:extLst>
           </p:cNvPr>
@@ -6793,7 +7961,7 @@
           <p:nvPr>
             <p:extLst>
               <p:ext uri="{386F3935-93C4-4BCD-93E2-E3B085C9AB24}">
-                <p16:designElem xmlns:p16="http://schemas.microsoft.com/office/powerpoint/2015/main" xmlns="" val="1"/>
+                <p16:designElem xmlns="" xmlns:p16="http://schemas.microsoft.com/office/powerpoint/2015/main" val="1"/>
               </p:ext>
             </p:extLst>
           </p:nvPr>
@@ -6865,10 +8033,10 @@
           <p:cNvPr id="11" name="Picture 10">
             <a:extLst>
               <a:ext uri="{FF2B5EF4-FFF2-40B4-BE49-F238E27FC236}">
-                <a16:creationId xmlns:a16="http://schemas.microsoft.com/office/drawing/2014/main" xmlns="" id="{2270F1FA-0425-408F-9861-80BF5AFB276D}"/>
+                <a16:creationId xmlns="" xmlns:a16="http://schemas.microsoft.com/office/drawing/2014/main" id="{2270F1FA-0425-408F-9861-80BF5AFB276D}"/>
               </a:ext>
               <a:ext uri="{C183D7F6-B498-43B3-948B-1728B52AA6E4}">
-                <adec:decorative xmlns:adec="http://schemas.microsoft.com/office/drawing/2017/decorative" xmlns="" val="1"/>
+                <adec:decorative xmlns="" xmlns:adec="http://schemas.microsoft.com/office/drawing/2017/decorative" val="1"/>
               </a:ext>
             </a:extLst>
           </p:cNvPr>
@@ -6878,7 +8046,7 @@
           <p:nvPr>
             <p:extLst>
               <p:ext uri="{386F3935-93C4-4BCD-93E2-E3B085C9AB24}">
-                <p16:designElem xmlns:p16="http://schemas.microsoft.com/office/powerpoint/2015/main" xmlns="" val="1"/>
+                <p16:designElem xmlns="" xmlns:p16="http://schemas.microsoft.com/office/powerpoint/2015/main" val="1"/>
               </p:ext>
             </p:extLst>
           </p:nvPr>
@@ -7608,10 +8776,10 @@
           <p:cNvPr id="9" name="Rectangle 8">
             <a:extLst>
               <a:ext uri="{FF2B5EF4-FFF2-40B4-BE49-F238E27FC236}">
-                <a16:creationId xmlns:a16="http://schemas.microsoft.com/office/drawing/2014/main" xmlns="" id="{23962611-DFD5-4092-AAFD-559E3DFCE2C9}"/>
+                <a16:creationId xmlns="" xmlns:a16="http://schemas.microsoft.com/office/drawing/2014/main" id="{23962611-DFD5-4092-AAFD-559E3DFCE2C9}"/>
               </a:ext>
               <a:ext uri="{C183D7F6-B498-43B3-948B-1728B52AA6E4}">
-                <adec:decorative xmlns:adec="http://schemas.microsoft.com/office/drawing/2017/decorative" xmlns="" val="1"/>
+                <adec:decorative xmlns="" xmlns:adec="http://schemas.microsoft.com/office/drawing/2017/decorative" val="1"/>
               </a:ext>
             </a:extLst>
           </p:cNvPr>
@@ -7621,7 +8789,7 @@
           <p:nvPr>
             <p:extLst>
               <p:ext uri="{386F3935-93C4-4BCD-93E2-E3B085C9AB24}">
-                <p16:designElem xmlns:p16="http://schemas.microsoft.com/office/powerpoint/2015/main" xmlns="" val="1"/>
+                <p16:designElem xmlns="" xmlns:p16="http://schemas.microsoft.com/office/powerpoint/2015/main" val="1"/>
               </p:ext>
             </p:extLst>
           </p:nvPr>
@@ -7693,10 +8861,10 @@
           <p:cNvPr id="11" name="Picture 10">
             <a:extLst>
               <a:ext uri="{FF2B5EF4-FFF2-40B4-BE49-F238E27FC236}">
-                <a16:creationId xmlns:a16="http://schemas.microsoft.com/office/drawing/2014/main" xmlns="" id="{2270F1FA-0425-408F-9861-80BF5AFB276D}"/>
+                <a16:creationId xmlns="" xmlns:a16="http://schemas.microsoft.com/office/drawing/2014/main" id="{2270F1FA-0425-408F-9861-80BF5AFB276D}"/>
               </a:ext>
               <a:ext uri="{C183D7F6-B498-43B3-948B-1728B52AA6E4}">
-                <adec:decorative xmlns:adec="http://schemas.microsoft.com/office/drawing/2017/decorative" xmlns="" val="1"/>
+                <adec:decorative xmlns="" xmlns:adec="http://schemas.microsoft.com/office/drawing/2017/decorative" val="1"/>
               </a:ext>
             </a:extLst>
           </p:cNvPr>
@@ -7706,7 +8874,7 @@
           <p:nvPr>
             <p:extLst>
               <p:ext uri="{386F3935-93C4-4BCD-93E2-E3B085C9AB24}">
-                <p16:designElem xmlns:p16="http://schemas.microsoft.com/office/powerpoint/2015/main" xmlns="" val="1"/>
+                <p16:designElem xmlns="" xmlns:p16="http://schemas.microsoft.com/office/powerpoint/2015/main" val="1"/>
               </p:ext>
             </p:extLst>
           </p:nvPr>
@@ -8431,7 +9599,10 @@
     <p:bg>
       <p:bgPr>
         <a:solidFill>
-          <a:schemeClr val="bg1"/>
+          <a:schemeClr val="accent1">
+            <a:lumMod val="20000"/>
+            <a:lumOff val="80000"/>
+          </a:schemeClr>
         </a:solidFill>
         <a:effectLst/>
       </p:bgPr>
@@ -8452,13 +9623,99 @@
       </p:grpSpPr>
       <p:sp>
         <p:nvSpPr>
+          <p:cNvPr id="13" name="Título 12"/>
+          <p:cNvSpPr>
+            <a:spLocks noGrp="1"/>
+          </p:cNvSpPr>
+          <p:nvPr>
+            <p:ph type="title"/>
+          </p:nvPr>
+        </p:nvSpPr>
+        <p:spPr/>
+        <p:txBody>
+          <a:bodyPr/>
+          <a:lstStyle/>
+          <a:p>
+            <a:pPr algn="ctr"/>
+            <a:r>
+              <a:rPr lang="es-AR" dirty="0" smtClean="0"/>
+              <a:t>Comparación de Resultados</a:t>
+            </a:r>
+            <a:endParaRPr lang="es-AR" dirty="0"/>
+          </a:p>
+        </p:txBody>
+      </p:sp>
+      <p:graphicFrame>
+        <p:nvGraphicFramePr>
+          <p:cNvPr id="19" name="Marcador de contenido 18"/>
+          <p:cNvGraphicFramePr>
+            <a:graphicFrameLocks noGrp="1"/>
+          </p:cNvGraphicFramePr>
+          <p:nvPr>
+            <p:ph idx="1"/>
+            <p:extLst>
+              <p:ext uri="{D42A27DB-BD31-4B8C-83A1-F6EECF244321}">
+                <p14:modId xmlns:p14="http://schemas.microsoft.com/office/powerpoint/2010/main" val="1584258671"/>
+              </p:ext>
+            </p:extLst>
+          </p:nvPr>
+        </p:nvGraphicFramePr>
+        <p:xfrm>
+          <a:off x="838200" y="1825625"/>
+          <a:ext cx="10515600" cy="4351338"/>
+        </p:xfrm>
+        <a:graphic>
+          <a:graphicData uri="http://schemas.openxmlformats.org/drawingml/2006/chart">
+            <c:chart xmlns:c="http://schemas.openxmlformats.org/drawingml/2006/chart" xmlns:r="http://schemas.openxmlformats.org/officeDocument/2006/relationships" r:id="rId3"/>
+          </a:graphicData>
+        </a:graphic>
+      </p:graphicFrame>
+    </p:spTree>
+    <p:extLst>
+      <p:ext uri="{BB962C8B-B14F-4D97-AF65-F5344CB8AC3E}">
+        <p14:creationId xmlns:p14="http://schemas.microsoft.com/office/powerpoint/2010/main" val="1052718980"/>
+      </p:ext>
+    </p:extLst>
+  </p:cSld>
+  <p:clrMapOvr>
+    <a:masterClrMapping/>
+  </p:clrMapOvr>
+  <p:timing>
+    <p:tnLst>
+      <p:par>
+        <p:cTn id="1" dur="indefinite" restart="never" nodeType="tmRoot"/>
+      </p:par>
+    </p:tnLst>
+  </p:timing>
+</p:sld>
+</file>
+
+<file path=ppt/slides/slide9.xml><?xml version="1.0" encoding="utf-8"?>
+<p:sld xmlns:a="http://schemas.openxmlformats.org/drawingml/2006/main" xmlns:r="http://schemas.openxmlformats.org/officeDocument/2006/relationships" xmlns:p="http://schemas.openxmlformats.org/presentationml/2006/main">
+  <p:cSld>
+    <p:spTree>
+      <p:nvGrpSpPr>
+        <p:cNvPr id="1" name=""/>
+        <p:cNvGrpSpPr/>
+        <p:nvPr/>
+      </p:nvGrpSpPr>
+      <p:grpSpPr>
+        <a:xfrm>
+          <a:off x="0" y="0"/>
+          <a:ext cx="0" cy="0"/>
+          <a:chOff x="0" y="0"/>
+          <a:chExt cx="0" cy="0"/>
+        </a:xfrm>
+      </p:grpSpPr>
+      <p:sp>
+        <p:nvSpPr>
           <p:cNvPr id="9" name="Rectangle 8">
             <a:extLst>
               <a:ext uri="{FF2B5EF4-FFF2-40B4-BE49-F238E27FC236}">
-                <a16:creationId xmlns:a16="http://schemas.microsoft.com/office/drawing/2014/main" xmlns="" id="{23962611-DFD5-4092-AAFD-559E3DFCE2C9}"/>
+                <a16:creationId xmlns="" xmlns:a16="http://schemas.microsoft.com/office/drawing/2014/main" id="{23962611-DFD5-4092-AAFD-559E3DFCE2C9}"/>
               </a:ext>
               <a:ext uri="{C183D7F6-B498-43B3-948B-1728B52AA6E4}">
-                <adec:decorative xmlns:adec="http://schemas.microsoft.com/office/drawing/2017/decorative" xmlns="" val="1"/>
+                <adec:decorative xmlns="" xmlns:adec="http://schemas.microsoft.com/office/drawing/2017/decorative" val="1"/>
               </a:ext>
             </a:extLst>
           </p:cNvPr>
@@ -8468,7 +9725,7 @@
           <p:nvPr>
             <p:extLst>
               <p:ext uri="{386F3935-93C4-4BCD-93E2-E3B085C9AB24}">
-                <p16:designElem xmlns:p16="http://schemas.microsoft.com/office/powerpoint/2015/main" xmlns="" val="1"/>
+                <p16:designElem xmlns="" xmlns:p16="http://schemas.microsoft.com/office/powerpoint/2015/main" val="1"/>
               </p:ext>
             </p:extLst>
           </p:nvPr>
@@ -8540,10 +9797,10 @@
           <p:cNvPr id="11" name="Picture 10">
             <a:extLst>
               <a:ext uri="{FF2B5EF4-FFF2-40B4-BE49-F238E27FC236}">
-                <a16:creationId xmlns:a16="http://schemas.microsoft.com/office/drawing/2014/main" xmlns="" id="{2270F1FA-0425-408F-9861-80BF5AFB276D}"/>
+                <a16:creationId xmlns="" xmlns:a16="http://schemas.microsoft.com/office/drawing/2014/main" id="{2270F1FA-0425-408F-9861-80BF5AFB276D}"/>
               </a:ext>
               <a:ext uri="{C183D7F6-B498-43B3-948B-1728B52AA6E4}">
-                <adec:decorative xmlns:adec="http://schemas.microsoft.com/office/drawing/2017/decorative" xmlns="" val="1"/>
+                <adec:decorative xmlns="" xmlns:adec="http://schemas.microsoft.com/office/drawing/2017/decorative" val="1"/>
               </a:ext>
             </a:extLst>
           </p:cNvPr>
@@ -8553,7 +9810,7 @@
           <p:nvPr>
             <p:extLst>
               <p:ext uri="{386F3935-93C4-4BCD-93E2-E3B085C9AB24}">
-                <p16:designElem xmlns:p16="http://schemas.microsoft.com/office/powerpoint/2015/main" xmlns="" val="1"/>
+                <p16:designElem xmlns="" xmlns:p16="http://schemas.microsoft.com/office/powerpoint/2015/main" val="1"/>
               </p:ext>
             </p:extLst>
           </p:nvPr>
@@ -8604,299 +9861,20 @@
           <a:p>
             <a:pPr algn="ctr"/>
             <a:r>
-              <a:rPr lang="en-US" sz="6000" kern="1200" dirty="0" smtClean="0">
+              <a:rPr lang="en-US" sz="6000" dirty="0" err="1" smtClean="0">
                 <a:solidFill>
                   <a:srgbClr val="FFFFFF"/>
                 </a:solidFill>
-                <a:latin typeface="+mj-lt"/>
-                <a:ea typeface="+mj-ea"/>
-                <a:cs typeface="+mj-cs"/>
               </a:rPr>
-              <a:t>GRAFICO COMPARATIVO</a:t>
-            </a:r>
-            <a:endParaRPr lang="en-US" sz="6000" kern="1200" dirty="0">
-              <a:solidFill>
-                <a:srgbClr val="FFFFFF"/>
-              </a:solidFill>
-              <a:latin typeface="+mj-lt"/>
-              <a:ea typeface="+mj-ea"/>
-              <a:cs typeface="+mj-cs"/>
-            </a:endParaRPr>
-          </a:p>
-        </p:txBody>
-      </p:sp>
-      <p:sp>
-        <p:nvSpPr>
-          <p:cNvPr id="10" name="Marcador de contenido 9"/>
-          <p:cNvSpPr>
-            <a:spLocks noGrp="1"/>
-          </p:cNvSpPr>
-          <p:nvPr>
-            <p:ph idx="1"/>
-          </p:nvPr>
-        </p:nvSpPr>
-        <p:spPr/>
-        <p:txBody>
-          <a:bodyPr/>
-          <a:lstStyle/>
-          <a:p>
-            <a:endParaRPr lang="es-AR"/>
-          </a:p>
-        </p:txBody>
-      </p:sp>
-    </p:spTree>
-    <p:extLst>
-      <p:ext uri="{BB962C8B-B14F-4D97-AF65-F5344CB8AC3E}">
-        <p14:creationId xmlns:p14="http://schemas.microsoft.com/office/powerpoint/2010/main" val="1052718980"/>
-      </p:ext>
-    </p:extLst>
-  </p:cSld>
-  <p:clrMapOvr>
-    <a:masterClrMapping/>
-  </p:clrMapOvr>
-  <p:timing>
-    <p:tnLst>
-      <p:par>
-        <p:cTn id="1" dur="indefinite" restart="never" nodeType="tmRoot"/>
-      </p:par>
-    </p:tnLst>
-  </p:timing>
-</p:sld>
-</file>
-
-<file path=ppt/slides/slide9.xml><?xml version="1.0" encoding="utf-8"?>
-<p:sld xmlns:a="http://schemas.openxmlformats.org/drawingml/2006/main" xmlns:r="http://schemas.openxmlformats.org/officeDocument/2006/relationships" xmlns:p="http://schemas.openxmlformats.org/presentationml/2006/main">
-  <p:cSld>
-    <p:bg>
-      <p:bgPr>
-        <a:solidFill>
-          <a:schemeClr val="bg1"/>
-        </a:solidFill>
-        <a:effectLst/>
-      </p:bgPr>
-    </p:bg>
-    <p:spTree>
-      <p:nvGrpSpPr>
-        <p:cNvPr id="1" name=""/>
-        <p:cNvGrpSpPr/>
-        <p:nvPr/>
-      </p:nvGrpSpPr>
-      <p:grpSpPr>
-        <a:xfrm>
-          <a:off x="0" y="0"/>
-          <a:ext cx="0" cy="0"/>
-          <a:chOff x="0" y="0"/>
-          <a:chExt cx="0" cy="0"/>
-        </a:xfrm>
-      </p:grpSpPr>
-      <p:sp>
-        <p:nvSpPr>
-          <p:cNvPr id="9" name="Rectangle 8">
-            <a:extLst>
-              <a:ext uri="{FF2B5EF4-FFF2-40B4-BE49-F238E27FC236}">
-                <a16:creationId xmlns:a16="http://schemas.microsoft.com/office/drawing/2014/main" xmlns="" id="{23962611-DFD5-4092-AAFD-559E3DFCE2C9}"/>
-              </a:ext>
-              <a:ext uri="{C183D7F6-B498-43B3-948B-1728B52AA6E4}">
-                <adec:decorative xmlns:adec="http://schemas.microsoft.com/office/drawing/2017/decorative" xmlns="" val="1"/>
-              </a:ext>
-            </a:extLst>
-          </p:cNvPr>
-          <p:cNvSpPr>
-            <a:spLocks noGrp="1" noRot="1" noChangeAspect="1" noMove="1" noResize="1" noEditPoints="1" noAdjustHandles="1" noChangeArrowheads="1" noChangeShapeType="1" noTextEdit="1"/>
-          </p:cNvSpPr>
-          <p:nvPr>
-            <p:extLst>
-              <p:ext uri="{386F3935-93C4-4BCD-93E2-E3B085C9AB24}">
-                <p16:designElem xmlns:p16="http://schemas.microsoft.com/office/powerpoint/2015/main" xmlns="" val="1"/>
-              </p:ext>
-            </p:extLst>
-          </p:nvPr>
-        </p:nvSpPr>
-        <p:spPr>
-          <a:xfrm>
-            <a:off x="475488" y="0"/>
-            <a:ext cx="10910292" cy="6858000"/>
-          </a:xfrm>
-          <a:prstGeom prst="rect">
-            <a:avLst/>
-          </a:prstGeom>
-          <a:gradFill>
-            <a:gsLst>
-              <a:gs pos="0">
-                <a:schemeClr val="accent1">
-                  <a:lumMod val="90000"/>
-                </a:schemeClr>
-              </a:gs>
-              <a:gs pos="25000">
-                <a:schemeClr val="accent1">
-                  <a:lumMod val="90000"/>
-                </a:schemeClr>
-              </a:gs>
-              <a:gs pos="94000">
-                <a:schemeClr val="bg2">
-                  <a:lumMod val="25000"/>
-                </a:schemeClr>
-              </a:gs>
-              <a:gs pos="100000">
-                <a:schemeClr val="bg2">
-                  <a:lumMod val="25000"/>
-                </a:schemeClr>
-              </a:gs>
-            </a:gsLst>
-            <a:lin ang="4200000" scaled="0"/>
-          </a:gradFill>
-          <a:ln>
-            <a:noFill/>
-          </a:ln>
-        </p:spPr>
-        <p:style>
-          <a:lnRef idx="2">
-            <a:schemeClr val="accent1">
-              <a:shade val="50000"/>
-            </a:schemeClr>
-          </a:lnRef>
-          <a:fillRef idx="1">
-            <a:schemeClr val="accent1"/>
-          </a:fillRef>
-          <a:effectRef idx="0">
-            <a:schemeClr val="accent1"/>
-          </a:effectRef>
-          <a:fontRef idx="minor">
-            <a:schemeClr val="lt1"/>
-          </a:fontRef>
-        </p:style>
-        <p:txBody>
-          <a:bodyPr rtlCol="0" anchor="ctr"/>
-          <a:lstStyle/>
-          <a:p>
-            <a:pPr algn="ctr"/>
-            <a:endParaRPr lang="en-US"/>
-          </a:p>
-        </p:txBody>
-      </p:sp>
-      <p:pic>
-        <p:nvPicPr>
-          <p:cNvPr id="11" name="Picture 10">
-            <a:extLst>
-              <a:ext uri="{FF2B5EF4-FFF2-40B4-BE49-F238E27FC236}">
-                <a16:creationId xmlns:a16="http://schemas.microsoft.com/office/drawing/2014/main" xmlns="" id="{2270F1FA-0425-408F-9861-80BF5AFB276D}"/>
-              </a:ext>
-              <a:ext uri="{C183D7F6-B498-43B3-948B-1728B52AA6E4}">
-                <adec:decorative xmlns:adec="http://schemas.microsoft.com/office/drawing/2017/decorative" xmlns="" val="1"/>
-              </a:ext>
-            </a:extLst>
-          </p:cNvPr>
-          <p:cNvPicPr>
-            <a:picLocks noGrp="1" noRot="1" noChangeAspect="1" noMove="1" noResize="1" noEditPoints="1" noAdjustHandles="1" noChangeArrowheads="1" noChangeShapeType="1" noCrop="1"/>
-          </p:cNvPicPr>
-          <p:nvPr>
-            <p:extLst>
-              <p:ext uri="{386F3935-93C4-4BCD-93E2-E3B085C9AB24}">
-                <p16:designElem xmlns:p16="http://schemas.microsoft.com/office/powerpoint/2015/main" xmlns="" val="1"/>
-              </p:ext>
-            </p:extLst>
-          </p:nvPr>
-        </p:nvPicPr>
-        <p:blipFill>
-          <a:blip r:embed="rId3">
-            <a:extLst>
-              <a:ext uri="{28A0092B-C50C-407E-A947-70E740481C1C}">
-                <a14:useLocalDpi xmlns:a14="http://schemas.microsoft.com/office/drawing/2010/main" val="0"/>
-              </a:ext>
-            </a:extLst>
-          </a:blip>
-          <a:stretch>
-            <a:fillRect/>
-          </a:stretch>
-        </p:blipFill>
-        <p:spPr>
-          <a:xfrm>
-            <a:off x="0" y="0"/>
-            <a:ext cx="12192000" cy="6858000"/>
-          </a:xfrm>
-          <a:prstGeom prst="rect">
-            <a:avLst/>
-          </a:prstGeom>
-        </p:spPr>
-      </p:pic>
-      <p:sp>
-        <p:nvSpPr>
-          <p:cNvPr id="2" name="Title 1"/>
-          <p:cNvSpPr>
-            <a:spLocks noGrp="1"/>
-          </p:cNvSpPr>
-          <p:nvPr>
-            <p:ph type="title"/>
-          </p:nvPr>
-        </p:nvSpPr>
-        <p:spPr>
-          <a:xfrm>
-            <a:off x="3045368" y="2043663"/>
-            <a:ext cx="6105194" cy="2031055"/>
-          </a:xfrm>
-        </p:spPr>
-        <p:txBody>
-          <a:bodyPr vert="horz" lIns="91440" tIns="45720" rIns="91440" bIns="45720" rtlCol="0" anchor="b">
-            <a:normAutofit fontScale="90000"/>
-          </a:bodyPr>
-          <a:lstStyle/>
-          <a:p>
-            <a:pPr algn="ctr"/>
-            <a:r>
-              <a:rPr lang="en-US" sz="6000" dirty="0" err="1" smtClean="0">
+              <a:t>Muchas</a:t>
+            </a:r>
+            <a:r>
+              <a:rPr lang="en-US" sz="6000" dirty="0" smtClean="0">
                 <a:solidFill>
                   <a:srgbClr val="FFFFFF"/>
                 </a:solidFill>
               </a:rPr>
-              <a:t>Conclusión</a:t>
-            </a:r>
-            <a:r>
-              <a:rPr lang="en-US" sz="6000" dirty="0" smtClean="0">
-                <a:solidFill>
-                  <a:srgbClr val="FFFFFF"/>
-                </a:solidFill>
-              </a:rPr>
-              <a:t> </a:t>
-            </a:r>
-            <a:r>
-              <a:rPr lang="en-US" sz="6000" dirty="0" err="1" smtClean="0">
-                <a:solidFill>
-                  <a:srgbClr val="FFFFFF"/>
-                </a:solidFill>
-              </a:rPr>
-              <a:t>respecto</a:t>
-            </a:r>
-            <a:r>
-              <a:rPr lang="en-US" sz="6000" dirty="0" smtClean="0">
-                <a:solidFill>
-                  <a:srgbClr val="FFFFFF"/>
-                </a:solidFill>
-              </a:rPr>
-              <a:t> </a:t>
-            </a:r>
-            <a:r>
-              <a:rPr lang="en-US" sz="6000" dirty="0" err="1" smtClean="0">
-                <a:solidFill>
-                  <a:srgbClr val="FFFFFF"/>
-                </a:solidFill>
-              </a:rPr>
-              <a:t>resultado</a:t>
-            </a:r>
-            <a:r>
-              <a:rPr lang="en-US" sz="6000" dirty="0" smtClean="0">
-                <a:solidFill>
-                  <a:srgbClr val="FFFFFF"/>
-                </a:solidFill>
-              </a:rPr>
-              <a:t> </a:t>
-            </a:r>
-            <a:r>
-              <a:rPr lang="en-US" sz="6000" dirty="0" err="1" smtClean="0">
-                <a:solidFill>
-                  <a:srgbClr val="FFFFFF"/>
-                </a:solidFill>
-              </a:rPr>
-              <a:t>obtenido</a:t>
+              <a:t> gracias</a:t>
             </a:r>
             <a:r>
               <a:rPr lang="en-US" sz="6000" dirty="0" smtClean="0">
@@ -8924,29 +9902,10 @@
           </a:p>
         </p:txBody>
       </p:sp>
-      <p:sp>
-        <p:nvSpPr>
-          <p:cNvPr id="4" name="Marcador de contenido 3"/>
-          <p:cNvSpPr>
-            <a:spLocks noGrp="1"/>
-          </p:cNvSpPr>
-          <p:nvPr>
-            <p:ph idx="1"/>
-          </p:nvPr>
-        </p:nvSpPr>
-        <p:spPr/>
-        <p:txBody>
-          <a:bodyPr/>
-          <a:lstStyle/>
-          <a:p>
-            <a:endParaRPr lang="es-AR"/>
-          </a:p>
-        </p:txBody>
-      </p:sp>
     </p:spTree>
     <p:extLst>
       <p:ext uri="{BB962C8B-B14F-4D97-AF65-F5344CB8AC3E}">
-        <p14:creationId xmlns:p14="http://schemas.microsoft.com/office/powerpoint/2010/main" val="1675998307"/>
+        <p14:creationId xmlns:p14="http://schemas.microsoft.com/office/powerpoint/2010/main" val="159628449"/>
       </p:ext>
     </p:extLst>
   </p:cSld>

</xml_diff>

<commit_message>
Agrego algunas notas para el gráfico
</commit_message>
<xml_diff>
--- a/Simulación/datos Sistema/UTN - Simulacion - Equipo 5 -TP N°6 Picolo.pptx
+++ b/Simulación/datos Sistema/UTN - Simulacion - Equipo 5 -TP N°6 Picolo.pptx
@@ -1073,6 +1073,13 @@
         </dgm:presLayoutVars>
       </dgm:prSet>
       <dgm:spPr/>
+      <dgm:t>
+        <a:bodyPr/>
+        <a:lstStyle/>
+        <a:p>
+          <a:endParaRPr lang="es-AR"/>
+        </a:p>
+      </dgm:t>
     </dgm:pt>
     <dgm:pt modelId="{D8E33CA1-CCDF-4C3C-92DD-FBA31E116F65}" type="pres">
       <dgm:prSet presAssocID="{BBB06C8F-E8ED-40B4-8F13-4CC7EB6D63E8}" presName="compositeNode" presStyleCnt="0">
@@ -1085,6 +1092,13 @@
     <dgm:pt modelId="{8E7E9C74-B3AB-45E9-A991-40135130A03F}" type="pres">
       <dgm:prSet presAssocID="{BBB06C8F-E8ED-40B4-8F13-4CC7EB6D63E8}" presName="bgRect" presStyleLbl="alignNode1" presStyleIdx="0" presStyleCnt="4"/>
       <dgm:spPr/>
+      <dgm:t>
+        <a:bodyPr/>
+        <a:lstStyle/>
+        <a:p>
+          <a:endParaRPr lang="es-AR"/>
+        </a:p>
+      </dgm:t>
     </dgm:pt>
     <dgm:pt modelId="{65A50992-64FB-4EEF-9432-71F40A87DC3A}" type="pres">
       <dgm:prSet presAssocID="{D1DBF331-0AC7-4D87-B557-490CEB7A8DE5}" presName="sibTransNodeRect" presStyleLbl="alignNode1" presStyleIdx="0" presStyleCnt="4">
@@ -1094,6 +1108,13 @@
         </dgm:presLayoutVars>
       </dgm:prSet>
       <dgm:spPr/>
+      <dgm:t>
+        <a:bodyPr/>
+        <a:lstStyle/>
+        <a:p>
+          <a:endParaRPr lang="es-AR"/>
+        </a:p>
+      </dgm:t>
     </dgm:pt>
     <dgm:pt modelId="{34366F6F-8981-4435-AE4A-2CD5C4B2881B}" type="pres">
       <dgm:prSet presAssocID="{BBB06C8F-E8ED-40B4-8F13-4CC7EB6D63E8}" presName="nodeRect" presStyleLbl="alignNode1" presStyleIdx="0" presStyleCnt="4">
@@ -1102,6 +1123,13 @@
         </dgm:presLayoutVars>
       </dgm:prSet>
       <dgm:spPr/>
+      <dgm:t>
+        <a:bodyPr/>
+        <a:lstStyle/>
+        <a:p>
+          <a:endParaRPr lang="es-AR"/>
+        </a:p>
+      </dgm:t>
     </dgm:pt>
     <dgm:pt modelId="{841D5B65-6A4C-4A6F-87D0-1EE0F60A44BA}" type="pres">
       <dgm:prSet presAssocID="{D1DBF331-0AC7-4D87-B557-490CEB7A8DE5}" presName="sibTrans" presStyleCnt="0"/>
@@ -1118,6 +1146,13 @@
     <dgm:pt modelId="{433F3CC7-6513-4910-9F99-ADC51A38CF2B}" type="pres">
       <dgm:prSet presAssocID="{41FD6B3A-3EF6-4818-B49F-3B0F8130C76F}" presName="bgRect" presStyleLbl="alignNode1" presStyleIdx="1" presStyleCnt="4"/>
       <dgm:spPr/>
+      <dgm:t>
+        <a:bodyPr/>
+        <a:lstStyle/>
+        <a:p>
+          <a:endParaRPr lang="es-AR"/>
+        </a:p>
+      </dgm:t>
     </dgm:pt>
     <dgm:pt modelId="{502EDFF9-FBCC-4C31-9720-9AF174A3E27A}" type="pres">
       <dgm:prSet presAssocID="{A6EF63CB-8D82-42D3-95CF-F9AFF1C668BA}" presName="sibTransNodeRect" presStyleLbl="alignNode1" presStyleIdx="1" presStyleCnt="4">
@@ -1127,6 +1162,13 @@
         </dgm:presLayoutVars>
       </dgm:prSet>
       <dgm:spPr/>
+      <dgm:t>
+        <a:bodyPr/>
+        <a:lstStyle/>
+        <a:p>
+          <a:endParaRPr lang="es-AR"/>
+        </a:p>
+      </dgm:t>
     </dgm:pt>
     <dgm:pt modelId="{833AD9AE-640B-4257-9673-5E8AAC1426BD}" type="pres">
       <dgm:prSet presAssocID="{41FD6B3A-3EF6-4818-B49F-3B0F8130C76F}" presName="nodeRect" presStyleLbl="alignNode1" presStyleIdx="1" presStyleCnt="4">
@@ -1135,6 +1177,13 @@
         </dgm:presLayoutVars>
       </dgm:prSet>
       <dgm:spPr/>
+      <dgm:t>
+        <a:bodyPr/>
+        <a:lstStyle/>
+        <a:p>
+          <a:endParaRPr lang="es-AR"/>
+        </a:p>
+      </dgm:t>
     </dgm:pt>
     <dgm:pt modelId="{D98D2368-8A79-4F81-9384-D3CD89DB0991}" type="pres">
       <dgm:prSet presAssocID="{A6EF63CB-8D82-42D3-95CF-F9AFF1C668BA}" presName="sibTrans" presStyleCnt="0"/>
@@ -1151,6 +1200,13 @@
     <dgm:pt modelId="{8A8B7A71-9A01-4C1A-9663-F23EB1E8A092}" type="pres">
       <dgm:prSet presAssocID="{D9E2DE66-AFD9-4183-AA76-06083A101168}" presName="bgRect" presStyleLbl="alignNode1" presStyleIdx="2" presStyleCnt="4"/>
       <dgm:spPr/>
+      <dgm:t>
+        <a:bodyPr/>
+        <a:lstStyle/>
+        <a:p>
+          <a:endParaRPr lang="es-AR"/>
+        </a:p>
+      </dgm:t>
     </dgm:pt>
     <dgm:pt modelId="{0B2D323B-5F64-4B3A-AC15-D3DC2BC7124C}" type="pres">
       <dgm:prSet presAssocID="{BFB757BF-80A3-47B0-A125-AE9ACF66F784}" presName="sibTransNodeRect" presStyleLbl="alignNode1" presStyleIdx="2" presStyleCnt="4">
@@ -1160,6 +1216,13 @@
         </dgm:presLayoutVars>
       </dgm:prSet>
       <dgm:spPr/>
+      <dgm:t>
+        <a:bodyPr/>
+        <a:lstStyle/>
+        <a:p>
+          <a:endParaRPr lang="es-AR"/>
+        </a:p>
+      </dgm:t>
     </dgm:pt>
     <dgm:pt modelId="{143E65D1-7E89-4D49-843C-1F5CF3AC57E7}" type="pres">
       <dgm:prSet presAssocID="{D9E2DE66-AFD9-4183-AA76-06083A101168}" presName="nodeRect" presStyleLbl="alignNode1" presStyleIdx="2" presStyleCnt="4">
@@ -1168,6 +1231,13 @@
         </dgm:presLayoutVars>
       </dgm:prSet>
       <dgm:spPr/>
+      <dgm:t>
+        <a:bodyPr/>
+        <a:lstStyle/>
+        <a:p>
+          <a:endParaRPr lang="es-AR"/>
+        </a:p>
+      </dgm:t>
     </dgm:pt>
     <dgm:pt modelId="{16CEF422-BBA0-4270-A1C7-1749736A1D6F}" type="pres">
       <dgm:prSet presAssocID="{BFB757BF-80A3-47B0-A125-AE9ACF66F784}" presName="sibTrans" presStyleCnt="0"/>
@@ -1184,6 +1254,13 @@
     <dgm:pt modelId="{3614FA8F-1114-48EF-881F-6B8B32E3ED67}" type="pres">
       <dgm:prSet presAssocID="{CA877EA4-F6D0-401D-9A86-7340AAFBA362}" presName="bgRect" presStyleLbl="alignNode1" presStyleIdx="3" presStyleCnt="4"/>
       <dgm:spPr/>
+      <dgm:t>
+        <a:bodyPr/>
+        <a:lstStyle/>
+        <a:p>
+          <a:endParaRPr lang="es-AR"/>
+        </a:p>
+      </dgm:t>
     </dgm:pt>
     <dgm:pt modelId="{239DEE0D-8A3B-493D-A2EA-EA4A0020ABF2}" type="pres">
       <dgm:prSet presAssocID="{6E2C5268-C9B3-4905-BDA0-AD490F509366}" presName="sibTransNodeRect" presStyleLbl="alignNode1" presStyleIdx="3" presStyleCnt="4">
@@ -1193,6 +1270,13 @@
         </dgm:presLayoutVars>
       </dgm:prSet>
       <dgm:spPr/>
+      <dgm:t>
+        <a:bodyPr/>
+        <a:lstStyle/>
+        <a:p>
+          <a:endParaRPr lang="es-AR"/>
+        </a:p>
+      </dgm:t>
     </dgm:pt>
     <dgm:pt modelId="{D51427F6-6728-4BF2-9918-3213F1BA8024}" type="pres">
       <dgm:prSet presAssocID="{CA877EA4-F6D0-401D-9A86-7340AAFBA362}" presName="nodeRect" presStyleLbl="alignNode1" presStyleIdx="3" presStyleCnt="4">
@@ -1201,26 +1285,33 @@
         </dgm:presLayoutVars>
       </dgm:prSet>
       <dgm:spPr/>
+      <dgm:t>
+        <a:bodyPr/>
+        <a:lstStyle/>
+        <a:p>
+          <a:endParaRPr lang="es-AR"/>
+        </a:p>
+      </dgm:t>
     </dgm:pt>
   </dgm:ptLst>
   <dgm:cxnLst>
-    <dgm:cxn modelId="{4829290C-E2D9-40F3-A5C0-F2218FCE1AF9}" srcId="{21FE30F6-EED4-40C9-9C2D-858AE46976A9}" destId="{41FD6B3A-3EF6-4818-B49F-3B0F8130C76F}" srcOrd="1" destOrd="0" parTransId="{0B404EE5-ED84-4A53-AA88-ECD63F24B9BC}" sibTransId="{A6EF63CB-8D82-42D3-95CF-F9AFF1C668BA}"/>
+    <dgm:cxn modelId="{0E0287F8-9EEA-4EEC-83D1-611B73A772F1}" srcId="{21FE30F6-EED4-40C9-9C2D-858AE46976A9}" destId="{D9E2DE66-AFD9-4183-AA76-06083A101168}" srcOrd="2" destOrd="0" parTransId="{4295604B-1B18-499E-A69F-6B1BB3C8B693}" sibTransId="{BFB757BF-80A3-47B0-A125-AE9ACF66F784}"/>
     <dgm:cxn modelId="{8004260D-36C5-40CA-8FD0-1661AEB299B3}" type="presOf" srcId="{6E2C5268-C9B3-4905-BDA0-AD490F509366}" destId="{239DEE0D-8A3B-493D-A2EA-EA4A0020ABF2}" srcOrd="0" destOrd="0" presId="urn:microsoft.com/office/officeart/2016/7/layout/LinearBlockProcessNumbered"/>
-    <dgm:cxn modelId="{62D53615-4469-4915-B3EC-0FBC9835D4C0}" type="presOf" srcId="{D9E2DE66-AFD9-4183-AA76-06083A101168}" destId="{8A8B7A71-9A01-4C1A-9663-F23EB1E8A092}" srcOrd="0" destOrd="0" presId="urn:microsoft.com/office/officeart/2016/7/layout/LinearBlockProcessNumbered"/>
-    <dgm:cxn modelId="{1E690C20-E425-4F47-95FD-965A047E3161}" srcId="{21FE30F6-EED4-40C9-9C2D-858AE46976A9}" destId="{BBB06C8F-E8ED-40B4-8F13-4CC7EB6D63E8}" srcOrd="0" destOrd="0" parTransId="{08D03523-AF4B-4860-BA79-E377B2BAD7EA}" sibTransId="{D1DBF331-0AC7-4D87-B557-490CEB7A8DE5}"/>
-    <dgm:cxn modelId="{76671535-E509-4C2F-8809-8A18F8A0435A}" type="presOf" srcId="{CA877EA4-F6D0-401D-9A86-7340AAFBA362}" destId="{D51427F6-6728-4BF2-9918-3213F1BA8024}" srcOrd="1" destOrd="0" presId="urn:microsoft.com/office/officeart/2016/7/layout/LinearBlockProcessNumbered"/>
-    <dgm:cxn modelId="{C1FAEB3B-CAD2-420C-9801-158514975D2A}" type="presOf" srcId="{D9E2DE66-AFD9-4183-AA76-06083A101168}" destId="{143E65D1-7E89-4D49-843C-1F5CF3AC57E7}" srcOrd="1" destOrd="0" presId="urn:microsoft.com/office/officeart/2016/7/layout/LinearBlockProcessNumbered"/>
-    <dgm:cxn modelId="{FF987A65-990A-4550-810D-E668496DB799}" srcId="{21FE30F6-EED4-40C9-9C2D-858AE46976A9}" destId="{CA877EA4-F6D0-401D-9A86-7340AAFBA362}" srcOrd="3" destOrd="0" parTransId="{12E92071-F5EC-465A-9678-2785AD7A5666}" sibTransId="{6E2C5268-C9B3-4905-BDA0-AD490F509366}"/>
-    <dgm:cxn modelId="{C048A969-52BC-4121-B8F1-6C9B99BB4778}" type="presOf" srcId="{CA877EA4-F6D0-401D-9A86-7340AAFBA362}" destId="{3614FA8F-1114-48EF-881F-6B8B32E3ED67}" srcOrd="0" destOrd="0" presId="urn:microsoft.com/office/officeart/2016/7/layout/LinearBlockProcessNumbered"/>
-    <dgm:cxn modelId="{E1FE1C5A-642E-4291-B2BC-21A3AF94E90A}" type="presOf" srcId="{41FD6B3A-3EF6-4818-B49F-3B0F8130C76F}" destId="{833AD9AE-640B-4257-9673-5E8AAC1426BD}" srcOrd="1" destOrd="0" presId="urn:microsoft.com/office/officeart/2016/7/layout/LinearBlockProcessNumbered"/>
+    <dgm:cxn modelId="{5C9DA1DB-8ADA-4468-A098-278A6A9BDB29}" type="presOf" srcId="{A6EF63CB-8D82-42D3-95CF-F9AFF1C668BA}" destId="{502EDFF9-FBCC-4C31-9720-9AF174A3E27A}" srcOrd="0" destOrd="0" presId="urn:microsoft.com/office/officeart/2016/7/layout/LinearBlockProcessNumbered"/>
     <dgm:cxn modelId="{FFCB6490-B587-48F9-9F75-097EAC9D8828}" type="presOf" srcId="{21FE30F6-EED4-40C9-9C2D-858AE46976A9}" destId="{65799A87-9B45-4CC5-B4BF-125ED71BF0D3}" srcOrd="0" destOrd="0" presId="urn:microsoft.com/office/officeart/2016/7/layout/LinearBlockProcessNumbered"/>
     <dgm:cxn modelId="{4D1EDBAD-850A-4712-8554-7C628657DC86}" type="presOf" srcId="{D1DBF331-0AC7-4D87-B557-490CEB7A8DE5}" destId="{65A50992-64FB-4EEF-9432-71F40A87DC3A}" srcOrd="0" destOrd="0" presId="urn:microsoft.com/office/officeart/2016/7/layout/LinearBlockProcessNumbered"/>
     <dgm:cxn modelId="{787042BA-9027-472E-9722-E4BBAC13B5C6}" type="presOf" srcId="{BFB757BF-80A3-47B0-A125-AE9ACF66F784}" destId="{0B2D323B-5F64-4B3A-AC15-D3DC2BC7124C}" srcOrd="0" destOrd="0" presId="urn:microsoft.com/office/officeart/2016/7/layout/LinearBlockProcessNumbered"/>
+    <dgm:cxn modelId="{1E690C20-E425-4F47-95FD-965A047E3161}" srcId="{21FE30F6-EED4-40C9-9C2D-858AE46976A9}" destId="{BBB06C8F-E8ED-40B4-8F13-4CC7EB6D63E8}" srcOrd="0" destOrd="0" parTransId="{08D03523-AF4B-4860-BA79-E377B2BAD7EA}" sibTransId="{D1DBF331-0AC7-4D87-B557-490CEB7A8DE5}"/>
+    <dgm:cxn modelId="{FF987A65-990A-4550-810D-E668496DB799}" srcId="{21FE30F6-EED4-40C9-9C2D-858AE46976A9}" destId="{CA877EA4-F6D0-401D-9A86-7340AAFBA362}" srcOrd="3" destOrd="0" parTransId="{12E92071-F5EC-465A-9678-2785AD7A5666}" sibTransId="{6E2C5268-C9B3-4905-BDA0-AD490F509366}"/>
+    <dgm:cxn modelId="{E1FE1C5A-642E-4291-B2BC-21A3AF94E90A}" type="presOf" srcId="{41FD6B3A-3EF6-4818-B49F-3B0F8130C76F}" destId="{833AD9AE-640B-4257-9673-5E8AAC1426BD}" srcOrd="1" destOrd="0" presId="urn:microsoft.com/office/officeart/2016/7/layout/LinearBlockProcessNumbered"/>
+    <dgm:cxn modelId="{C048A969-52BC-4121-B8F1-6C9B99BB4778}" type="presOf" srcId="{CA877EA4-F6D0-401D-9A86-7340AAFBA362}" destId="{3614FA8F-1114-48EF-881F-6B8B32E3ED67}" srcOrd="0" destOrd="0" presId="urn:microsoft.com/office/officeart/2016/7/layout/LinearBlockProcessNumbered"/>
+    <dgm:cxn modelId="{62D53615-4469-4915-B3EC-0FBC9835D4C0}" type="presOf" srcId="{D9E2DE66-AFD9-4183-AA76-06083A101168}" destId="{8A8B7A71-9A01-4C1A-9663-F23EB1E8A092}" srcOrd="0" destOrd="0" presId="urn:microsoft.com/office/officeart/2016/7/layout/LinearBlockProcessNumbered"/>
+    <dgm:cxn modelId="{6A8F14DA-9AC9-48A1-BDA1-CB1E49E5E09F}" type="presOf" srcId="{41FD6B3A-3EF6-4818-B49F-3B0F8130C76F}" destId="{433F3CC7-6513-4910-9F99-ADC51A38CF2B}" srcOrd="0" destOrd="0" presId="urn:microsoft.com/office/officeart/2016/7/layout/LinearBlockProcessNumbered"/>
     <dgm:cxn modelId="{0E5744BE-0038-4E7D-B14E-0AD582002374}" type="presOf" srcId="{BBB06C8F-E8ED-40B4-8F13-4CC7EB6D63E8}" destId="{8E7E9C74-B3AB-45E9-A991-40135130A03F}" srcOrd="0" destOrd="0" presId="urn:microsoft.com/office/officeart/2016/7/layout/LinearBlockProcessNumbered"/>
-    <dgm:cxn modelId="{6A8F14DA-9AC9-48A1-BDA1-CB1E49E5E09F}" type="presOf" srcId="{41FD6B3A-3EF6-4818-B49F-3B0F8130C76F}" destId="{433F3CC7-6513-4910-9F99-ADC51A38CF2B}" srcOrd="0" destOrd="0" presId="urn:microsoft.com/office/officeart/2016/7/layout/LinearBlockProcessNumbered"/>
-    <dgm:cxn modelId="{5C9DA1DB-8ADA-4468-A098-278A6A9BDB29}" type="presOf" srcId="{A6EF63CB-8D82-42D3-95CF-F9AFF1C668BA}" destId="{502EDFF9-FBCC-4C31-9720-9AF174A3E27A}" srcOrd="0" destOrd="0" presId="urn:microsoft.com/office/officeart/2016/7/layout/LinearBlockProcessNumbered"/>
+    <dgm:cxn modelId="{C1FAEB3B-CAD2-420C-9801-158514975D2A}" type="presOf" srcId="{D9E2DE66-AFD9-4183-AA76-06083A101168}" destId="{143E65D1-7E89-4D49-843C-1F5CF3AC57E7}" srcOrd="1" destOrd="0" presId="urn:microsoft.com/office/officeart/2016/7/layout/LinearBlockProcessNumbered"/>
+    <dgm:cxn modelId="{4829290C-E2D9-40F3-A5C0-F2218FCE1AF9}" srcId="{21FE30F6-EED4-40C9-9C2D-858AE46976A9}" destId="{41FD6B3A-3EF6-4818-B49F-3B0F8130C76F}" srcOrd="1" destOrd="0" parTransId="{0B404EE5-ED84-4A53-AA88-ECD63F24B9BC}" sibTransId="{A6EF63CB-8D82-42D3-95CF-F9AFF1C668BA}"/>
     <dgm:cxn modelId="{341B5FE9-D6DA-45CA-9045-63492D77F79E}" type="presOf" srcId="{BBB06C8F-E8ED-40B4-8F13-4CC7EB6D63E8}" destId="{34366F6F-8981-4435-AE4A-2CD5C4B2881B}" srcOrd="1" destOrd="0" presId="urn:microsoft.com/office/officeart/2016/7/layout/LinearBlockProcessNumbered"/>
-    <dgm:cxn modelId="{0E0287F8-9EEA-4EEC-83D1-611B73A772F1}" srcId="{21FE30F6-EED4-40C9-9C2D-858AE46976A9}" destId="{D9E2DE66-AFD9-4183-AA76-06083A101168}" srcOrd="2" destOrd="0" parTransId="{4295604B-1B18-499E-A69F-6B1BB3C8B693}" sibTransId="{BFB757BF-80A3-47B0-A125-AE9ACF66F784}"/>
+    <dgm:cxn modelId="{76671535-E509-4C2F-8809-8A18F8A0435A}" type="presOf" srcId="{CA877EA4-F6D0-401D-9A86-7340AAFBA362}" destId="{D51427F6-6728-4BF2-9918-3213F1BA8024}" srcOrd="1" destOrd="0" presId="urn:microsoft.com/office/officeart/2016/7/layout/LinearBlockProcessNumbered"/>
     <dgm:cxn modelId="{B10D3618-3DEC-4CD3-9A33-26CD3EA7129B}" type="presParOf" srcId="{65799A87-9B45-4CC5-B4BF-125ED71BF0D3}" destId="{D8E33CA1-CCDF-4C3C-92DD-FBA31E116F65}" srcOrd="0" destOrd="0" presId="urn:microsoft.com/office/officeart/2016/7/layout/LinearBlockProcessNumbered"/>
     <dgm:cxn modelId="{117D843C-92E1-4B2E-8C8B-99A3CF55547A}" type="presParOf" srcId="{D8E33CA1-CCDF-4C3C-92DD-FBA31E116F65}" destId="{8E7E9C74-B3AB-45E9-A991-40135130A03F}" srcOrd="0" destOrd="0" presId="urn:microsoft.com/office/officeart/2016/7/layout/LinearBlockProcessNumbered"/>
     <dgm:cxn modelId="{3C5508E3-6457-4D7A-831B-A0AF3B778E6F}" type="presParOf" srcId="{D8E33CA1-CCDF-4C3C-92DD-FBA31E116F65}" destId="{65A50992-64FB-4EEF-9432-71F40A87DC3A}" srcOrd="1" destOrd="0" presId="urn:microsoft.com/office/officeart/2016/7/layout/LinearBlockProcessNumbered"/>
@@ -1314,7 +1405,7 @@
         </a:bodyPr>
         <a:lstStyle/>
         <a:p>
-          <a:pPr marL="0" lvl="0" indent="0" algn="l" defTabSz="889000">
+          <a:pPr lvl="0" algn="l" defTabSz="889000">
             <a:lnSpc>
               <a:spcPct val="90000"/>
             </a:lnSpc>
@@ -1324,7 +1415,6 @@
             <a:spcAft>
               <a:spcPct val="35000"/>
             </a:spcAft>
-            <a:buNone/>
           </a:pPr>
           <a:r>
             <a:rPr lang="es-AR" sz="2000" kern="1200" dirty="0"/>
@@ -1380,7 +1470,7 @@
         </a:bodyPr>
         <a:lstStyle/>
         <a:p>
-          <a:pPr marL="0" lvl="0" indent="0" algn="l" defTabSz="889000">
+          <a:pPr lvl="0" algn="l" defTabSz="889000">
             <a:lnSpc>
               <a:spcPct val="90000"/>
             </a:lnSpc>
@@ -1390,7 +1480,6 @@
             <a:spcAft>
               <a:spcPct val="35000"/>
             </a:spcAft>
-            <a:buNone/>
           </a:pPr>
           <a:endParaRPr lang="en-US" sz="2000" kern="1200"/>
         </a:p>
@@ -1455,7 +1544,7 @@
         </a:bodyPr>
         <a:lstStyle/>
         <a:p>
-          <a:pPr marL="0" lvl="0" indent="0" algn="l" defTabSz="889000">
+          <a:pPr lvl="0" algn="l" defTabSz="889000">
             <a:lnSpc>
               <a:spcPct val="90000"/>
             </a:lnSpc>
@@ -1465,7 +1554,6 @@
             <a:spcAft>
               <a:spcPct val="35000"/>
             </a:spcAft>
-            <a:buNone/>
           </a:pPr>
           <a:r>
             <a:rPr lang="es-AR" sz="2000" kern="1200" dirty="0"/>
@@ -1521,7 +1609,7 @@
         </a:bodyPr>
         <a:lstStyle/>
         <a:p>
-          <a:pPr marL="0" lvl="0" indent="0" algn="l" defTabSz="889000">
+          <a:pPr lvl="0" algn="l" defTabSz="889000">
             <a:lnSpc>
               <a:spcPct val="90000"/>
             </a:lnSpc>
@@ -1531,7 +1619,6 @@
             <a:spcAft>
               <a:spcPct val="35000"/>
             </a:spcAft>
-            <a:buNone/>
           </a:pPr>
           <a:endParaRPr lang="en-US" sz="2000" kern="1200"/>
         </a:p>
@@ -1596,7 +1683,7 @@
         </a:bodyPr>
         <a:lstStyle/>
         <a:p>
-          <a:pPr marL="0" lvl="0" indent="0" algn="l" defTabSz="889000">
+          <a:pPr lvl="0" algn="l" defTabSz="889000">
             <a:lnSpc>
               <a:spcPct val="90000"/>
             </a:lnSpc>
@@ -1606,7 +1693,6 @@
             <a:spcAft>
               <a:spcPct val="35000"/>
             </a:spcAft>
-            <a:buNone/>
           </a:pPr>
           <a:r>
             <a:rPr lang="es-AR" sz="2000" kern="1200" dirty="0"/>
@@ -1662,7 +1748,7 @@
         </a:bodyPr>
         <a:lstStyle/>
         <a:p>
-          <a:pPr marL="0" lvl="0" indent="0" algn="l" defTabSz="889000">
+          <a:pPr lvl="0" algn="l" defTabSz="889000">
             <a:lnSpc>
               <a:spcPct val="90000"/>
             </a:lnSpc>
@@ -1672,7 +1758,6 @@
             <a:spcAft>
               <a:spcPct val="35000"/>
             </a:spcAft>
-            <a:buNone/>
           </a:pPr>
           <a:endParaRPr lang="en-US" sz="2000" kern="1200"/>
         </a:p>
@@ -1737,7 +1822,7 @@
         </a:bodyPr>
         <a:lstStyle/>
         <a:p>
-          <a:pPr marL="0" lvl="0" indent="0" algn="l" defTabSz="889000">
+          <a:pPr lvl="0" algn="l" defTabSz="889000">
             <a:lnSpc>
               <a:spcPct val="90000"/>
             </a:lnSpc>
@@ -1747,7 +1832,6 @@
             <a:spcAft>
               <a:spcPct val="35000"/>
             </a:spcAft>
-            <a:buNone/>
           </a:pPr>
           <a:r>
             <a:rPr lang="es-AR" sz="2000" kern="1200" dirty="0"/>
@@ -1803,7 +1887,7 @@
         </a:bodyPr>
         <a:lstStyle/>
         <a:p>
-          <a:pPr marL="0" lvl="0" indent="0" algn="l" defTabSz="889000">
+          <a:pPr lvl="0" algn="l" defTabSz="889000">
             <a:lnSpc>
               <a:spcPct val="90000"/>
             </a:lnSpc>
@@ -1813,7 +1897,6 @@
             <a:spcAft>
               <a:spcPct val="35000"/>
             </a:spcAft>
-            <a:buNone/>
           </a:pPr>
           <a:endParaRPr lang="en-US" sz="2000" kern="1200"/>
         </a:p>
@@ -2081,7 +2164,7 @@
   </dgm:layoutNode>
   <dgm:extLst>
     <a:ext uri="{4F341089-5ED1-44EC-B178-C955D00A3D55}">
-      <dgm1611:autoBuNodeInfoLst xmlns:dgm1611="http://schemas.microsoft.com/office/drawing/2016/11/diagram">
+      <dgm1611:autoBuNodeInfoLst xmlns:dgm1611="http://schemas.microsoft.com/office/drawing/2016/11/diagram" xmlns="">
         <dgm1611:autoBuNodeInfo lvl="1" ptType="sibTrans">
           <dgm1611:buPr prefix="" leadZeros="1">
             <a:buAutoNum type="arabicParenBoth"/>
@@ -3692,6 +3775,146 @@
       </p:grpSpPr>
       <p:sp>
         <p:nvSpPr>
+          <p:cNvPr id="2" name="Marcador de imagen de diapositiva 1"/>
+          <p:cNvSpPr>
+            <a:spLocks noGrp="1" noRot="1" noChangeAspect="1"/>
+          </p:cNvSpPr>
+          <p:nvPr>
+            <p:ph type="sldImg"/>
+          </p:nvPr>
+        </p:nvSpPr>
+        <p:spPr/>
+      </p:sp>
+      <p:sp>
+        <p:nvSpPr>
+          <p:cNvPr id="3" name="Marcador de notas 2"/>
+          <p:cNvSpPr>
+            <a:spLocks noGrp="1"/>
+          </p:cNvSpPr>
+          <p:nvPr>
+            <p:ph type="body" idx="1"/>
+          </p:nvPr>
+        </p:nvSpPr>
+        <p:spPr/>
+        <p:txBody>
+          <a:bodyPr/>
+          <a:lstStyle/>
+          <a:p>
+            <a:r>
+              <a:rPr lang="es-AR" dirty="0" smtClean="0"/>
+              <a:t>Temas a tener en cuenta:</a:t>
+            </a:r>
+          </a:p>
+          <a:p>
+            <a:pPr marL="171450" indent="-171450">
+              <a:buFontTx/>
+              <a:buChar char="-"/>
+            </a:pPr>
+            <a:r>
+              <a:rPr lang="es-AR" dirty="0" smtClean="0"/>
+              <a:t>Se reduce el tiempo de espera a medida que se suman</a:t>
+            </a:r>
+            <a:r>
+              <a:rPr lang="es-AR" baseline="0" dirty="0" smtClean="0"/>
+              <a:t> mas operadores MDSTI</a:t>
+            </a:r>
+          </a:p>
+          <a:p>
+            <a:pPr marL="171450" indent="-171450">
+              <a:buFontTx/>
+              <a:buChar char="-"/>
+            </a:pPr>
+            <a:r>
+              <a:rPr lang="es-AR" baseline="0" dirty="0" smtClean="0"/>
+              <a:t>Hay mayor cantidad de llamados para MDSTI</a:t>
+            </a:r>
+          </a:p>
+          <a:p>
+            <a:pPr marL="171450" indent="-171450">
+              <a:buFontTx/>
+              <a:buChar char="-"/>
+            </a:pPr>
+            <a:r>
+              <a:rPr lang="es-AR" baseline="0" dirty="0" smtClean="0"/>
+              <a:t>Promedio del tiempo ocioso de </a:t>
+            </a:r>
+            <a:r>
+              <a:rPr lang="es-AR" baseline="0" dirty="0" err="1" smtClean="0"/>
+              <a:t>Sap</a:t>
+            </a:r>
+            <a:r>
+              <a:rPr lang="es-AR" baseline="0" dirty="0" smtClean="0"/>
+              <a:t> se mantiene debido a los pocos </a:t>
+            </a:r>
+            <a:r>
+              <a:rPr lang="es-AR" baseline="0" smtClean="0"/>
+              <a:t>llamados que tiene.</a:t>
+            </a:r>
+          </a:p>
+          <a:p>
+            <a:pPr marL="171450" indent="-171450">
+              <a:buFontTx/>
+              <a:buChar char="-"/>
+            </a:pPr>
+            <a:endParaRPr lang="es-AR" baseline="0" dirty="0" smtClean="0"/>
+          </a:p>
+        </p:txBody>
+      </p:sp>
+      <p:sp>
+        <p:nvSpPr>
+          <p:cNvPr id="4" name="Marcador de número de diapositiva 3"/>
+          <p:cNvSpPr>
+            <a:spLocks noGrp="1"/>
+          </p:cNvSpPr>
+          <p:nvPr>
+            <p:ph type="sldNum" sz="quarter" idx="10"/>
+          </p:nvPr>
+        </p:nvSpPr>
+        <p:spPr/>
+        <p:txBody>
+          <a:bodyPr/>
+          <a:lstStyle/>
+          <a:p>
+            <a:fld id="{E0746DE6-3336-457D-A091-FA20AC1C536E}" type="slidenum">
+              <a:rPr lang="en-US" smtClean="0"/>
+              <a:t>6</a:t>
+            </a:fld>
+            <a:endParaRPr lang="en-US"/>
+          </a:p>
+        </p:txBody>
+      </p:sp>
+    </p:spTree>
+    <p:extLst>
+      <p:ext uri="{BB962C8B-B14F-4D97-AF65-F5344CB8AC3E}">
+        <p14:creationId xmlns:p14="http://schemas.microsoft.com/office/powerpoint/2010/main" val="3335587376"/>
+      </p:ext>
+    </p:extLst>
+  </p:cSld>
+  <p:clrMapOvr>
+    <a:masterClrMapping/>
+  </p:clrMapOvr>
+</p:notes>
+</file>
+
+<file path=ppt/notesSlides/notesSlide4.xml><?xml version="1.0" encoding="utf-8"?>
+<p:notes xmlns:a="http://schemas.openxmlformats.org/drawingml/2006/main" xmlns:r="http://schemas.openxmlformats.org/officeDocument/2006/relationships" xmlns:p="http://schemas.openxmlformats.org/presentationml/2006/main">
+  <p:cSld>
+    <p:spTree>
+      <p:nvGrpSpPr>
+        <p:cNvPr id="1" name=""/>
+        <p:cNvGrpSpPr/>
+        <p:nvPr/>
+      </p:nvGrpSpPr>
+      <p:grpSpPr>
+        <a:xfrm>
+          <a:off x="0" y="0"/>
+          <a:ext cx="0" cy="0"/>
+          <a:chOff x="0" y="0"/>
+          <a:chExt cx="0" cy="0"/>
+        </a:xfrm>
+      </p:grpSpPr>
+      <p:sp>
+        <p:nvSpPr>
           <p:cNvPr id="2" name="Slide Image Placeholder 1"/>
           <p:cNvSpPr>
             <a:spLocks noGrp="1" noRot="1" noChangeAspect="1"/>
@@ -3812,7 +4035,7 @@
           <p:cNvPr id="2" name="Title 1">
             <a:extLst>
               <a:ext uri="{FF2B5EF4-FFF2-40B4-BE49-F238E27FC236}">
-                <a16:creationId xmlns:a16="http://schemas.microsoft.com/office/drawing/2014/main" id="{DE0391AB-F383-4237-A071-AD1C6E9246D2}"/>
+                <a16:creationId xmlns:a16="http://schemas.microsoft.com/office/drawing/2014/main" xmlns="" id="{DE0391AB-F383-4237-A071-AD1C6E9246D2}"/>
               </a:ext>
             </a:extLst>
           </p:cNvPr>
@@ -3850,7 +4073,7 @@
           <p:cNvPr id="3" name="Subtitle 2">
             <a:extLst>
               <a:ext uri="{FF2B5EF4-FFF2-40B4-BE49-F238E27FC236}">
-                <a16:creationId xmlns:a16="http://schemas.microsoft.com/office/drawing/2014/main" id="{7F6636DA-4FDE-4B32-8CCE-37EFA3E75799}"/>
+                <a16:creationId xmlns:a16="http://schemas.microsoft.com/office/drawing/2014/main" xmlns="" id="{7F6636DA-4FDE-4B32-8CCE-37EFA3E75799}"/>
               </a:ext>
             </a:extLst>
           </p:cNvPr>
@@ -3921,7 +4144,7 @@
           <p:cNvPr id="4" name="Date Placeholder 3">
             <a:extLst>
               <a:ext uri="{FF2B5EF4-FFF2-40B4-BE49-F238E27FC236}">
-                <a16:creationId xmlns:a16="http://schemas.microsoft.com/office/drawing/2014/main" id="{30F87932-8FF0-4DF1-A776-9A3CE37618A7}"/>
+                <a16:creationId xmlns:a16="http://schemas.microsoft.com/office/drawing/2014/main" xmlns="" id="{30F87932-8FF0-4DF1-A776-9A3CE37618A7}"/>
               </a:ext>
             </a:extLst>
           </p:cNvPr>
@@ -3950,7 +4173,7 @@
           <p:cNvPr id="5" name="Footer Placeholder 4">
             <a:extLst>
               <a:ext uri="{FF2B5EF4-FFF2-40B4-BE49-F238E27FC236}">
-                <a16:creationId xmlns:a16="http://schemas.microsoft.com/office/drawing/2014/main" id="{5F38FAB8-C9F1-4DBB-B355-D8DEE370657B}"/>
+                <a16:creationId xmlns:a16="http://schemas.microsoft.com/office/drawing/2014/main" xmlns="" id="{5F38FAB8-C9F1-4DBB-B355-D8DEE370657B}"/>
               </a:ext>
             </a:extLst>
           </p:cNvPr>
@@ -3975,7 +4198,7 @@
           <p:cNvPr id="6" name="Slide Number Placeholder 5">
             <a:extLst>
               <a:ext uri="{FF2B5EF4-FFF2-40B4-BE49-F238E27FC236}">
-                <a16:creationId xmlns:a16="http://schemas.microsoft.com/office/drawing/2014/main" id="{F24490E3-D8E8-4766-9104-14009BF5636F}"/>
+                <a16:creationId xmlns:a16="http://schemas.microsoft.com/office/drawing/2014/main" xmlns="" id="{F24490E3-D8E8-4766-9104-14009BF5636F}"/>
               </a:ext>
             </a:extLst>
           </p:cNvPr>
@@ -4034,7 +4257,7 @@
           <p:cNvPr id="2" name="Title 1">
             <a:extLst>
               <a:ext uri="{FF2B5EF4-FFF2-40B4-BE49-F238E27FC236}">
-                <a16:creationId xmlns:a16="http://schemas.microsoft.com/office/drawing/2014/main" id="{303B8678-553E-4A5B-8CFE-5DB358BDF358}"/>
+                <a16:creationId xmlns:a16="http://schemas.microsoft.com/office/drawing/2014/main" xmlns="" id="{303B8678-553E-4A5B-8CFE-5DB358BDF358}"/>
               </a:ext>
             </a:extLst>
           </p:cNvPr>
@@ -4063,7 +4286,7 @@
           <p:cNvPr id="3" name="Vertical Text Placeholder 2">
             <a:extLst>
               <a:ext uri="{FF2B5EF4-FFF2-40B4-BE49-F238E27FC236}">
-                <a16:creationId xmlns:a16="http://schemas.microsoft.com/office/drawing/2014/main" id="{E43AF303-1F73-4575-83E6-561589F1632E}"/>
+                <a16:creationId xmlns:a16="http://schemas.microsoft.com/office/drawing/2014/main" xmlns="" id="{E43AF303-1F73-4575-83E6-561589F1632E}"/>
               </a:ext>
             </a:extLst>
           </p:cNvPr>
@@ -4121,7 +4344,7 @@
           <p:cNvPr id="4" name="Date Placeholder 3">
             <a:extLst>
               <a:ext uri="{FF2B5EF4-FFF2-40B4-BE49-F238E27FC236}">
-                <a16:creationId xmlns:a16="http://schemas.microsoft.com/office/drawing/2014/main" id="{2436EC56-7DCF-400D-A871-C26291EB10AD}"/>
+                <a16:creationId xmlns:a16="http://schemas.microsoft.com/office/drawing/2014/main" xmlns="" id="{2436EC56-7DCF-400D-A871-C26291EB10AD}"/>
               </a:ext>
             </a:extLst>
           </p:cNvPr>
@@ -4150,7 +4373,7 @@
           <p:cNvPr id="5" name="Footer Placeholder 4">
             <a:extLst>
               <a:ext uri="{FF2B5EF4-FFF2-40B4-BE49-F238E27FC236}">
-                <a16:creationId xmlns:a16="http://schemas.microsoft.com/office/drawing/2014/main" id="{17FFAC5B-7C77-4F8C-ADB0-8D208A2EB303}"/>
+                <a16:creationId xmlns:a16="http://schemas.microsoft.com/office/drawing/2014/main" xmlns="" id="{17FFAC5B-7C77-4F8C-ADB0-8D208A2EB303}"/>
               </a:ext>
             </a:extLst>
           </p:cNvPr>
@@ -4175,7 +4398,7 @@
           <p:cNvPr id="6" name="Slide Number Placeholder 5">
             <a:extLst>
               <a:ext uri="{FF2B5EF4-FFF2-40B4-BE49-F238E27FC236}">
-                <a16:creationId xmlns:a16="http://schemas.microsoft.com/office/drawing/2014/main" id="{BD2F48AF-AB8F-4DD2-BC77-7E2F42AD3B87}"/>
+                <a16:creationId xmlns:a16="http://schemas.microsoft.com/office/drawing/2014/main" xmlns="" id="{BD2F48AF-AB8F-4DD2-BC77-7E2F42AD3B87}"/>
               </a:ext>
             </a:extLst>
           </p:cNvPr>
@@ -4234,7 +4457,7 @@
           <p:cNvPr id="2" name="Vertical Title 1">
             <a:extLst>
               <a:ext uri="{FF2B5EF4-FFF2-40B4-BE49-F238E27FC236}">
-                <a16:creationId xmlns:a16="http://schemas.microsoft.com/office/drawing/2014/main" id="{A20ED820-BFE6-41B5-8064-984037A999A8}"/>
+                <a16:creationId xmlns:a16="http://schemas.microsoft.com/office/drawing/2014/main" xmlns="" id="{A20ED820-BFE6-41B5-8064-984037A999A8}"/>
               </a:ext>
             </a:extLst>
           </p:cNvPr>
@@ -4268,7 +4491,7 @@
           <p:cNvPr id="3" name="Vertical Text Placeholder 2">
             <a:extLst>
               <a:ext uri="{FF2B5EF4-FFF2-40B4-BE49-F238E27FC236}">
-                <a16:creationId xmlns:a16="http://schemas.microsoft.com/office/drawing/2014/main" id="{9CA27FEA-5359-474A-B4F8-FF510DD7489A}"/>
+                <a16:creationId xmlns:a16="http://schemas.microsoft.com/office/drawing/2014/main" xmlns="" id="{9CA27FEA-5359-474A-B4F8-FF510DD7489A}"/>
               </a:ext>
             </a:extLst>
           </p:cNvPr>
@@ -4331,7 +4554,7 @@
           <p:cNvPr id="4" name="Date Placeholder 3">
             <a:extLst>
               <a:ext uri="{FF2B5EF4-FFF2-40B4-BE49-F238E27FC236}">
-                <a16:creationId xmlns:a16="http://schemas.microsoft.com/office/drawing/2014/main" id="{D14DD33D-563C-4B8C-B8C1-625FF5C5B85D}"/>
+                <a16:creationId xmlns:a16="http://schemas.microsoft.com/office/drawing/2014/main" xmlns="" id="{D14DD33D-563C-4B8C-B8C1-625FF5C5B85D}"/>
               </a:ext>
             </a:extLst>
           </p:cNvPr>
@@ -4360,7 +4583,7 @@
           <p:cNvPr id="5" name="Footer Placeholder 4">
             <a:extLst>
               <a:ext uri="{FF2B5EF4-FFF2-40B4-BE49-F238E27FC236}">
-                <a16:creationId xmlns:a16="http://schemas.microsoft.com/office/drawing/2014/main" id="{40471877-89FD-46BE-832F-C5660A5567D2}"/>
+                <a16:creationId xmlns:a16="http://schemas.microsoft.com/office/drawing/2014/main" xmlns="" id="{40471877-89FD-46BE-832F-C5660A5567D2}"/>
               </a:ext>
             </a:extLst>
           </p:cNvPr>
@@ -4385,7 +4608,7 @@
           <p:cNvPr id="6" name="Slide Number Placeholder 5">
             <a:extLst>
               <a:ext uri="{FF2B5EF4-FFF2-40B4-BE49-F238E27FC236}">
-                <a16:creationId xmlns:a16="http://schemas.microsoft.com/office/drawing/2014/main" id="{0E6E675F-CC4D-48CF-90C8-53829EE08B8C}"/>
+                <a16:creationId xmlns:a16="http://schemas.microsoft.com/office/drawing/2014/main" xmlns="" id="{0E6E675F-CC4D-48CF-90C8-53829EE08B8C}"/>
               </a:ext>
             </a:extLst>
           </p:cNvPr>
@@ -4444,7 +4667,7 @@
           <p:cNvPr id="2" name="Title 1">
             <a:extLst>
               <a:ext uri="{FF2B5EF4-FFF2-40B4-BE49-F238E27FC236}">
-                <a16:creationId xmlns:a16="http://schemas.microsoft.com/office/drawing/2014/main" id="{E8CBC967-18DB-4664-9B4D-06177FB946B3}"/>
+                <a16:creationId xmlns:a16="http://schemas.microsoft.com/office/drawing/2014/main" xmlns="" id="{E8CBC967-18DB-4664-9B4D-06177FB946B3}"/>
               </a:ext>
             </a:extLst>
           </p:cNvPr>
@@ -4473,7 +4696,7 @@
           <p:cNvPr id="3" name="Content Placeholder 2">
             <a:extLst>
               <a:ext uri="{FF2B5EF4-FFF2-40B4-BE49-F238E27FC236}">
-                <a16:creationId xmlns:a16="http://schemas.microsoft.com/office/drawing/2014/main" id="{5ADF7174-64B4-4D8F-BF44-3DD1F66CAD00}"/>
+                <a16:creationId xmlns:a16="http://schemas.microsoft.com/office/drawing/2014/main" xmlns="" id="{5ADF7174-64B4-4D8F-BF44-3DD1F66CAD00}"/>
               </a:ext>
             </a:extLst>
           </p:cNvPr>
@@ -4531,7 +4754,7 @@
           <p:cNvPr id="4" name="Date Placeholder 3">
             <a:extLst>
               <a:ext uri="{FF2B5EF4-FFF2-40B4-BE49-F238E27FC236}">
-                <a16:creationId xmlns:a16="http://schemas.microsoft.com/office/drawing/2014/main" id="{55CD83D3-86C4-482F-A2DC-B4C55DBF3F7A}"/>
+                <a16:creationId xmlns:a16="http://schemas.microsoft.com/office/drawing/2014/main" xmlns="" id="{55CD83D3-86C4-482F-A2DC-B4C55DBF3F7A}"/>
               </a:ext>
             </a:extLst>
           </p:cNvPr>
@@ -4560,7 +4783,7 @@
           <p:cNvPr id="5" name="Footer Placeholder 4">
             <a:extLst>
               <a:ext uri="{FF2B5EF4-FFF2-40B4-BE49-F238E27FC236}">
-                <a16:creationId xmlns:a16="http://schemas.microsoft.com/office/drawing/2014/main" id="{DCF05BE2-6C23-4CB4-A63E-457E635BF267}"/>
+                <a16:creationId xmlns:a16="http://schemas.microsoft.com/office/drawing/2014/main" xmlns="" id="{DCF05BE2-6C23-4CB4-A63E-457E635BF267}"/>
               </a:ext>
             </a:extLst>
           </p:cNvPr>
@@ -4585,7 +4808,7 @@
           <p:cNvPr id="6" name="Slide Number Placeholder 5">
             <a:extLst>
               <a:ext uri="{FF2B5EF4-FFF2-40B4-BE49-F238E27FC236}">
-                <a16:creationId xmlns:a16="http://schemas.microsoft.com/office/drawing/2014/main" id="{1C097965-24FE-4C07-BE16-69AE439950EF}"/>
+                <a16:creationId xmlns:a16="http://schemas.microsoft.com/office/drawing/2014/main" xmlns="" id="{1C097965-24FE-4C07-BE16-69AE439950EF}"/>
               </a:ext>
             </a:extLst>
           </p:cNvPr>
@@ -4644,7 +4867,7 @@
           <p:cNvPr id="2" name="Title 1">
             <a:extLst>
               <a:ext uri="{FF2B5EF4-FFF2-40B4-BE49-F238E27FC236}">
-                <a16:creationId xmlns:a16="http://schemas.microsoft.com/office/drawing/2014/main" id="{7233394D-04EF-440C-B08B-114464B315C6}"/>
+                <a16:creationId xmlns:a16="http://schemas.microsoft.com/office/drawing/2014/main" xmlns="" id="{7233394D-04EF-440C-B08B-114464B315C6}"/>
               </a:ext>
             </a:extLst>
           </p:cNvPr>
@@ -4682,7 +4905,7 @@
           <p:cNvPr id="3" name="Text Placeholder 2">
             <a:extLst>
               <a:ext uri="{FF2B5EF4-FFF2-40B4-BE49-F238E27FC236}">
-                <a16:creationId xmlns:a16="http://schemas.microsoft.com/office/drawing/2014/main" id="{BBEBE3F6-F021-4D6B-8B0D-EF74D7461F93}"/>
+                <a16:creationId xmlns:a16="http://schemas.microsoft.com/office/drawing/2014/main" xmlns="" id="{BBEBE3F6-F021-4D6B-8B0D-EF74D7461F93}"/>
               </a:ext>
             </a:extLst>
           </p:cNvPr>
@@ -4807,7 +5030,7 @@
           <p:cNvPr id="4" name="Date Placeholder 3">
             <a:extLst>
               <a:ext uri="{FF2B5EF4-FFF2-40B4-BE49-F238E27FC236}">
-                <a16:creationId xmlns:a16="http://schemas.microsoft.com/office/drawing/2014/main" id="{B196233C-6806-4593-91C0-CF4ECD84A601}"/>
+                <a16:creationId xmlns:a16="http://schemas.microsoft.com/office/drawing/2014/main" xmlns="" id="{B196233C-6806-4593-91C0-CF4ECD84A601}"/>
               </a:ext>
             </a:extLst>
           </p:cNvPr>
@@ -4836,7 +5059,7 @@
           <p:cNvPr id="5" name="Footer Placeholder 4">
             <a:extLst>
               <a:ext uri="{FF2B5EF4-FFF2-40B4-BE49-F238E27FC236}">
-                <a16:creationId xmlns:a16="http://schemas.microsoft.com/office/drawing/2014/main" id="{963A761E-2D3A-4397-A82C-2F3B981DE045}"/>
+                <a16:creationId xmlns:a16="http://schemas.microsoft.com/office/drawing/2014/main" xmlns="" id="{963A761E-2D3A-4397-A82C-2F3B981DE045}"/>
               </a:ext>
             </a:extLst>
           </p:cNvPr>
@@ -4861,7 +5084,7 @@
           <p:cNvPr id="6" name="Slide Number Placeholder 5">
             <a:extLst>
               <a:ext uri="{FF2B5EF4-FFF2-40B4-BE49-F238E27FC236}">
-                <a16:creationId xmlns:a16="http://schemas.microsoft.com/office/drawing/2014/main" id="{68297E71-B59F-4260-B01B-2B7CEB0896BD}"/>
+                <a16:creationId xmlns:a16="http://schemas.microsoft.com/office/drawing/2014/main" xmlns="" id="{68297E71-B59F-4260-B01B-2B7CEB0896BD}"/>
               </a:ext>
             </a:extLst>
           </p:cNvPr>
@@ -4920,7 +5143,7 @@
           <p:cNvPr id="2" name="Title 1">
             <a:extLst>
               <a:ext uri="{FF2B5EF4-FFF2-40B4-BE49-F238E27FC236}">
-                <a16:creationId xmlns:a16="http://schemas.microsoft.com/office/drawing/2014/main" id="{5C94DFCB-DD40-4637-9CAB-2BAF24231C79}"/>
+                <a16:creationId xmlns:a16="http://schemas.microsoft.com/office/drawing/2014/main" xmlns="" id="{5C94DFCB-DD40-4637-9CAB-2BAF24231C79}"/>
               </a:ext>
             </a:extLst>
           </p:cNvPr>
@@ -4949,7 +5172,7 @@
           <p:cNvPr id="3" name="Content Placeholder 2">
             <a:extLst>
               <a:ext uri="{FF2B5EF4-FFF2-40B4-BE49-F238E27FC236}">
-                <a16:creationId xmlns:a16="http://schemas.microsoft.com/office/drawing/2014/main" id="{5394065F-4B44-4622-98EE-166F936489F5}"/>
+                <a16:creationId xmlns:a16="http://schemas.microsoft.com/office/drawing/2014/main" xmlns="" id="{5394065F-4B44-4622-98EE-166F936489F5}"/>
               </a:ext>
             </a:extLst>
           </p:cNvPr>
@@ -5012,7 +5235,7 @@
           <p:cNvPr id="4" name="Content Placeholder 3">
             <a:extLst>
               <a:ext uri="{FF2B5EF4-FFF2-40B4-BE49-F238E27FC236}">
-                <a16:creationId xmlns:a16="http://schemas.microsoft.com/office/drawing/2014/main" id="{67AF1249-B890-4466-9E24-84A24907008B}"/>
+                <a16:creationId xmlns:a16="http://schemas.microsoft.com/office/drawing/2014/main" xmlns="" id="{67AF1249-B890-4466-9E24-84A24907008B}"/>
               </a:ext>
             </a:extLst>
           </p:cNvPr>
@@ -5075,7 +5298,7 @@
           <p:cNvPr id="5" name="Date Placeholder 4">
             <a:extLst>
               <a:ext uri="{FF2B5EF4-FFF2-40B4-BE49-F238E27FC236}">
-                <a16:creationId xmlns:a16="http://schemas.microsoft.com/office/drawing/2014/main" id="{850FA9B4-D282-452F-B78A-FF5873ACF45A}"/>
+                <a16:creationId xmlns:a16="http://schemas.microsoft.com/office/drawing/2014/main" xmlns="" id="{850FA9B4-D282-452F-B78A-FF5873ACF45A}"/>
               </a:ext>
             </a:extLst>
           </p:cNvPr>
@@ -5104,7 +5327,7 @@
           <p:cNvPr id="6" name="Footer Placeholder 5">
             <a:extLst>
               <a:ext uri="{FF2B5EF4-FFF2-40B4-BE49-F238E27FC236}">
-                <a16:creationId xmlns:a16="http://schemas.microsoft.com/office/drawing/2014/main" id="{6E9B0F13-A139-4B66-9544-16480800F680}"/>
+                <a16:creationId xmlns:a16="http://schemas.microsoft.com/office/drawing/2014/main" xmlns="" id="{6E9B0F13-A139-4B66-9544-16480800F680}"/>
               </a:ext>
             </a:extLst>
           </p:cNvPr>
@@ -5129,7 +5352,7 @@
           <p:cNvPr id="7" name="Slide Number Placeholder 6">
             <a:extLst>
               <a:ext uri="{FF2B5EF4-FFF2-40B4-BE49-F238E27FC236}">
-                <a16:creationId xmlns:a16="http://schemas.microsoft.com/office/drawing/2014/main" id="{7B8791D0-EC30-4D8C-8764-475D8DB34F19}"/>
+                <a16:creationId xmlns:a16="http://schemas.microsoft.com/office/drawing/2014/main" xmlns="" id="{7B8791D0-EC30-4D8C-8764-475D8DB34F19}"/>
               </a:ext>
             </a:extLst>
           </p:cNvPr>
@@ -5188,7 +5411,7 @@
           <p:cNvPr id="2" name="Title 1">
             <a:extLst>
               <a:ext uri="{FF2B5EF4-FFF2-40B4-BE49-F238E27FC236}">
-                <a16:creationId xmlns:a16="http://schemas.microsoft.com/office/drawing/2014/main" id="{4133AA7D-15D2-4D5F-B1C4-501073416DE8}"/>
+                <a16:creationId xmlns:a16="http://schemas.microsoft.com/office/drawing/2014/main" xmlns="" id="{4133AA7D-15D2-4D5F-B1C4-501073416DE8}"/>
               </a:ext>
             </a:extLst>
           </p:cNvPr>
@@ -5222,7 +5445,7 @@
           <p:cNvPr id="3" name="Text Placeholder 2">
             <a:extLst>
               <a:ext uri="{FF2B5EF4-FFF2-40B4-BE49-F238E27FC236}">
-                <a16:creationId xmlns:a16="http://schemas.microsoft.com/office/drawing/2014/main" id="{65E80A0E-25B9-4E8E-8B0D-201E1C564096}"/>
+                <a16:creationId xmlns:a16="http://schemas.microsoft.com/office/drawing/2014/main" xmlns="" id="{65E80A0E-25B9-4E8E-8B0D-201E1C564096}"/>
               </a:ext>
             </a:extLst>
           </p:cNvPr>
@@ -5293,7 +5516,7 @@
           <p:cNvPr id="4" name="Content Placeholder 3">
             <a:extLst>
               <a:ext uri="{FF2B5EF4-FFF2-40B4-BE49-F238E27FC236}">
-                <a16:creationId xmlns:a16="http://schemas.microsoft.com/office/drawing/2014/main" id="{3189B111-0CA0-47CD-9F0B-DBCBA3AE3C28}"/>
+                <a16:creationId xmlns:a16="http://schemas.microsoft.com/office/drawing/2014/main" xmlns="" id="{3189B111-0CA0-47CD-9F0B-DBCBA3AE3C28}"/>
               </a:ext>
             </a:extLst>
           </p:cNvPr>
@@ -5356,7 +5579,7 @@
           <p:cNvPr id="5" name="Text Placeholder 4">
             <a:extLst>
               <a:ext uri="{FF2B5EF4-FFF2-40B4-BE49-F238E27FC236}">
-                <a16:creationId xmlns:a16="http://schemas.microsoft.com/office/drawing/2014/main" id="{EEF0E02D-3176-4B85-ACB6-721F2682742C}"/>
+                <a16:creationId xmlns:a16="http://schemas.microsoft.com/office/drawing/2014/main" xmlns="" id="{EEF0E02D-3176-4B85-ACB6-721F2682742C}"/>
               </a:ext>
             </a:extLst>
           </p:cNvPr>
@@ -5427,7 +5650,7 @@
           <p:cNvPr id="6" name="Content Placeholder 5">
             <a:extLst>
               <a:ext uri="{FF2B5EF4-FFF2-40B4-BE49-F238E27FC236}">
-                <a16:creationId xmlns:a16="http://schemas.microsoft.com/office/drawing/2014/main" id="{EC7D9317-BBE1-4F36-82FE-E348F6F18A97}"/>
+                <a16:creationId xmlns:a16="http://schemas.microsoft.com/office/drawing/2014/main" xmlns="" id="{EC7D9317-BBE1-4F36-82FE-E348F6F18A97}"/>
               </a:ext>
             </a:extLst>
           </p:cNvPr>
@@ -5490,7 +5713,7 @@
           <p:cNvPr id="7" name="Date Placeholder 6">
             <a:extLst>
               <a:ext uri="{FF2B5EF4-FFF2-40B4-BE49-F238E27FC236}">
-                <a16:creationId xmlns:a16="http://schemas.microsoft.com/office/drawing/2014/main" id="{D837DDCB-69F8-49FA-A111-C8AB271389E7}"/>
+                <a16:creationId xmlns:a16="http://schemas.microsoft.com/office/drawing/2014/main" xmlns="" id="{D837DDCB-69F8-49FA-A111-C8AB271389E7}"/>
               </a:ext>
             </a:extLst>
           </p:cNvPr>
@@ -5519,7 +5742,7 @@
           <p:cNvPr id="8" name="Footer Placeholder 7">
             <a:extLst>
               <a:ext uri="{FF2B5EF4-FFF2-40B4-BE49-F238E27FC236}">
-                <a16:creationId xmlns:a16="http://schemas.microsoft.com/office/drawing/2014/main" id="{4A18B0CD-1F68-412E-9232-F267114CA754}"/>
+                <a16:creationId xmlns:a16="http://schemas.microsoft.com/office/drawing/2014/main" xmlns="" id="{4A18B0CD-1F68-412E-9232-F267114CA754}"/>
               </a:ext>
             </a:extLst>
           </p:cNvPr>
@@ -5544,7 +5767,7 @@
           <p:cNvPr id="9" name="Slide Number Placeholder 8">
             <a:extLst>
               <a:ext uri="{FF2B5EF4-FFF2-40B4-BE49-F238E27FC236}">
-                <a16:creationId xmlns:a16="http://schemas.microsoft.com/office/drawing/2014/main" id="{429B21FC-12CC-472D-BC38-EF413158CC5D}"/>
+                <a16:creationId xmlns:a16="http://schemas.microsoft.com/office/drawing/2014/main" xmlns="" id="{429B21FC-12CC-472D-BC38-EF413158CC5D}"/>
               </a:ext>
             </a:extLst>
           </p:cNvPr>
@@ -5603,7 +5826,7 @@
           <p:cNvPr id="2" name="Title 1">
             <a:extLst>
               <a:ext uri="{FF2B5EF4-FFF2-40B4-BE49-F238E27FC236}">
-                <a16:creationId xmlns:a16="http://schemas.microsoft.com/office/drawing/2014/main" id="{D00F51AB-8384-4E67-914C-B39484AD2332}"/>
+                <a16:creationId xmlns:a16="http://schemas.microsoft.com/office/drawing/2014/main" xmlns="" id="{D00F51AB-8384-4E67-914C-B39484AD2332}"/>
               </a:ext>
             </a:extLst>
           </p:cNvPr>
@@ -5632,7 +5855,7 @@
           <p:cNvPr id="3" name="Date Placeholder 2">
             <a:extLst>
               <a:ext uri="{FF2B5EF4-FFF2-40B4-BE49-F238E27FC236}">
-                <a16:creationId xmlns:a16="http://schemas.microsoft.com/office/drawing/2014/main" id="{A0909660-3861-4545-BF68-9ED039B5D0F0}"/>
+                <a16:creationId xmlns:a16="http://schemas.microsoft.com/office/drawing/2014/main" xmlns="" id="{A0909660-3861-4545-BF68-9ED039B5D0F0}"/>
               </a:ext>
             </a:extLst>
           </p:cNvPr>
@@ -5661,7 +5884,7 @@
           <p:cNvPr id="4" name="Footer Placeholder 3">
             <a:extLst>
               <a:ext uri="{FF2B5EF4-FFF2-40B4-BE49-F238E27FC236}">
-                <a16:creationId xmlns:a16="http://schemas.microsoft.com/office/drawing/2014/main" id="{FDDD5392-AC3A-4EAF-ADE6-B6CF4B50ACAD}"/>
+                <a16:creationId xmlns:a16="http://schemas.microsoft.com/office/drawing/2014/main" xmlns="" id="{FDDD5392-AC3A-4EAF-ADE6-B6CF4B50ACAD}"/>
               </a:ext>
             </a:extLst>
           </p:cNvPr>
@@ -5686,7 +5909,7 @@
           <p:cNvPr id="5" name="Slide Number Placeholder 4">
             <a:extLst>
               <a:ext uri="{FF2B5EF4-FFF2-40B4-BE49-F238E27FC236}">
-                <a16:creationId xmlns:a16="http://schemas.microsoft.com/office/drawing/2014/main" id="{F5679880-BF48-4F4D-B8B3-4E99FC415FF9}"/>
+                <a16:creationId xmlns:a16="http://schemas.microsoft.com/office/drawing/2014/main" xmlns="" id="{F5679880-BF48-4F4D-B8B3-4E99FC415FF9}"/>
               </a:ext>
             </a:extLst>
           </p:cNvPr>
@@ -5745,7 +5968,7 @@
           <p:cNvPr id="2" name="Date Placeholder 1">
             <a:extLst>
               <a:ext uri="{FF2B5EF4-FFF2-40B4-BE49-F238E27FC236}">
-                <a16:creationId xmlns:a16="http://schemas.microsoft.com/office/drawing/2014/main" id="{C7F98E25-CF37-4F73-9E22-210238167867}"/>
+                <a16:creationId xmlns:a16="http://schemas.microsoft.com/office/drawing/2014/main" xmlns="" id="{C7F98E25-CF37-4F73-9E22-210238167867}"/>
               </a:ext>
             </a:extLst>
           </p:cNvPr>
@@ -5774,7 +5997,7 @@
           <p:cNvPr id="3" name="Footer Placeholder 2">
             <a:extLst>
               <a:ext uri="{FF2B5EF4-FFF2-40B4-BE49-F238E27FC236}">
-                <a16:creationId xmlns:a16="http://schemas.microsoft.com/office/drawing/2014/main" id="{89D7A0E1-38AB-4FDA-8EC1-2D7617909C16}"/>
+                <a16:creationId xmlns:a16="http://schemas.microsoft.com/office/drawing/2014/main" xmlns="" id="{89D7A0E1-38AB-4FDA-8EC1-2D7617909C16}"/>
               </a:ext>
             </a:extLst>
           </p:cNvPr>
@@ -5799,7 +6022,7 @@
           <p:cNvPr id="4" name="Slide Number Placeholder 3">
             <a:extLst>
               <a:ext uri="{FF2B5EF4-FFF2-40B4-BE49-F238E27FC236}">
-                <a16:creationId xmlns:a16="http://schemas.microsoft.com/office/drawing/2014/main" id="{18A8E424-5A91-4557-9ADF-4A9422A0690D}"/>
+                <a16:creationId xmlns:a16="http://schemas.microsoft.com/office/drawing/2014/main" xmlns="" id="{18A8E424-5A91-4557-9ADF-4A9422A0690D}"/>
               </a:ext>
             </a:extLst>
           </p:cNvPr>
@@ -5858,7 +6081,7 @@
           <p:cNvPr id="2" name="Title 1">
             <a:extLst>
               <a:ext uri="{FF2B5EF4-FFF2-40B4-BE49-F238E27FC236}">
-                <a16:creationId xmlns:a16="http://schemas.microsoft.com/office/drawing/2014/main" id="{006BB935-0427-44CC-A384-333EAD83175F}"/>
+                <a16:creationId xmlns:a16="http://schemas.microsoft.com/office/drawing/2014/main" xmlns="" id="{006BB935-0427-44CC-A384-333EAD83175F}"/>
               </a:ext>
             </a:extLst>
           </p:cNvPr>
@@ -5896,7 +6119,7 @@
           <p:cNvPr id="3" name="Content Placeholder 2">
             <a:extLst>
               <a:ext uri="{FF2B5EF4-FFF2-40B4-BE49-F238E27FC236}">
-                <a16:creationId xmlns:a16="http://schemas.microsoft.com/office/drawing/2014/main" id="{CCB9DCF6-55CF-43EE-B135-BFC4B4D403CE}"/>
+                <a16:creationId xmlns:a16="http://schemas.microsoft.com/office/drawing/2014/main" xmlns="" id="{CCB9DCF6-55CF-43EE-B135-BFC4B4D403CE}"/>
               </a:ext>
             </a:extLst>
           </p:cNvPr>
@@ -5987,7 +6210,7 @@
           <p:cNvPr id="4" name="Text Placeholder 3">
             <a:extLst>
               <a:ext uri="{FF2B5EF4-FFF2-40B4-BE49-F238E27FC236}">
-                <a16:creationId xmlns:a16="http://schemas.microsoft.com/office/drawing/2014/main" id="{4337538E-A112-4E8F-A445-1A06B0C35309}"/>
+                <a16:creationId xmlns:a16="http://schemas.microsoft.com/office/drawing/2014/main" xmlns="" id="{4337538E-A112-4E8F-A445-1A06B0C35309}"/>
               </a:ext>
             </a:extLst>
           </p:cNvPr>
@@ -6058,7 +6281,7 @@
           <p:cNvPr id="5" name="Date Placeholder 4">
             <a:extLst>
               <a:ext uri="{FF2B5EF4-FFF2-40B4-BE49-F238E27FC236}">
-                <a16:creationId xmlns:a16="http://schemas.microsoft.com/office/drawing/2014/main" id="{E530D413-9505-4ED8-BFF1-5141BE9EE3C4}"/>
+                <a16:creationId xmlns:a16="http://schemas.microsoft.com/office/drawing/2014/main" xmlns="" id="{E530D413-9505-4ED8-BFF1-5141BE9EE3C4}"/>
               </a:ext>
             </a:extLst>
           </p:cNvPr>
@@ -6087,7 +6310,7 @@
           <p:cNvPr id="6" name="Footer Placeholder 5">
             <a:extLst>
               <a:ext uri="{FF2B5EF4-FFF2-40B4-BE49-F238E27FC236}">
-                <a16:creationId xmlns:a16="http://schemas.microsoft.com/office/drawing/2014/main" id="{F60815B0-4528-4FA2-8472-8F19C0F1650D}"/>
+                <a16:creationId xmlns:a16="http://schemas.microsoft.com/office/drawing/2014/main" xmlns="" id="{F60815B0-4528-4FA2-8472-8F19C0F1650D}"/>
               </a:ext>
             </a:extLst>
           </p:cNvPr>
@@ -6112,7 +6335,7 @@
           <p:cNvPr id="7" name="Slide Number Placeholder 6">
             <a:extLst>
               <a:ext uri="{FF2B5EF4-FFF2-40B4-BE49-F238E27FC236}">
-                <a16:creationId xmlns:a16="http://schemas.microsoft.com/office/drawing/2014/main" id="{B5C9FCEF-4406-4552-BFE4-6DA3761357F2}"/>
+                <a16:creationId xmlns:a16="http://schemas.microsoft.com/office/drawing/2014/main" xmlns="" id="{B5C9FCEF-4406-4552-BFE4-6DA3761357F2}"/>
               </a:ext>
             </a:extLst>
           </p:cNvPr>
@@ -6171,7 +6394,7 @@
           <p:cNvPr id="2" name="Title 1">
             <a:extLst>
               <a:ext uri="{FF2B5EF4-FFF2-40B4-BE49-F238E27FC236}">
-                <a16:creationId xmlns:a16="http://schemas.microsoft.com/office/drawing/2014/main" id="{F25CE22C-69D4-49EC-8858-787B3C67B0DA}"/>
+                <a16:creationId xmlns:a16="http://schemas.microsoft.com/office/drawing/2014/main" xmlns="" id="{F25CE22C-69D4-49EC-8858-787B3C67B0DA}"/>
               </a:ext>
             </a:extLst>
           </p:cNvPr>
@@ -6209,7 +6432,7 @@
           <p:cNvPr id="3" name="Picture Placeholder 2">
             <a:extLst>
               <a:ext uri="{FF2B5EF4-FFF2-40B4-BE49-F238E27FC236}">
-                <a16:creationId xmlns:a16="http://schemas.microsoft.com/office/drawing/2014/main" id="{346A4341-3C0B-4025-AE17-8F0F8FABF5D3}"/>
+                <a16:creationId xmlns:a16="http://schemas.microsoft.com/office/drawing/2014/main" xmlns="" id="{346A4341-3C0B-4025-AE17-8F0F8FABF5D3}"/>
               </a:ext>
             </a:extLst>
           </p:cNvPr>
@@ -6280,7 +6503,7 @@
           <p:cNvPr id="4" name="Text Placeholder 3">
             <a:extLst>
               <a:ext uri="{FF2B5EF4-FFF2-40B4-BE49-F238E27FC236}">
-                <a16:creationId xmlns:a16="http://schemas.microsoft.com/office/drawing/2014/main" id="{DEF5FF01-E0B6-419C-ABCC-70844E4EACB8}"/>
+                <a16:creationId xmlns:a16="http://schemas.microsoft.com/office/drawing/2014/main" xmlns="" id="{DEF5FF01-E0B6-419C-ABCC-70844E4EACB8}"/>
               </a:ext>
             </a:extLst>
           </p:cNvPr>
@@ -6351,7 +6574,7 @@
           <p:cNvPr id="5" name="Date Placeholder 4">
             <a:extLst>
               <a:ext uri="{FF2B5EF4-FFF2-40B4-BE49-F238E27FC236}">
-                <a16:creationId xmlns:a16="http://schemas.microsoft.com/office/drawing/2014/main" id="{92501218-FFD7-4F25-B220-F5DE5F70693C}"/>
+                <a16:creationId xmlns:a16="http://schemas.microsoft.com/office/drawing/2014/main" xmlns="" id="{92501218-FFD7-4F25-B220-F5DE5F70693C}"/>
               </a:ext>
             </a:extLst>
           </p:cNvPr>
@@ -6380,7 +6603,7 @@
           <p:cNvPr id="6" name="Footer Placeholder 5">
             <a:extLst>
               <a:ext uri="{FF2B5EF4-FFF2-40B4-BE49-F238E27FC236}">
-                <a16:creationId xmlns:a16="http://schemas.microsoft.com/office/drawing/2014/main" id="{9687CBFB-34A6-49D8-A1D2-45DF38876EED}"/>
+                <a16:creationId xmlns:a16="http://schemas.microsoft.com/office/drawing/2014/main" xmlns="" id="{9687CBFB-34A6-49D8-A1D2-45DF38876EED}"/>
               </a:ext>
             </a:extLst>
           </p:cNvPr>
@@ -6405,7 +6628,7 @@
           <p:cNvPr id="7" name="Slide Number Placeholder 6">
             <a:extLst>
               <a:ext uri="{FF2B5EF4-FFF2-40B4-BE49-F238E27FC236}">
-                <a16:creationId xmlns:a16="http://schemas.microsoft.com/office/drawing/2014/main" id="{0C2726A4-D33A-486A-B120-648AF3D8BA76}"/>
+                <a16:creationId xmlns:a16="http://schemas.microsoft.com/office/drawing/2014/main" xmlns="" id="{0C2726A4-D33A-486A-B120-648AF3D8BA76}"/>
               </a:ext>
             </a:extLst>
           </p:cNvPr>
@@ -6469,7 +6692,7 @@
           <p:cNvPr id="2" name="Title Placeholder 1">
             <a:extLst>
               <a:ext uri="{FF2B5EF4-FFF2-40B4-BE49-F238E27FC236}">
-                <a16:creationId xmlns:a16="http://schemas.microsoft.com/office/drawing/2014/main" id="{9C07C8C3-4165-4353-ABF2-492454AF91ED}"/>
+                <a16:creationId xmlns:a16="http://schemas.microsoft.com/office/drawing/2014/main" xmlns="" id="{9C07C8C3-4165-4353-ABF2-492454AF91ED}"/>
               </a:ext>
             </a:extLst>
           </p:cNvPr>
@@ -6508,7 +6731,7 @@
           <p:cNvPr id="3" name="Text Placeholder 2">
             <a:extLst>
               <a:ext uri="{FF2B5EF4-FFF2-40B4-BE49-F238E27FC236}">
-                <a16:creationId xmlns:a16="http://schemas.microsoft.com/office/drawing/2014/main" id="{289AA46A-3C66-4E4A-9907-225E50ABB7AE}"/>
+                <a16:creationId xmlns:a16="http://schemas.microsoft.com/office/drawing/2014/main" xmlns="" id="{289AA46A-3C66-4E4A-9907-225E50ABB7AE}"/>
               </a:ext>
             </a:extLst>
           </p:cNvPr>
@@ -6576,7 +6799,7 @@
           <p:cNvPr id="4" name="Date Placeholder 3">
             <a:extLst>
               <a:ext uri="{FF2B5EF4-FFF2-40B4-BE49-F238E27FC236}">
-                <a16:creationId xmlns:a16="http://schemas.microsoft.com/office/drawing/2014/main" id="{E57F8214-A11A-4309-9D51-44F35987D1BD}"/>
+                <a16:creationId xmlns:a16="http://schemas.microsoft.com/office/drawing/2014/main" xmlns="" id="{E57F8214-A11A-4309-9D51-44F35987D1BD}"/>
               </a:ext>
             </a:extLst>
           </p:cNvPr>
@@ -6623,7 +6846,7 @@
           <p:cNvPr id="5" name="Footer Placeholder 4">
             <a:extLst>
               <a:ext uri="{FF2B5EF4-FFF2-40B4-BE49-F238E27FC236}">
-                <a16:creationId xmlns:a16="http://schemas.microsoft.com/office/drawing/2014/main" id="{D6A334EB-8260-4F13-9553-5A8593D9DC6B}"/>
+                <a16:creationId xmlns:a16="http://schemas.microsoft.com/office/drawing/2014/main" xmlns="" id="{D6A334EB-8260-4F13-9553-5A8593D9DC6B}"/>
               </a:ext>
             </a:extLst>
           </p:cNvPr>
@@ -6666,7 +6889,7 @@
           <p:cNvPr id="6" name="Slide Number Placeholder 5">
             <a:extLst>
               <a:ext uri="{FF2B5EF4-FFF2-40B4-BE49-F238E27FC236}">
-                <a16:creationId xmlns:a16="http://schemas.microsoft.com/office/drawing/2014/main" id="{00C1EF96-E028-4E68-864E-9B77CF9F25E0}"/>
+                <a16:creationId xmlns:a16="http://schemas.microsoft.com/office/drawing/2014/main" xmlns="" id="{00C1EF96-E028-4E68-864E-9B77CF9F25E0}"/>
               </a:ext>
             </a:extLst>
           </p:cNvPr>
@@ -7042,10 +7265,10 @@
           <p:cNvPr id="27" name="Rectangle 26">
             <a:extLst>
               <a:ext uri="{FF2B5EF4-FFF2-40B4-BE49-F238E27FC236}">
-                <a16:creationId xmlns:a16="http://schemas.microsoft.com/office/drawing/2014/main" id="{0BC9EFE1-D8CB-4668-9980-DB108327A794}"/>
+                <a16:creationId xmlns:a16="http://schemas.microsoft.com/office/drawing/2014/main" xmlns="" id="{0BC9EFE1-D8CB-4668-9980-DB108327A794}"/>
               </a:ext>
               <a:ext uri="{C183D7F6-B498-43B3-948B-1728B52AA6E4}">
-                <adec:decorative xmlns:adec="http://schemas.microsoft.com/office/drawing/2017/decorative" val="1"/>
+                <adec:decorative xmlns:adec="http://schemas.microsoft.com/office/drawing/2017/decorative" xmlns="" val="1"/>
               </a:ext>
             </a:extLst>
           </p:cNvPr>
@@ -7055,7 +7278,7 @@
           <p:nvPr>
             <p:extLst>
               <p:ext uri="{386F3935-93C4-4BCD-93E2-E3B085C9AB24}">
-                <p16:designElem xmlns:p16="http://schemas.microsoft.com/office/powerpoint/2015/main" val="1"/>
+                <p16:designElem xmlns:p16="http://schemas.microsoft.com/office/powerpoint/2015/main" xmlns="" val="1"/>
               </p:ext>
             </p:extLst>
           </p:nvPr>
@@ -7128,10 +7351,10 @@
           <p:cNvPr id="29" name="Picture 28">
             <a:extLst>
               <a:ext uri="{FF2B5EF4-FFF2-40B4-BE49-F238E27FC236}">
-                <a16:creationId xmlns:a16="http://schemas.microsoft.com/office/drawing/2014/main" id="{7CBAE1BD-B8E4-4029-8AA2-C77E4FED9864}"/>
+                <a16:creationId xmlns:a16="http://schemas.microsoft.com/office/drawing/2014/main" xmlns="" id="{7CBAE1BD-B8E4-4029-8AA2-C77E4FED9864}"/>
               </a:ext>
               <a:ext uri="{C183D7F6-B498-43B3-948B-1728B52AA6E4}">
-                <adec:decorative xmlns:adec="http://schemas.microsoft.com/office/drawing/2017/decorative" val="1"/>
+                <adec:decorative xmlns:adec="http://schemas.microsoft.com/office/drawing/2017/decorative" xmlns="" val="1"/>
               </a:ext>
             </a:extLst>
           </p:cNvPr>
@@ -7141,7 +7364,7 @@
           <p:nvPr>
             <p:extLst>
               <p:ext uri="{386F3935-93C4-4BCD-93E2-E3B085C9AB24}">
-                <p16:designElem xmlns:p16="http://schemas.microsoft.com/office/powerpoint/2015/main" val="1"/>
+                <p16:designElem xmlns:p16="http://schemas.microsoft.com/office/powerpoint/2015/main" xmlns="" val="1"/>
               </p:ext>
             </p:extLst>
           </p:nvPr>
@@ -7256,10 +7479,10 @@
           <p:cNvPr id="31" name="Freeform 49">
             <a:extLst>
               <a:ext uri="{FF2B5EF4-FFF2-40B4-BE49-F238E27FC236}">
-                <a16:creationId xmlns:a16="http://schemas.microsoft.com/office/drawing/2014/main" id="{77DA6D33-2D62-458C-BF5D-DBF612FD557E}"/>
+                <a16:creationId xmlns:a16="http://schemas.microsoft.com/office/drawing/2014/main" xmlns="" id="{77DA6D33-2D62-458C-BF5D-DBF612FD557E}"/>
               </a:ext>
               <a:ext uri="{C183D7F6-B498-43B3-948B-1728B52AA6E4}">
-                <adec:decorative xmlns:adec="http://schemas.microsoft.com/office/drawing/2017/decorative" val="1"/>
+                <adec:decorative xmlns:adec="http://schemas.microsoft.com/office/drawing/2017/decorative" xmlns="" val="1"/>
               </a:ext>
             </a:extLst>
           </p:cNvPr>
@@ -7269,7 +7492,7 @@
           <p:nvPr>
             <p:extLst>
               <p:ext uri="{386F3935-93C4-4BCD-93E2-E3B085C9AB24}">
-                <p16:designElem xmlns:p16="http://schemas.microsoft.com/office/powerpoint/2015/main" val="1"/>
+                <p16:designElem xmlns:p16="http://schemas.microsoft.com/office/powerpoint/2015/main" xmlns="" val="1"/>
               </p:ext>
             </p:extLst>
           </p:nvPr>
@@ -7595,6 +7818,13 @@
   <p:clrMapOvr>
     <a:masterClrMapping/>
   </p:clrMapOvr>
+  <p:timing>
+    <p:tnLst>
+      <p:par>
+        <p:cTn id="1" dur="indefinite" restart="never" nodeType="tmRoot"/>
+      </p:par>
+    </p:tnLst>
+  </p:timing>
 </p:sld>
 </file>
 
@@ -7628,10 +7858,10 @@
           <p:cNvPr id="18" name="Rectangle 17">
             <a:extLst>
               <a:ext uri="{FF2B5EF4-FFF2-40B4-BE49-F238E27FC236}">
-                <a16:creationId xmlns:a16="http://schemas.microsoft.com/office/drawing/2014/main" id="{3B854194-185D-494D-905C-7C7CB2E30F6E}"/>
+                <a16:creationId xmlns:a16="http://schemas.microsoft.com/office/drawing/2014/main" xmlns="" id="{3B854194-185D-494D-905C-7C7CB2E30F6E}"/>
               </a:ext>
               <a:ext uri="{C183D7F6-B498-43B3-948B-1728B52AA6E4}">
-                <adec:decorative xmlns:adec="http://schemas.microsoft.com/office/drawing/2017/decorative" val="1"/>
+                <adec:decorative xmlns:adec="http://schemas.microsoft.com/office/drawing/2017/decorative" xmlns="" val="1"/>
               </a:ext>
             </a:extLst>
           </p:cNvPr>
@@ -7641,7 +7871,7 @@
           <p:nvPr>
             <p:extLst>
               <p:ext uri="{386F3935-93C4-4BCD-93E2-E3B085C9AB24}">
-                <p16:designElem xmlns:p16="http://schemas.microsoft.com/office/powerpoint/2015/main" val="1"/>
+                <p16:designElem xmlns:p16="http://schemas.microsoft.com/office/powerpoint/2015/main" xmlns="" val="1"/>
               </p:ext>
             </p:extLst>
           </p:nvPr>
@@ -7688,10 +7918,10 @@
           <p:cNvPr id="28" name="Rectangle 19">
             <a:extLst>
               <a:ext uri="{FF2B5EF4-FFF2-40B4-BE49-F238E27FC236}">
-                <a16:creationId xmlns:a16="http://schemas.microsoft.com/office/drawing/2014/main" id="{B4F5FA0D-0104-4987-8241-EFF7C85B88DE}"/>
+                <a16:creationId xmlns:a16="http://schemas.microsoft.com/office/drawing/2014/main" xmlns="" id="{B4F5FA0D-0104-4987-8241-EFF7C85B88DE}"/>
               </a:ext>
               <a:ext uri="{C183D7F6-B498-43B3-948B-1728B52AA6E4}">
-                <adec:decorative xmlns:adec="http://schemas.microsoft.com/office/drawing/2017/decorative" val="1"/>
+                <adec:decorative xmlns:adec="http://schemas.microsoft.com/office/drawing/2017/decorative" xmlns="" val="1"/>
               </a:ext>
             </a:extLst>
           </p:cNvPr>
@@ -7701,7 +7931,7 @@
           <p:nvPr>
             <p:extLst>
               <p:ext uri="{386F3935-93C4-4BCD-93E2-E3B085C9AB24}">
-                <p16:designElem xmlns:p16="http://schemas.microsoft.com/office/powerpoint/2015/main" val="1"/>
+                <p16:designElem xmlns:p16="http://schemas.microsoft.com/office/powerpoint/2015/main" xmlns="" val="1"/>
               </p:ext>
             </p:extLst>
           </p:nvPr>
@@ -7773,10 +8003,10 @@
           <p:cNvPr id="22" name="Picture 21">
             <a:extLst>
               <a:ext uri="{FF2B5EF4-FFF2-40B4-BE49-F238E27FC236}">
-                <a16:creationId xmlns:a16="http://schemas.microsoft.com/office/drawing/2014/main" id="{2897127E-6CEF-446C-BE87-93B7C46E49D1}"/>
+                <a16:creationId xmlns:a16="http://schemas.microsoft.com/office/drawing/2014/main" xmlns="" id="{2897127E-6CEF-446C-BE87-93B7C46E49D1}"/>
               </a:ext>
               <a:ext uri="{C183D7F6-B498-43B3-948B-1728B52AA6E4}">
-                <adec:decorative xmlns:adec="http://schemas.microsoft.com/office/drawing/2017/decorative" val="1"/>
+                <adec:decorative xmlns:adec="http://schemas.microsoft.com/office/drawing/2017/decorative" xmlns="" val="1"/>
               </a:ext>
             </a:extLst>
           </p:cNvPr>
@@ -7786,7 +8016,7 @@
           <p:nvPr>
             <p:extLst>
               <p:ext uri="{386F3935-93C4-4BCD-93E2-E3B085C9AB24}">
-                <p16:designElem xmlns:p16="http://schemas.microsoft.com/office/powerpoint/2015/main" val="1"/>
+                <p16:designElem xmlns:p16="http://schemas.microsoft.com/office/powerpoint/2015/main" xmlns="" val="1"/>
               </p:ext>
             </p:extLst>
           </p:nvPr>
@@ -7844,6 +8074,14 @@
               </a:rPr>
               <a:t>Introducción</a:t>
             </a:r>
+            <a:r>
+              <a:rPr lang="en-US" dirty="0">
+                <a:solidFill>
+                  <a:srgbClr val="FFFFFF"/>
+                </a:solidFill>
+              </a:rPr>
+              <a:t/>
+            </a:r>
             <a:br>
               <a:rPr lang="en-US" dirty="0">
                 <a:solidFill>
@@ -7977,6 +8215,13 @@
   <p:clrMapOvr>
     <a:masterClrMapping/>
   </p:clrMapOvr>
+  <p:timing>
+    <p:tnLst>
+      <p:par>
+        <p:cTn id="1" dur="indefinite" restart="never" nodeType="tmRoot"/>
+      </p:par>
+    </p:tnLst>
+  </p:timing>
 </p:sld>
 </file>
 
@@ -8010,10 +8255,10 @@
           <p:cNvPr id="44" name="Rectangle 43">
             <a:extLst>
               <a:ext uri="{FF2B5EF4-FFF2-40B4-BE49-F238E27FC236}">
-                <a16:creationId xmlns:a16="http://schemas.microsoft.com/office/drawing/2014/main" id="{4351DFE5-F63D-4BE0-BDA9-E3EB88F01AA5}"/>
+                <a16:creationId xmlns:a16="http://schemas.microsoft.com/office/drawing/2014/main" xmlns="" id="{4351DFE5-F63D-4BE0-BDA9-E3EB88F01AA5}"/>
               </a:ext>
               <a:ext uri="{C183D7F6-B498-43B3-948B-1728B52AA6E4}">
-                <adec:decorative xmlns:adec="http://schemas.microsoft.com/office/drawing/2017/decorative" val="1"/>
+                <adec:decorative xmlns:adec="http://schemas.microsoft.com/office/drawing/2017/decorative" xmlns="" val="1"/>
               </a:ext>
             </a:extLst>
           </p:cNvPr>
@@ -8023,7 +8268,7 @@
           <p:nvPr>
             <p:extLst>
               <p:ext uri="{386F3935-93C4-4BCD-93E2-E3B085C9AB24}">
-                <p16:designElem xmlns:p16="http://schemas.microsoft.com/office/powerpoint/2015/main" val="1"/>
+                <p16:designElem xmlns:p16="http://schemas.microsoft.com/office/powerpoint/2015/main" xmlns="" val="1"/>
               </p:ext>
             </p:extLst>
           </p:nvPr>
@@ -8095,10 +8340,10 @@
           <p:cNvPr id="46" name="Picture 45">
             <a:extLst>
               <a:ext uri="{FF2B5EF4-FFF2-40B4-BE49-F238E27FC236}">
-                <a16:creationId xmlns:a16="http://schemas.microsoft.com/office/drawing/2014/main" id="{02DD2BC0-6F29-4B4F-8D61-2DCF6D2E8E73}"/>
+                <a16:creationId xmlns:a16="http://schemas.microsoft.com/office/drawing/2014/main" xmlns="" id="{02DD2BC0-6F29-4B4F-8D61-2DCF6D2E8E73}"/>
               </a:ext>
               <a:ext uri="{C183D7F6-B498-43B3-948B-1728B52AA6E4}">
-                <adec:decorative xmlns:adec="http://schemas.microsoft.com/office/drawing/2017/decorative" val="1"/>
+                <adec:decorative xmlns:adec="http://schemas.microsoft.com/office/drawing/2017/decorative" xmlns="" val="1"/>
               </a:ext>
             </a:extLst>
           </p:cNvPr>
@@ -8108,7 +8353,7 @@
           <p:nvPr>
             <p:extLst>
               <p:ext uri="{386F3935-93C4-4BCD-93E2-E3B085C9AB24}">
-                <p16:designElem xmlns:p16="http://schemas.microsoft.com/office/powerpoint/2015/main" val="1"/>
+                <p16:designElem xmlns:p16="http://schemas.microsoft.com/office/powerpoint/2015/main" xmlns="" val="1"/>
               </p:ext>
             </p:extLst>
           </p:nvPr>
@@ -8179,7 +8424,7 @@
           <p:cNvPr id="15" name="Content Placeholder 2">
             <a:extLst>
               <a:ext uri="{FF2B5EF4-FFF2-40B4-BE49-F238E27FC236}">
-                <a16:creationId xmlns:a16="http://schemas.microsoft.com/office/drawing/2014/main" id="{2AD70888-89C1-4A4A-9DD1-7A773BD9F0E1}"/>
+                <a16:creationId xmlns:a16="http://schemas.microsoft.com/office/drawing/2014/main" xmlns="" id="{2AD70888-89C1-4A4A-9DD1-7A773BD9F0E1}"/>
               </a:ext>
             </a:extLst>
           </p:cNvPr>
@@ -8215,6 +8460,13 @@
   <p:clrMapOvr>
     <a:masterClrMapping/>
   </p:clrMapOvr>
+  <p:timing>
+    <p:tnLst>
+      <p:par>
+        <p:cTn id="1" dur="indefinite" restart="never" nodeType="tmRoot"/>
+      </p:par>
+    </p:tnLst>
+  </p:timing>
 </p:sld>
 </file>
 
@@ -8248,10 +8500,10 @@
           <p:cNvPr id="35" name="Rectangle 17">
             <a:extLst>
               <a:ext uri="{FF2B5EF4-FFF2-40B4-BE49-F238E27FC236}">
-                <a16:creationId xmlns:a16="http://schemas.microsoft.com/office/drawing/2014/main" id="{3B854194-185D-494D-905C-7C7CB2E30F6E}"/>
+                <a16:creationId xmlns:a16="http://schemas.microsoft.com/office/drawing/2014/main" xmlns="" id="{3B854194-185D-494D-905C-7C7CB2E30F6E}"/>
               </a:ext>
               <a:ext uri="{C183D7F6-B498-43B3-948B-1728B52AA6E4}">
-                <adec:decorative xmlns:adec="http://schemas.microsoft.com/office/drawing/2017/decorative" val="1"/>
+                <adec:decorative xmlns:adec="http://schemas.microsoft.com/office/drawing/2017/decorative" xmlns="" val="1"/>
               </a:ext>
             </a:extLst>
           </p:cNvPr>
@@ -8261,7 +8513,7 @@
           <p:nvPr>
             <p:extLst>
               <p:ext uri="{386F3935-93C4-4BCD-93E2-E3B085C9AB24}">
-                <p16:designElem xmlns:p16="http://schemas.microsoft.com/office/powerpoint/2015/main" val="1"/>
+                <p16:designElem xmlns:p16="http://schemas.microsoft.com/office/powerpoint/2015/main" xmlns="" val="1"/>
               </p:ext>
             </p:extLst>
           </p:nvPr>
@@ -8308,10 +8560,10 @@
           <p:cNvPr id="36" name="Rectangle 19">
             <a:extLst>
               <a:ext uri="{FF2B5EF4-FFF2-40B4-BE49-F238E27FC236}">
-                <a16:creationId xmlns:a16="http://schemas.microsoft.com/office/drawing/2014/main" id="{B4F5FA0D-0104-4987-8241-EFF7C85B88DE}"/>
+                <a16:creationId xmlns:a16="http://schemas.microsoft.com/office/drawing/2014/main" xmlns="" id="{B4F5FA0D-0104-4987-8241-EFF7C85B88DE}"/>
               </a:ext>
               <a:ext uri="{C183D7F6-B498-43B3-948B-1728B52AA6E4}">
-                <adec:decorative xmlns:adec="http://schemas.microsoft.com/office/drawing/2017/decorative" val="1"/>
+                <adec:decorative xmlns:adec="http://schemas.microsoft.com/office/drawing/2017/decorative" xmlns="" val="1"/>
               </a:ext>
             </a:extLst>
           </p:cNvPr>
@@ -8321,7 +8573,7 @@
           <p:nvPr>
             <p:extLst>
               <p:ext uri="{386F3935-93C4-4BCD-93E2-E3B085C9AB24}">
-                <p16:designElem xmlns:p16="http://schemas.microsoft.com/office/powerpoint/2015/main" val="1"/>
+                <p16:designElem xmlns:p16="http://schemas.microsoft.com/office/powerpoint/2015/main" xmlns="" val="1"/>
               </p:ext>
             </p:extLst>
           </p:nvPr>
@@ -8393,10 +8645,10 @@
           <p:cNvPr id="22" name="Picture 21">
             <a:extLst>
               <a:ext uri="{FF2B5EF4-FFF2-40B4-BE49-F238E27FC236}">
-                <a16:creationId xmlns:a16="http://schemas.microsoft.com/office/drawing/2014/main" id="{2897127E-6CEF-446C-BE87-93B7C46E49D1}"/>
+                <a16:creationId xmlns:a16="http://schemas.microsoft.com/office/drawing/2014/main" xmlns="" id="{2897127E-6CEF-446C-BE87-93B7C46E49D1}"/>
               </a:ext>
               <a:ext uri="{C183D7F6-B498-43B3-948B-1728B52AA6E4}">
-                <adec:decorative xmlns:adec="http://schemas.microsoft.com/office/drawing/2017/decorative" val="1"/>
+                <adec:decorative xmlns:adec="http://schemas.microsoft.com/office/drawing/2017/decorative" xmlns="" val="1"/>
               </a:ext>
             </a:extLst>
           </p:cNvPr>
@@ -8406,7 +8658,7 @@
           <p:nvPr>
             <p:extLst>
               <p:ext uri="{386F3935-93C4-4BCD-93E2-E3B085C9AB24}">
-                <p16:designElem xmlns:p16="http://schemas.microsoft.com/office/powerpoint/2015/main" val="1"/>
+                <p16:designElem xmlns:p16="http://schemas.microsoft.com/office/powerpoint/2015/main" xmlns="" val="1"/>
               </p:ext>
             </p:extLst>
           </p:nvPr>
@@ -8529,6 +8781,13 @@
   <p:clrMapOvr>
     <a:masterClrMapping/>
   </p:clrMapOvr>
+  <p:timing>
+    <p:tnLst>
+      <p:par>
+        <p:cTn id="1" dur="indefinite" restart="never" nodeType="tmRoot"/>
+      </p:par>
+    </p:tnLst>
+  </p:timing>
 </p:sld>
 </file>
 
@@ -8562,10 +8821,10 @@
           <p:cNvPr id="27" name="Rectangle 23">
             <a:extLst>
               <a:ext uri="{FF2B5EF4-FFF2-40B4-BE49-F238E27FC236}">
-                <a16:creationId xmlns:a16="http://schemas.microsoft.com/office/drawing/2014/main" id="{84867EAF-AE1D-4322-9DE8-383AE3F7BCD9}"/>
+                <a16:creationId xmlns:a16="http://schemas.microsoft.com/office/drawing/2014/main" xmlns="" id="{84867EAF-AE1D-4322-9DE8-383AE3F7BCD9}"/>
               </a:ext>
               <a:ext uri="{C183D7F6-B498-43B3-948B-1728B52AA6E4}">
-                <adec:decorative xmlns:adec="http://schemas.microsoft.com/office/drawing/2017/decorative" val="1"/>
+                <adec:decorative xmlns:adec="http://schemas.microsoft.com/office/drawing/2017/decorative" xmlns="" val="1"/>
               </a:ext>
             </a:extLst>
           </p:cNvPr>
@@ -8575,7 +8834,7 @@
           <p:nvPr>
             <p:extLst>
               <p:ext uri="{386F3935-93C4-4BCD-93E2-E3B085C9AB24}">
-                <p16:designElem xmlns:p16="http://schemas.microsoft.com/office/powerpoint/2015/main" val="1"/>
+                <p16:designElem xmlns:p16="http://schemas.microsoft.com/office/powerpoint/2015/main" xmlns="" val="1"/>
               </p:ext>
             </p:extLst>
           </p:nvPr>
@@ -8647,10 +8906,10 @@
           <p:cNvPr id="26" name="Picture 25">
             <a:extLst>
               <a:ext uri="{FF2B5EF4-FFF2-40B4-BE49-F238E27FC236}">
-                <a16:creationId xmlns:a16="http://schemas.microsoft.com/office/drawing/2014/main" id="{40676238-7F95-4EEB-836A-7D23927873AD}"/>
+                <a16:creationId xmlns:a16="http://schemas.microsoft.com/office/drawing/2014/main" xmlns="" id="{40676238-7F95-4EEB-836A-7D23927873AD}"/>
               </a:ext>
               <a:ext uri="{C183D7F6-B498-43B3-948B-1728B52AA6E4}">
-                <adec:decorative xmlns:adec="http://schemas.microsoft.com/office/drawing/2017/decorative" val="1"/>
+                <adec:decorative xmlns:adec="http://schemas.microsoft.com/office/drawing/2017/decorative" xmlns="" val="1"/>
               </a:ext>
             </a:extLst>
           </p:cNvPr>
@@ -8660,7 +8919,7 @@
           <p:nvPr>
             <p:extLst>
               <p:ext uri="{386F3935-93C4-4BCD-93E2-E3B085C9AB24}">
-                <p16:designElem xmlns:p16="http://schemas.microsoft.com/office/powerpoint/2015/main" val="1"/>
+                <p16:designElem xmlns:p16="http://schemas.microsoft.com/office/powerpoint/2015/main" xmlns="" val="1"/>
               </p:ext>
             </p:extLst>
           </p:nvPr>
@@ -8928,7 +9187,7 @@
           <p:cNvPr id="5" name="Tabla 4">
             <a:extLst>
               <a:ext uri="{FF2B5EF4-FFF2-40B4-BE49-F238E27FC236}">
-                <a16:creationId xmlns:a16="http://schemas.microsoft.com/office/drawing/2014/main" id="{C00B5407-98C7-4A5F-84D7-152727FE1026}"/>
+                <a16:creationId xmlns:a16="http://schemas.microsoft.com/office/drawing/2014/main" xmlns="" id="{C00B5407-98C7-4A5F-84D7-152727FE1026}"/>
               </a:ext>
             </a:extLst>
           </p:cNvPr>
@@ -8957,28 +9216,28 @@
                 <a:gridCol w="1493449">
                   <a:extLst>
                     <a:ext uri="{9D8B030D-6E8A-4147-A177-3AD203B41FA5}">
-                      <a16:colId xmlns:a16="http://schemas.microsoft.com/office/drawing/2014/main" val="995733403"/>
+                      <a16:colId xmlns:a16="http://schemas.microsoft.com/office/drawing/2014/main" xmlns="" val="995733403"/>
                     </a:ext>
                   </a:extLst>
                 </a:gridCol>
                 <a:gridCol w="1494435">
                   <a:extLst>
                     <a:ext uri="{9D8B030D-6E8A-4147-A177-3AD203B41FA5}">
-                      <a16:colId xmlns:a16="http://schemas.microsoft.com/office/drawing/2014/main" val="3678549874"/>
+                      <a16:colId xmlns:a16="http://schemas.microsoft.com/office/drawing/2014/main" xmlns="" val="3678549874"/>
                     </a:ext>
                   </a:extLst>
                 </a:gridCol>
                 <a:gridCol w="1494435">
                   <a:extLst>
                     <a:ext uri="{9D8B030D-6E8A-4147-A177-3AD203B41FA5}">
-                      <a16:colId xmlns:a16="http://schemas.microsoft.com/office/drawing/2014/main" val="967120097"/>
+                      <a16:colId xmlns:a16="http://schemas.microsoft.com/office/drawing/2014/main" xmlns="" val="967120097"/>
                     </a:ext>
                   </a:extLst>
                 </a:gridCol>
                 <a:gridCol w="1494435">
                   <a:extLst>
                     <a:ext uri="{9D8B030D-6E8A-4147-A177-3AD203B41FA5}">
-                      <a16:colId xmlns:a16="http://schemas.microsoft.com/office/drawing/2014/main" val="1564495358"/>
+                      <a16:colId xmlns:a16="http://schemas.microsoft.com/office/drawing/2014/main" xmlns="" val="1564495358"/>
                     </a:ext>
                   </a:extLst>
                 </a:gridCol>
@@ -9042,7 +9301,7 @@
                 </a:tc>
                 <a:extLst>
                   <a:ext uri="{0D108BD9-81ED-4DB2-BD59-A6C34878D82A}">
-                    <a16:rowId xmlns:a16="http://schemas.microsoft.com/office/drawing/2014/main" val="3397976400"/>
+                    <a16:rowId xmlns:a16="http://schemas.microsoft.com/office/drawing/2014/main" xmlns="" val="3397976400"/>
                   </a:ext>
                 </a:extLst>
               </a:tr>
@@ -9121,7 +9380,7 @@
                 </a:tc>
                 <a:extLst>
                   <a:ext uri="{0D108BD9-81ED-4DB2-BD59-A6C34878D82A}">
-                    <a16:rowId xmlns:a16="http://schemas.microsoft.com/office/drawing/2014/main" val="2695858497"/>
+                    <a16:rowId xmlns:a16="http://schemas.microsoft.com/office/drawing/2014/main" xmlns="" val="2695858497"/>
                   </a:ext>
                 </a:extLst>
               </a:tr>
@@ -9200,7 +9459,7 @@
                 </a:tc>
                 <a:extLst>
                   <a:ext uri="{0D108BD9-81ED-4DB2-BD59-A6C34878D82A}">
-                    <a16:rowId xmlns:a16="http://schemas.microsoft.com/office/drawing/2014/main" val="2159754249"/>
+                    <a16:rowId xmlns:a16="http://schemas.microsoft.com/office/drawing/2014/main" xmlns="" val="2159754249"/>
                   </a:ext>
                 </a:extLst>
               </a:tr>
@@ -9218,6 +9477,13 @@
   <p:clrMapOvr>
     <a:masterClrMapping/>
   </p:clrMapOvr>
+  <p:timing>
+    <p:tnLst>
+      <p:par>
+        <p:cTn id="1" dur="indefinite" restart="never" nodeType="tmRoot"/>
+      </p:par>
+    </p:tnLst>
+  </p:timing>
 </p:sld>
 </file>
 
@@ -9241,7 +9507,7 @@
       <p:pic>
         <p:nvPicPr>
           <p:cNvPr id="3" name="Picture">
-            <a:hlinkClick r:id="rId2"/>
+            <a:hlinkClick r:id="rId3"/>
           </p:cNvPr>
           <p:cNvPicPr>
             <a:picLocks noChangeAspect="1"/>
@@ -9249,7 +9515,7 @@
           <p:nvPr/>
         </p:nvPicPr>
         <p:blipFill>
-          <a:blip r:embed="rId3"/>
+          <a:blip r:embed="rId4"/>
           <a:stretch>
             <a:fillRect/>
           </a:stretch>
@@ -9270,6 +9536,13 @@
   <p:clrMapOvr>
     <a:masterClrMapping/>
   </p:clrMapOvr>
+  <p:timing>
+    <p:tnLst>
+      <p:par>
+        <p:cTn id="1" dur="indefinite" restart="never" nodeType="tmRoot"/>
+      </p:par>
+    </p:tnLst>
+  </p:timing>
 </p:sld>
 </file>
 
@@ -9295,10 +9568,10 @@
           <p:cNvPr id="9" name="Rectangle 8">
             <a:extLst>
               <a:ext uri="{FF2B5EF4-FFF2-40B4-BE49-F238E27FC236}">
-                <a16:creationId xmlns:a16="http://schemas.microsoft.com/office/drawing/2014/main" id="{23962611-DFD5-4092-AAFD-559E3DFCE2C9}"/>
+                <a16:creationId xmlns:a16="http://schemas.microsoft.com/office/drawing/2014/main" xmlns="" id="{23962611-DFD5-4092-AAFD-559E3DFCE2C9}"/>
               </a:ext>
               <a:ext uri="{C183D7F6-B498-43B3-948B-1728B52AA6E4}">
-                <adec:decorative xmlns:adec="http://schemas.microsoft.com/office/drawing/2017/decorative" val="1"/>
+                <adec:decorative xmlns:adec="http://schemas.microsoft.com/office/drawing/2017/decorative" xmlns="" val="1"/>
               </a:ext>
             </a:extLst>
           </p:cNvPr>
@@ -9308,7 +9581,7 @@
           <p:nvPr>
             <p:extLst>
               <p:ext uri="{386F3935-93C4-4BCD-93E2-E3B085C9AB24}">
-                <p16:designElem xmlns:p16="http://schemas.microsoft.com/office/powerpoint/2015/main" val="1"/>
+                <p16:designElem xmlns:p16="http://schemas.microsoft.com/office/powerpoint/2015/main" xmlns="" val="1"/>
               </p:ext>
             </p:extLst>
           </p:nvPr>
@@ -9380,10 +9653,10 @@
           <p:cNvPr id="11" name="Picture 10">
             <a:extLst>
               <a:ext uri="{FF2B5EF4-FFF2-40B4-BE49-F238E27FC236}">
-                <a16:creationId xmlns:a16="http://schemas.microsoft.com/office/drawing/2014/main" id="{2270F1FA-0425-408F-9861-80BF5AFB276D}"/>
+                <a16:creationId xmlns:a16="http://schemas.microsoft.com/office/drawing/2014/main" xmlns="" id="{2270F1FA-0425-408F-9861-80BF5AFB276D}"/>
               </a:ext>
               <a:ext uri="{C183D7F6-B498-43B3-948B-1728B52AA6E4}">
-                <adec:decorative xmlns:adec="http://schemas.microsoft.com/office/drawing/2017/decorative" val="1"/>
+                <adec:decorative xmlns:adec="http://schemas.microsoft.com/office/drawing/2017/decorative" xmlns="" val="1"/>
               </a:ext>
             </a:extLst>
           </p:cNvPr>
@@ -9393,7 +9666,7 @@
           <p:nvPr>
             <p:extLst>
               <p:ext uri="{386F3935-93C4-4BCD-93E2-E3B085C9AB24}">
-                <p16:designElem xmlns:p16="http://schemas.microsoft.com/office/powerpoint/2015/main" val="1"/>
+                <p16:designElem xmlns:p16="http://schemas.microsoft.com/office/powerpoint/2015/main" xmlns="" val="1"/>
               </p:ext>
             </p:extLst>
           </p:nvPr>
@@ -9480,6 +9753,13 @@
   <p:clrMapOvr>
     <a:masterClrMapping/>
   </p:clrMapOvr>
+  <p:timing>
+    <p:tnLst>
+      <p:par>
+        <p:cTn id="1" dur="indefinite" restart="never" nodeType="tmRoot"/>
+      </p:par>
+    </p:tnLst>
+  </p:timing>
 </p:sld>
 </file>
 

</xml_diff>